<commit_message>
Castecny pokrok v prezentaci.
</commit_message>
<xml_diff>
--- a/docs/prezentace.pptx
+++ b/docs/prezentace.pptx
@@ -5,7 +5,7 @@
     <p:sldMasterId id="2147483658" r:id="rId1"/>
   </p:sldMasterIdLst>
   <p:notesMasterIdLst>
-    <p:notesMasterId r:id="rId12"/>
+    <p:notesMasterId r:id="rId16"/>
   </p:notesMasterIdLst>
   <p:sldIdLst>
     <p:sldId id="256" r:id="rId2"/>
@@ -17,7 +17,11 @@
     <p:sldId id="262" r:id="rId8"/>
     <p:sldId id="263" r:id="rId9"/>
     <p:sldId id="264" r:id="rId10"/>
-    <p:sldId id="265" r:id="rId11"/>
+    <p:sldId id="266" r:id="rId11"/>
+    <p:sldId id="269" r:id="rId12"/>
+    <p:sldId id="268" r:id="rId13"/>
+    <p:sldId id="267" r:id="rId14"/>
+    <p:sldId id="265" r:id="rId15"/>
   </p:sldIdLst>
   <p:sldSz cx="9144000" cy="6858000" type="screen4x3"/>
   <p:notesSz cx="6858000" cy="9144000"/>
@@ -217,7 +221,7 @@
           <a:p>
             <a:fld id="{8A47B827-01B0-40C7-BA68-3ACC7CEACCE7}" type="datetimeFigureOut">
               <a:rPr lang="cs-CZ" smtClean="0"/>
-              <a:t>14.11.2016</a:t>
+              <a:t>13.12.2016</a:t>
             </a:fld>
             <a:endParaRPr lang="cs-CZ" dirty="0"/>
           </a:p>
@@ -484,6 +488,877 @@
 </p:notesMaster>
 </file>
 
+<file path=ppt/notesSlides/notesSlide1.xml><?xml version="1.0" encoding="utf-8"?>
+<p:notes xmlns:a="http://schemas.openxmlformats.org/drawingml/2006/main" xmlns:r="http://schemas.openxmlformats.org/officeDocument/2006/relationships" xmlns:p="http://schemas.openxmlformats.org/presentationml/2006/main">
+  <p:cSld>
+    <p:spTree>
+      <p:nvGrpSpPr>
+        <p:cNvPr id="1" name=""/>
+        <p:cNvGrpSpPr/>
+        <p:nvPr/>
+      </p:nvGrpSpPr>
+      <p:grpSpPr>
+        <a:xfrm>
+          <a:off x="0" y="0"/>
+          <a:ext cx="0" cy="0"/>
+          <a:chOff x="0" y="0"/>
+          <a:chExt cx="0" cy="0"/>
+        </a:xfrm>
+      </p:grpSpPr>
+      <p:sp>
+        <p:nvSpPr>
+          <p:cNvPr id="2" name="Zástupný symbol pro obrázek snímku 1"/>
+          <p:cNvSpPr>
+            <a:spLocks noGrp="1" noRot="1" noChangeAspect="1"/>
+          </p:cNvSpPr>
+          <p:nvPr>
+            <p:ph type="sldImg"/>
+          </p:nvPr>
+        </p:nvSpPr>
+        <p:spPr/>
+      </p:sp>
+      <p:sp>
+        <p:nvSpPr>
+          <p:cNvPr id="3" name="Zástupný symbol pro poznámky 2"/>
+          <p:cNvSpPr>
+            <a:spLocks noGrp="1"/>
+          </p:cNvSpPr>
+          <p:nvPr>
+            <p:ph type="body" idx="1"/>
+          </p:nvPr>
+        </p:nvSpPr>
+        <p:spPr/>
+        <p:txBody>
+          <a:bodyPr/>
+          <a:lstStyle/>
+          <a:p>
+            <a:endParaRPr lang="en-US" dirty="0"/>
+          </a:p>
+        </p:txBody>
+      </p:sp>
+      <p:sp>
+        <p:nvSpPr>
+          <p:cNvPr id="4" name="Zástupný symbol pro číslo snímku 3"/>
+          <p:cNvSpPr>
+            <a:spLocks noGrp="1"/>
+          </p:cNvSpPr>
+          <p:nvPr>
+            <p:ph type="sldNum" sz="quarter" idx="10"/>
+          </p:nvPr>
+        </p:nvSpPr>
+        <p:spPr/>
+        <p:txBody>
+          <a:bodyPr/>
+          <a:lstStyle/>
+          <a:p>
+            <a:fld id="{EE1BD250-9BF5-4AE8-86BD-080F3A22271A}" type="slidenum">
+              <a:rPr lang="cs-CZ" smtClean="0"/>
+              <a:t>3</a:t>
+            </a:fld>
+            <a:endParaRPr lang="cs-CZ" dirty="0"/>
+          </a:p>
+        </p:txBody>
+      </p:sp>
+    </p:spTree>
+    <p:extLst>
+      <p:ext uri="{BB962C8B-B14F-4D97-AF65-F5344CB8AC3E}">
+        <p14:creationId xmlns:p14="http://schemas.microsoft.com/office/powerpoint/2010/main" val="268067599"/>
+      </p:ext>
+    </p:extLst>
+  </p:cSld>
+  <p:clrMapOvr>
+    <a:masterClrMapping/>
+  </p:clrMapOvr>
+</p:notes>
+</file>
+
+<file path=ppt/notesSlides/notesSlide2.xml><?xml version="1.0" encoding="utf-8"?>
+<p:notes xmlns:a="http://schemas.openxmlformats.org/drawingml/2006/main" xmlns:r="http://schemas.openxmlformats.org/officeDocument/2006/relationships" xmlns:p="http://schemas.openxmlformats.org/presentationml/2006/main">
+  <p:cSld>
+    <p:spTree>
+      <p:nvGrpSpPr>
+        <p:cNvPr id="1" name=""/>
+        <p:cNvGrpSpPr/>
+        <p:nvPr/>
+      </p:nvGrpSpPr>
+      <p:grpSpPr>
+        <a:xfrm>
+          <a:off x="0" y="0"/>
+          <a:ext cx="0" cy="0"/>
+          <a:chOff x="0" y="0"/>
+          <a:chExt cx="0" cy="0"/>
+        </a:xfrm>
+      </p:grpSpPr>
+      <p:sp>
+        <p:nvSpPr>
+          <p:cNvPr id="2" name="Zástupný symbol pro obrázek snímku 1"/>
+          <p:cNvSpPr>
+            <a:spLocks noGrp="1" noRot="1" noChangeAspect="1"/>
+          </p:cNvSpPr>
+          <p:nvPr>
+            <p:ph type="sldImg"/>
+          </p:nvPr>
+        </p:nvSpPr>
+        <p:spPr/>
+      </p:sp>
+      <p:sp>
+        <p:nvSpPr>
+          <p:cNvPr id="3" name="Zástupný symbol pro poznámky 2"/>
+          <p:cNvSpPr>
+            <a:spLocks noGrp="1"/>
+          </p:cNvSpPr>
+          <p:nvPr>
+            <p:ph type="body" idx="1"/>
+          </p:nvPr>
+        </p:nvSpPr>
+        <p:spPr/>
+        <p:txBody>
+          <a:bodyPr/>
+          <a:lstStyle/>
+          <a:p>
+            <a:r>
+              <a:rPr lang="cs-CZ" dirty="0" err="1"/>
+              <a:t>Obrazek</a:t>
+            </a:r>
+            <a:r>
+              <a:rPr lang="cs-CZ" baseline="0" dirty="0"/>
+              <a:t> </a:t>
+            </a:r>
+            <a:r>
+              <a:rPr lang="cs-CZ" baseline="0" dirty="0" err="1"/>
+              <a:t>bvs</a:t>
+            </a:r>
+            <a:r>
+              <a:rPr lang="cs-CZ" baseline="0" dirty="0"/>
+              <a:t> </a:t>
+            </a:r>
+            <a:r>
+              <a:rPr lang="cs-CZ" baseline="0" dirty="0" err="1"/>
+              <a:t>ast</a:t>
+            </a:r>
+            <a:endParaRPr lang="en-US" dirty="0"/>
+          </a:p>
+        </p:txBody>
+      </p:sp>
+      <p:sp>
+        <p:nvSpPr>
+          <p:cNvPr id="4" name="Zástupný symbol pro číslo snímku 3"/>
+          <p:cNvSpPr>
+            <a:spLocks noGrp="1"/>
+          </p:cNvSpPr>
+          <p:nvPr>
+            <p:ph type="sldNum" sz="quarter" idx="10"/>
+          </p:nvPr>
+        </p:nvSpPr>
+        <p:spPr/>
+        <p:txBody>
+          <a:bodyPr/>
+          <a:lstStyle/>
+          <a:p>
+            <a:fld id="{EE1BD250-9BF5-4AE8-86BD-080F3A22271A}" type="slidenum">
+              <a:rPr lang="cs-CZ" smtClean="0"/>
+              <a:t>4</a:t>
+            </a:fld>
+            <a:endParaRPr lang="cs-CZ" dirty="0"/>
+          </a:p>
+        </p:txBody>
+      </p:sp>
+    </p:spTree>
+    <p:extLst>
+      <p:ext uri="{BB962C8B-B14F-4D97-AF65-F5344CB8AC3E}">
+        <p14:creationId xmlns:p14="http://schemas.microsoft.com/office/powerpoint/2010/main" val="955478889"/>
+      </p:ext>
+    </p:extLst>
+  </p:cSld>
+  <p:clrMapOvr>
+    <a:masterClrMapping/>
+  </p:clrMapOvr>
+</p:notes>
+</file>
+
+<file path=ppt/notesSlides/notesSlide3.xml><?xml version="1.0" encoding="utf-8"?>
+<p:notes xmlns:a="http://schemas.openxmlformats.org/drawingml/2006/main" xmlns:r="http://schemas.openxmlformats.org/officeDocument/2006/relationships" xmlns:p="http://schemas.openxmlformats.org/presentationml/2006/main">
+  <p:cSld>
+    <p:spTree>
+      <p:nvGrpSpPr>
+        <p:cNvPr id="1" name=""/>
+        <p:cNvGrpSpPr/>
+        <p:nvPr/>
+      </p:nvGrpSpPr>
+      <p:grpSpPr>
+        <a:xfrm>
+          <a:off x="0" y="0"/>
+          <a:ext cx="0" cy="0"/>
+          <a:chOff x="0" y="0"/>
+          <a:chExt cx="0" cy="0"/>
+        </a:xfrm>
+      </p:grpSpPr>
+      <p:sp>
+        <p:nvSpPr>
+          <p:cNvPr id="2" name="Zástupný symbol pro obrázek snímku 1"/>
+          <p:cNvSpPr>
+            <a:spLocks noGrp="1" noRot="1" noChangeAspect="1"/>
+          </p:cNvSpPr>
+          <p:nvPr>
+            <p:ph type="sldImg"/>
+          </p:nvPr>
+        </p:nvSpPr>
+        <p:spPr/>
+      </p:sp>
+      <p:sp>
+        <p:nvSpPr>
+          <p:cNvPr id="3" name="Zástupný symbol pro poznámky 2"/>
+          <p:cNvSpPr>
+            <a:spLocks noGrp="1"/>
+          </p:cNvSpPr>
+          <p:nvPr>
+            <p:ph type="body" idx="1"/>
+          </p:nvPr>
+        </p:nvSpPr>
+        <p:spPr/>
+        <p:txBody>
+          <a:bodyPr/>
+          <a:lstStyle/>
+          <a:p>
+            <a:r>
+              <a:rPr lang="cs-CZ" dirty="0" err="1"/>
+              <a:t>Obrazek</a:t>
+            </a:r>
+            <a:r>
+              <a:rPr lang="cs-CZ" dirty="0"/>
+              <a:t> tabulky, aspoň část jako </a:t>
+            </a:r>
+            <a:r>
+              <a:rPr lang="cs-CZ" dirty="0" err="1"/>
+              <a:t>priklad</a:t>
+            </a:r>
+            <a:r>
+              <a:rPr lang="cs-CZ" dirty="0"/>
+              <a:t>, </a:t>
+            </a:r>
+            <a:r>
+              <a:rPr lang="en-US" dirty="0"/>
+              <a:t>&lt;,</a:t>
+            </a:r>
+            <a:r>
+              <a:rPr lang="en-US" baseline="0" dirty="0"/>
+              <a:t> E, F</a:t>
+            </a:r>
+            <a:endParaRPr lang="cs-CZ" baseline="0" dirty="0"/>
+          </a:p>
+          <a:p>
+            <a:r>
+              <a:rPr lang="cs-CZ" baseline="0" dirty="0"/>
+              <a:t>Funkce z definovanou v modulu syntaktické </a:t>
+            </a:r>
+            <a:r>
+              <a:rPr lang="cs-CZ" baseline="0" dirty="0" err="1"/>
+              <a:t>analyzy</a:t>
+            </a:r>
+            <a:r>
+              <a:rPr lang="cs-CZ" baseline="0" dirty="0"/>
+              <a:t> = </a:t>
+            </a:r>
+            <a:r>
+              <a:rPr lang="cs-CZ" baseline="0" dirty="0" err="1"/>
+              <a:t>voani</a:t>
+            </a:r>
+            <a:r>
+              <a:rPr lang="cs-CZ" baseline="0" dirty="0"/>
+              <a:t> funkce, </a:t>
+            </a:r>
+            <a:r>
+              <a:rPr lang="cs-CZ" baseline="0" dirty="0" err="1"/>
+              <a:t>vrati</a:t>
+            </a:r>
+            <a:r>
+              <a:rPr lang="cs-CZ" baseline="0" dirty="0"/>
+              <a:t> </a:t>
+            </a:r>
+            <a:r>
+              <a:rPr lang="cs-CZ" baseline="0" dirty="0" err="1"/>
+              <a:t>expression</a:t>
+            </a:r>
+            <a:r>
+              <a:rPr lang="cs-CZ" baseline="0" dirty="0"/>
+              <a:t>, který </a:t>
+            </a:r>
+            <a:r>
+              <a:rPr lang="cs-CZ" baseline="0" dirty="0" err="1"/>
+              <a:t>vratí</a:t>
+            </a:r>
+            <a:r>
+              <a:rPr lang="cs-CZ" baseline="0" dirty="0"/>
+              <a:t> do stromu</a:t>
+            </a:r>
+            <a:endParaRPr lang="en-US" baseline="0" dirty="0"/>
+          </a:p>
+        </p:txBody>
+      </p:sp>
+      <p:sp>
+        <p:nvSpPr>
+          <p:cNvPr id="4" name="Zástupný symbol pro číslo snímku 3"/>
+          <p:cNvSpPr>
+            <a:spLocks noGrp="1"/>
+          </p:cNvSpPr>
+          <p:nvPr>
+            <p:ph type="sldNum" sz="quarter" idx="10"/>
+          </p:nvPr>
+        </p:nvSpPr>
+        <p:spPr/>
+        <p:txBody>
+          <a:bodyPr/>
+          <a:lstStyle/>
+          <a:p>
+            <a:fld id="{EE1BD250-9BF5-4AE8-86BD-080F3A22271A}" type="slidenum">
+              <a:rPr lang="cs-CZ" smtClean="0"/>
+              <a:t>5</a:t>
+            </a:fld>
+            <a:endParaRPr lang="cs-CZ" dirty="0"/>
+          </a:p>
+        </p:txBody>
+      </p:sp>
+    </p:spTree>
+    <p:extLst>
+      <p:ext uri="{BB962C8B-B14F-4D97-AF65-F5344CB8AC3E}">
+        <p14:creationId xmlns:p14="http://schemas.microsoft.com/office/powerpoint/2010/main" val="654216995"/>
+      </p:ext>
+    </p:extLst>
+  </p:cSld>
+  <p:clrMapOvr>
+    <a:masterClrMapping/>
+  </p:clrMapOvr>
+</p:notes>
+</file>
+
+<file path=ppt/notesSlides/notesSlide4.xml><?xml version="1.0" encoding="utf-8"?>
+<p:notes xmlns:a="http://schemas.openxmlformats.org/drawingml/2006/main" xmlns:r="http://schemas.openxmlformats.org/officeDocument/2006/relationships" xmlns:p="http://schemas.openxmlformats.org/presentationml/2006/main">
+  <p:cSld>
+    <p:spTree>
+      <p:nvGrpSpPr>
+        <p:cNvPr id="1" name=""/>
+        <p:cNvGrpSpPr/>
+        <p:nvPr/>
+      </p:nvGrpSpPr>
+      <p:grpSpPr>
+        <a:xfrm>
+          <a:off x="0" y="0"/>
+          <a:ext cx="0" cy="0"/>
+          <a:chOff x="0" y="0"/>
+          <a:chExt cx="0" cy="0"/>
+        </a:xfrm>
+      </p:grpSpPr>
+      <p:sp>
+        <p:nvSpPr>
+          <p:cNvPr id="2" name="Zástupný symbol pro obrázek snímku 1"/>
+          <p:cNvSpPr>
+            <a:spLocks noGrp="1" noRot="1" noChangeAspect="1"/>
+          </p:cNvSpPr>
+          <p:nvPr>
+            <p:ph type="sldImg"/>
+          </p:nvPr>
+        </p:nvSpPr>
+        <p:spPr/>
+      </p:sp>
+      <p:sp>
+        <p:nvSpPr>
+          <p:cNvPr id="3" name="Zástupný symbol pro poznámky 2"/>
+          <p:cNvSpPr>
+            <a:spLocks noGrp="1"/>
+          </p:cNvSpPr>
+          <p:nvPr>
+            <p:ph type="body" idx="1"/>
+          </p:nvPr>
+        </p:nvSpPr>
+        <p:spPr/>
+        <p:txBody>
+          <a:bodyPr/>
+          <a:lstStyle/>
+          <a:p>
+            <a:pPr marL="0" marR="0" lvl="0" indent="0" algn="l" defTabSz="914400" rtl="0" eaLnBrk="1" fontAlgn="auto" latinLnBrk="0" hangingPunct="1">
+              <a:lnSpc>
+                <a:spcPct val="100000"/>
+              </a:lnSpc>
+              <a:spcBef>
+                <a:spcPts val="0"/>
+              </a:spcBef>
+              <a:spcAft>
+                <a:spcPts val="0"/>
+              </a:spcAft>
+              <a:buClrTx/>
+              <a:buSzTx/>
+              <a:buFontTx/>
+              <a:buNone/>
+              <a:tabLst/>
+              <a:defRPr/>
+            </a:pPr>
+            <a:r>
+              <a:rPr lang="en-US" baseline="0" dirty="0" err="1"/>
+              <a:t>Overeni</a:t>
+            </a:r>
+            <a:r>
+              <a:rPr lang="en-US" baseline="0" dirty="0"/>
+              <a:t> dat. T</a:t>
+            </a:r>
+            <a:r>
+              <a:rPr lang="cs-CZ" baseline="0" dirty="0" err="1"/>
+              <a:t>ypu</a:t>
+            </a:r>
+            <a:r>
+              <a:rPr lang="cs-CZ" baseline="0" dirty="0"/>
+              <a:t> = sémantika v </a:t>
+            </a:r>
+            <a:r>
+              <a:rPr lang="cs-CZ" baseline="0" dirty="0" err="1"/>
+              <a:t>ramci</a:t>
+            </a:r>
+            <a:r>
+              <a:rPr lang="cs-CZ" baseline="0" dirty="0"/>
+              <a:t> interpretu</a:t>
+            </a:r>
+            <a:endParaRPr lang="en-US" dirty="0"/>
+          </a:p>
+          <a:p>
+            <a:endParaRPr lang="en-US" dirty="0"/>
+          </a:p>
+        </p:txBody>
+      </p:sp>
+      <p:sp>
+        <p:nvSpPr>
+          <p:cNvPr id="4" name="Zástupný symbol pro číslo snímku 3"/>
+          <p:cNvSpPr>
+            <a:spLocks noGrp="1"/>
+          </p:cNvSpPr>
+          <p:nvPr>
+            <p:ph type="sldNum" sz="quarter" idx="10"/>
+          </p:nvPr>
+        </p:nvSpPr>
+        <p:spPr/>
+        <p:txBody>
+          <a:bodyPr/>
+          <a:lstStyle/>
+          <a:p>
+            <a:fld id="{EE1BD250-9BF5-4AE8-86BD-080F3A22271A}" type="slidenum">
+              <a:rPr lang="cs-CZ" smtClean="0"/>
+              <a:t>6</a:t>
+            </a:fld>
+            <a:endParaRPr lang="cs-CZ" dirty="0"/>
+          </a:p>
+        </p:txBody>
+      </p:sp>
+    </p:spTree>
+    <p:extLst>
+      <p:ext uri="{BB962C8B-B14F-4D97-AF65-F5344CB8AC3E}">
+        <p14:creationId xmlns:p14="http://schemas.microsoft.com/office/powerpoint/2010/main" val="217399601"/>
+      </p:ext>
+    </p:extLst>
+  </p:cSld>
+  <p:clrMapOvr>
+    <a:masterClrMapping/>
+  </p:clrMapOvr>
+</p:notes>
+</file>
+
+<file path=ppt/notesSlides/notesSlide5.xml><?xml version="1.0" encoding="utf-8"?>
+<p:notes xmlns:a="http://schemas.openxmlformats.org/drawingml/2006/main" xmlns:r="http://schemas.openxmlformats.org/officeDocument/2006/relationships" xmlns:p="http://schemas.openxmlformats.org/presentationml/2006/main">
+  <p:cSld>
+    <p:spTree>
+      <p:nvGrpSpPr>
+        <p:cNvPr id="1" name=""/>
+        <p:cNvGrpSpPr/>
+        <p:nvPr/>
+      </p:nvGrpSpPr>
+      <p:grpSpPr>
+        <a:xfrm>
+          <a:off x="0" y="0"/>
+          <a:ext cx="0" cy="0"/>
+          <a:chOff x="0" y="0"/>
+          <a:chExt cx="0" cy="0"/>
+        </a:xfrm>
+      </p:grpSpPr>
+      <p:sp>
+        <p:nvSpPr>
+          <p:cNvPr id="2" name="Zástupný symbol pro obrázek snímku 1"/>
+          <p:cNvSpPr>
+            <a:spLocks noGrp="1" noRot="1" noChangeAspect="1"/>
+          </p:cNvSpPr>
+          <p:nvPr>
+            <p:ph type="sldImg"/>
+          </p:nvPr>
+        </p:nvSpPr>
+        <p:spPr/>
+      </p:sp>
+      <p:sp>
+        <p:nvSpPr>
+          <p:cNvPr id="3" name="Zástupný symbol pro poznámky 2"/>
+          <p:cNvSpPr>
+            <a:spLocks noGrp="1"/>
+          </p:cNvSpPr>
+          <p:nvPr>
+            <p:ph type="body" idx="1"/>
+          </p:nvPr>
+        </p:nvSpPr>
+        <p:spPr/>
+        <p:txBody>
+          <a:bodyPr/>
+          <a:lstStyle/>
+          <a:p>
+            <a:endParaRPr lang="en-US" dirty="0"/>
+          </a:p>
+        </p:txBody>
+      </p:sp>
+      <p:sp>
+        <p:nvSpPr>
+          <p:cNvPr id="4" name="Zástupný symbol pro číslo snímku 3"/>
+          <p:cNvSpPr>
+            <a:spLocks noGrp="1"/>
+          </p:cNvSpPr>
+          <p:nvPr>
+            <p:ph type="sldNum" sz="quarter" idx="10"/>
+          </p:nvPr>
+        </p:nvSpPr>
+        <p:spPr/>
+        <p:txBody>
+          <a:bodyPr/>
+          <a:lstStyle/>
+          <a:p>
+            <a:fld id="{EE1BD250-9BF5-4AE8-86BD-080F3A22271A}" type="slidenum">
+              <a:rPr lang="cs-CZ" smtClean="0"/>
+              <a:t>7</a:t>
+            </a:fld>
+            <a:endParaRPr lang="cs-CZ" dirty="0"/>
+          </a:p>
+        </p:txBody>
+      </p:sp>
+    </p:spTree>
+    <p:extLst>
+      <p:ext uri="{BB962C8B-B14F-4D97-AF65-F5344CB8AC3E}">
+        <p14:creationId xmlns:p14="http://schemas.microsoft.com/office/powerpoint/2010/main" val="3553994163"/>
+      </p:ext>
+    </p:extLst>
+  </p:cSld>
+  <p:clrMapOvr>
+    <a:masterClrMapping/>
+  </p:clrMapOvr>
+</p:notes>
+</file>
+
+<file path=ppt/notesSlides/notesSlide6.xml><?xml version="1.0" encoding="utf-8"?>
+<p:notes xmlns:a="http://schemas.openxmlformats.org/drawingml/2006/main" xmlns:r="http://schemas.openxmlformats.org/officeDocument/2006/relationships" xmlns:p="http://schemas.openxmlformats.org/presentationml/2006/main">
+  <p:cSld>
+    <p:spTree>
+      <p:nvGrpSpPr>
+        <p:cNvPr id="1" name=""/>
+        <p:cNvGrpSpPr/>
+        <p:nvPr/>
+      </p:nvGrpSpPr>
+      <p:grpSpPr>
+        <a:xfrm>
+          <a:off x="0" y="0"/>
+          <a:ext cx="0" cy="0"/>
+          <a:chOff x="0" y="0"/>
+          <a:chExt cx="0" cy="0"/>
+        </a:xfrm>
+      </p:grpSpPr>
+      <p:sp>
+        <p:nvSpPr>
+          <p:cNvPr id="2" name="Zástupný symbol pro obrázek snímku 1"/>
+          <p:cNvSpPr>
+            <a:spLocks noGrp="1" noRot="1" noChangeAspect="1"/>
+          </p:cNvSpPr>
+          <p:nvPr>
+            <p:ph type="sldImg"/>
+          </p:nvPr>
+        </p:nvSpPr>
+        <p:spPr/>
+      </p:sp>
+      <p:sp>
+        <p:nvSpPr>
+          <p:cNvPr id="3" name="Zástupný symbol pro poznámky 2"/>
+          <p:cNvSpPr>
+            <a:spLocks noGrp="1"/>
+          </p:cNvSpPr>
+          <p:nvPr>
+            <p:ph type="body" idx="1"/>
+          </p:nvPr>
+        </p:nvSpPr>
+        <p:spPr/>
+        <p:txBody>
+          <a:bodyPr/>
+          <a:lstStyle/>
+          <a:p>
+            <a:endParaRPr lang="en-US" dirty="0"/>
+          </a:p>
+        </p:txBody>
+      </p:sp>
+      <p:sp>
+        <p:nvSpPr>
+          <p:cNvPr id="4" name="Zástupný symbol pro číslo snímku 3"/>
+          <p:cNvSpPr>
+            <a:spLocks noGrp="1"/>
+          </p:cNvSpPr>
+          <p:nvPr>
+            <p:ph type="sldNum" sz="quarter" idx="10"/>
+          </p:nvPr>
+        </p:nvSpPr>
+        <p:spPr/>
+        <p:txBody>
+          <a:bodyPr/>
+          <a:lstStyle/>
+          <a:p>
+            <a:fld id="{EE1BD250-9BF5-4AE8-86BD-080F3A22271A}" type="slidenum">
+              <a:rPr lang="cs-CZ" smtClean="0"/>
+              <a:t>8</a:t>
+            </a:fld>
+            <a:endParaRPr lang="cs-CZ" dirty="0"/>
+          </a:p>
+        </p:txBody>
+      </p:sp>
+    </p:spTree>
+    <p:extLst>
+      <p:ext uri="{BB962C8B-B14F-4D97-AF65-F5344CB8AC3E}">
+        <p14:creationId xmlns:p14="http://schemas.microsoft.com/office/powerpoint/2010/main" val="3773019756"/>
+      </p:ext>
+    </p:extLst>
+  </p:cSld>
+  <p:clrMapOvr>
+    <a:masterClrMapping/>
+  </p:clrMapOvr>
+</p:notes>
+</file>
+
+<file path=ppt/notesSlides/notesSlide7.xml><?xml version="1.0" encoding="utf-8"?>
+<p:notes xmlns:a="http://schemas.openxmlformats.org/drawingml/2006/main" xmlns:r="http://schemas.openxmlformats.org/officeDocument/2006/relationships" xmlns:p="http://schemas.openxmlformats.org/presentationml/2006/main">
+  <p:cSld>
+    <p:spTree>
+      <p:nvGrpSpPr>
+        <p:cNvPr id="1" name=""/>
+        <p:cNvGrpSpPr/>
+        <p:nvPr/>
+      </p:nvGrpSpPr>
+      <p:grpSpPr>
+        <a:xfrm>
+          <a:off x="0" y="0"/>
+          <a:ext cx="0" cy="0"/>
+          <a:chOff x="0" y="0"/>
+          <a:chExt cx="0" cy="0"/>
+        </a:xfrm>
+      </p:grpSpPr>
+      <p:sp>
+        <p:nvSpPr>
+          <p:cNvPr id="2" name="Zástupný symbol pro obrázek snímku 1"/>
+          <p:cNvSpPr>
+            <a:spLocks noGrp="1" noRot="1" noChangeAspect="1"/>
+          </p:cNvSpPr>
+          <p:nvPr>
+            <p:ph type="sldImg"/>
+          </p:nvPr>
+        </p:nvSpPr>
+        <p:spPr/>
+      </p:sp>
+      <p:sp>
+        <p:nvSpPr>
+          <p:cNvPr id="3" name="Zástupný symbol pro poznámky 2"/>
+          <p:cNvSpPr>
+            <a:spLocks noGrp="1"/>
+          </p:cNvSpPr>
+          <p:nvPr>
+            <p:ph type="body" idx="1"/>
+          </p:nvPr>
+        </p:nvSpPr>
+        <p:spPr/>
+        <p:txBody>
+          <a:bodyPr/>
+          <a:lstStyle/>
+          <a:p>
+            <a:r>
+              <a:rPr lang="cs-CZ" dirty="0"/>
+              <a:t>DAT. TYP</a:t>
+            </a:r>
+          </a:p>
+          <a:p>
+            <a:r>
+              <a:rPr lang="en-US" dirty="0" err="1"/>
+              <a:t>INIcializacna</a:t>
+            </a:r>
+            <a:r>
+              <a:rPr lang="en-US" baseline="0" dirty="0"/>
+              <a:t> </a:t>
+            </a:r>
+            <a:r>
+              <a:rPr lang="en-US" baseline="0" dirty="0" err="1"/>
+              <a:t>hodnota</a:t>
+            </a:r>
+            <a:endParaRPr lang="en-US" baseline="0" dirty="0"/>
+          </a:p>
+          <a:p>
+            <a:endParaRPr lang="en-US" dirty="0"/>
+          </a:p>
+        </p:txBody>
+      </p:sp>
+      <p:sp>
+        <p:nvSpPr>
+          <p:cNvPr id="4" name="Zástupný symbol pro číslo snímku 3"/>
+          <p:cNvSpPr>
+            <a:spLocks noGrp="1"/>
+          </p:cNvSpPr>
+          <p:nvPr>
+            <p:ph type="sldNum" sz="quarter" idx="10"/>
+          </p:nvPr>
+        </p:nvSpPr>
+        <p:spPr/>
+        <p:txBody>
+          <a:bodyPr/>
+          <a:lstStyle/>
+          <a:p>
+            <a:fld id="{EE1BD250-9BF5-4AE8-86BD-080F3A22271A}" type="slidenum">
+              <a:rPr lang="cs-CZ" smtClean="0"/>
+              <a:t>9</a:t>
+            </a:fld>
+            <a:endParaRPr lang="cs-CZ" dirty="0"/>
+          </a:p>
+        </p:txBody>
+      </p:sp>
+    </p:spTree>
+    <p:extLst>
+      <p:ext uri="{BB962C8B-B14F-4D97-AF65-F5344CB8AC3E}">
+        <p14:creationId xmlns:p14="http://schemas.microsoft.com/office/powerpoint/2010/main" val="3913279026"/>
+      </p:ext>
+    </p:extLst>
+  </p:cSld>
+  <p:clrMapOvr>
+    <a:masterClrMapping/>
+  </p:clrMapOvr>
+</p:notes>
+</file>
+
+<file path=ppt/notesSlides/notesSlide8.xml><?xml version="1.0" encoding="utf-8"?>
+<p:notes xmlns:a="http://schemas.openxmlformats.org/drawingml/2006/main" xmlns:r="http://schemas.openxmlformats.org/officeDocument/2006/relationships" xmlns:p="http://schemas.openxmlformats.org/presentationml/2006/main">
+  <p:cSld>
+    <p:spTree>
+      <p:nvGrpSpPr>
+        <p:cNvPr id="1" name=""/>
+        <p:cNvGrpSpPr/>
+        <p:nvPr/>
+      </p:nvGrpSpPr>
+      <p:grpSpPr>
+        <a:xfrm>
+          <a:off x="0" y="0"/>
+          <a:ext cx="0" cy="0"/>
+          <a:chOff x="0" y="0"/>
+          <a:chExt cx="0" cy="0"/>
+        </a:xfrm>
+      </p:grpSpPr>
+      <p:sp>
+        <p:nvSpPr>
+          <p:cNvPr id="2" name="Zástupný symbol pro obrázek snímku 1"/>
+          <p:cNvSpPr>
+            <a:spLocks noGrp="1" noRot="1" noChangeAspect="1"/>
+          </p:cNvSpPr>
+          <p:nvPr>
+            <p:ph type="sldImg"/>
+          </p:nvPr>
+        </p:nvSpPr>
+        <p:spPr/>
+      </p:sp>
+      <p:sp>
+        <p:nvSpPr>
+          <p:cNvPr id="3" name="Zástupný symbol pro poznámky 2"/>
+          <p:cNvSpPr>
+            <a:spLocks noGrp="1"/>
+          </p:cNvSpPr>
+          <p:nvPr>
+            <p:ph type="body" idx="1"/>
+          </p:nvPr>
+        </p:nvSpPr>
+        <p:spPr/>
+        <p:txBody>
+          <a:bodyPr/>
+          <a:lstStyle/>
+          <a:p>
+            <a:pPr marL="0" marR="0" lvl="0" indent="0" algn="l" defTabSz="914400" rtl="0" eaLnBrk="1" fontAlgn="auto" latinLnBrk="0" hangingPunct="1">
+              <a:lnSpc>
+                <a:spcPct val="100000"/>
+              </a:lnSpc>
+              <a:spcBef>
+                <a:spcPts val="0"/>
+              </a:spcBef>
+              <a:spcAft>
+                <a:spcPts val="0"/>
+              </a:spcAft>
+              <a:buClrTx/>
+              <a:buSzTx/>
+              <a:buFontTx/>
+              <a:buNone/>
+              <a:tabLst/>
+              <a:defRPr/>
+            </a:pPr>
+            <a:r>
+              <a:rPr lang="cs-CZ" sz="1200" dirty="0"/>
+              <a:t>Celkem bylo implementováno na 300 testů</a:t>
+            </a:r>
+            <a:endParaRPr lang="cs-CZ" dirty="0"/>
+          </a:p>
+          <a:p>
+            <a:endParaRPr lang="cs-CZ" dirty="0"/>
+          </a:p>
+          <a:p>
+            <a:r>
+              <a:rPr lang="cs-CZ" dirty="0"/>
+              <a:t>300 testů, </a:t>
+            </a:r>
+            <a:r>
+              <a:rPr lang="cs-CZ" dirty="0" err="1"/>
+              <a:t>naze</a:t>
+            </a:r>
+            <a:r>
+              <a:rPr lang="cs-CZ" baseline="0" dirty="0" err="1"/>
+              <a:t>v</a:t>
+            </a:r>
+            <a:r>
+              <a:rPr lang="cs-CZ" baseline="0" dirty="0"/>
+              <a:t> testu, skript</a:t>
+            </a:r>
+            <a:endParaRPr lang="en-US" dirty="0"/>
+          </a:p>
+        </p:txBody>
+      </p:sp>
+      <p:sp>
+        <p:nvSpPr>
+          <p:cNvPr id="4" name="Zástupný symbol pro číslo snímku 3"/>
+          <p:cNvSpPr>
+            <a:spLocks noGrp="1"/>
+          </p:cNvSpPr>
+          <p:nvPr>
+            <p:ph type="sldNum" sz="quarter" idx="10"/>
+          </p:nvPr>
+        </p:nvSpPr>
+        <p:spPr/>
+        <p:txBody>
+          <a:bodyPr/>
+          <a:lstStyle/>
+          <a:p>
+            <a:fld id="{EE1BD250-9BF5-4AE8-86BD-080F3A22271A}" type="slidenum">
+              <a:rPr lang="cs-CZ" smtClean="0"/>
+              <a:t>13</a:t>
+            </a:fld>
+            <a:endParaRPr lang="cs-CZ" dirty="0"/>
+          </a:p>
+        </p:txBody>
+      </p:sp>
+    </p:spTree>
+    <p:extLst>
+      <p:ext uri="{BB962C8B-B14F-4D97-AF65-F5344CB8AC3E}">
+        <p14:creationId xmlns:p14="http://schemas.microsoft.com/office/powerpoint/2010/main" val="898889463"/>
+      </p:ext>
+    </p:extLst>
+  </p:cSld>
+  <p:clrMapOvr>
+    <a:masterClrMapping/>
+  </p:clrMapOvr>
+</p:notes>
+</file>
+
 <file path=ppt/slideLayouts/slideLayout1.xml><?xml version="1.0" encoding="utf-8"?>
 <p:sldLayout xmlns:a="http://schemas.openxmlformats.org/drawingml/2006/main" xmlns:r="http://schemas.openxmlformats.org/officeDocument/2006/relationships" xmlns:p="http://schemas.openxmlformats.org/presentationml/2006/main" type="title" preserve="1">
   <p:cSld name="Úvodní snímek">
@@ -686,7 +1561,7 @@
           <a:p>
             <a:fld id="{1F06EB26-DD9D-43B9-A8A9-BB5142A01BE2}" type="datetime8">
               <a:rPr lang="en-150" smtClean="0"/>
-              <a:t>14/11/2016 10:15</a:t>
+              <a:t>13/12/2016 10:26</a:t>
             </a:fld>
             <a:endParaRPr lang="en-150" dirty="0"/>
           </a:p>
@@ -908,7 +1783,7 @@
           <a:p>
             <a:fld id="{7307E821-782C-4746-9F61-64DDC0450AB3}" type="datetime8">
               <a:rPr lang="en-150" smtClean="0"/>
-              <a:t>14/11/2016 10:15</a:t>
+              <a:t>13/12/2016 10:26</a:t>
             </a:fld>
             <a:endParaRPr lang="en-150"/>
           </a:p>
@@ -1088,7 +1963,7 @@
           <a:p>
             <a:fld id="{D45B8E45-F186-418E-94E2-64E602834796}" type="datetime8">
               <a:rPr lang="en-150" smtClean="0"/>
-              <a:t>14/11/2016 10:15</a:t>
+              <a:t>13/12/2016 10:26</a:t>
             </a:fld>
             <a:endParaRPr lang="en-150"/>
           </a:p>
@@ -1710,7 +2585,7 @@
           <a:p>
             <a:fld id="{18F9EDC9-AFBA-4C40-9BB4-697BD56049CF}" type="datetime8">
               <a:rPr lang="en-150" smtClean="0"/>
-              <a:t>14/11/2016 10:15</a:t>
+              <a:t>13/12/2016 10:26</a:t>
             </a:fld>
             <a:endParaRPr lang="en-150"/>
           </a:p>
@@ -1967,7 +2842,7 @@
             <a:fld id="{68D751F2-C7E9-4775-BE8E-824CD7C75291}" type="datetime8">
               <a:rPr lang="en-150" smtClean="0"/>
               <a:pPr/>
-              <a:t>14/11/2016 10:15</a:t>
+              <a:t>13/12/2016 10:26</a:t>
             </a:fld>
             <a:endParaRPr lang="en-150"/>
           </a:p>
@@ -2216,7 +3091,7 @@
           <a:p>
             <a:fld id="{EA4320CA-C850-4386-BE30-5C4ED912B6EF}" type="datetime8">
               <a:rPr lang="en-150" smtClean="0"/>
-              <a:t>14/11/2016 10:15</a:t>
+              <a:t>13/12/2016 10:26</a:t>
             </a:fld>
             <a:endParaRPr lang="en-150"/>
           </a:p>
@@ -2583,7 +3458,7 @@
           <a:p>
             <a:fld id="{C01FE258-AD17-46FD-8C7C-4FA8CBA36D42}" type="datetime8">
               <a:rPr lang="en-150" smtClean="0"/>
-              <a:t>14/11/2016 10:15</a:t>
+              <a:t>13/12/2016 10:26</a:t>
             </a:fld>
             <a:endParaRPr lang="en-150"/>
           </a:p>
@@ -2701,7 +3576,7 @@
           <a:p>
             <a:fld id="{42A97EB4-EBEC-4FBE-BC73-CC4101237DB8}" type="datetime8">
               <a:rPr lang="en-150" smtClean="0"/>
-              <a:t>14/11/2016 10:15</a:t>
+              <a:t>13/12/2016 10:26</a:t>
             </a:fld>
             <a:endParaRPr lang="en-150"/>
           </a:p>
@@ -2796,7 +3671,7 @@
           <a:p>
             <a:fld id="{101E2C3B-894B-41C2-B150-6EB0A043C8AC}" type="datetime8">
               <a:rPr lang="en-150" smtClean="0"/>
-              <a:t>14/11/2016 10:15</a:t>
+              <a:t>13/12/2016 10:26</a:t>
             </a:fld>
             <a:endParaRPr lang="en-150"/>
           </a:p>
@@ -3073,7 +3948,7 @@
           <a:p>
             <a:fld id="{C5C22882-DBD6-438F-87B6-D3A6ED4BB9CB}" type="datetime8">
               <a:rPr lang="en-150" smtClean="0"/>
-              <a:t>14/11/2016 10:15</a:t>
+              <a:t>13/12/2016 10:26</a:t>
             </a:fld>
             <a:endParaRPr lang="en-150"/>
           </a:p>
@@ -3326,7 +4201,7 @@
           <a:p>
             <a:fld id="{8EC26B56-D89F-40C9-AF42-B521A92485B8}" type="datetime8">
               <a:rPr lang="en-150" smtClean="0"/>
-              <a:t>14/11/2016 10:15</a:t>
+              <a:t>13/12/2016 10:26</a:t>
             </a:fld>
             <a:endParaRPr lang="en-150"/>
           </a:p>
@@ -3633,7 +4508,7 @@
             <a:fld id="{52D9D283-C366-441B-913D-EA9C8D5A0C53}" type="datetime8">
               <a:rPr lang="en-150" smtClean="0"/>
               <a:pPr/>
-              <a:t>14/11/2016 10:15</a:t>
+              <a:t>13/12/2016 10:26</a:t>
             </a:fld>
             <a:endParaRPr lang="en-150" dirty="0"/>
           </a:p>
@@ -4567,6 +5442,813 @@
         <p:spPr/>
         <p:txBody>
           <a:bodyPr>
+            <a:normAutofit fontScale="90000"/>
+          </a:bodyPr>
+          <a:lstStyle/>
+          <a:p>
+            <a:r>
+              <a:rPr lang="cs-CZ" dirty="0"/>
+              <a:t>Skupinová implementace</a:t>
+            </a:r>
+            <a:endParaRPr lang="en-US" dirty="0"/>
+          </a:p>
+        </p:txBody>
+      </p:sp>
+      <p:sp>
+        <p:nvSpPr>
+          <p:cNvPr id="3" name="Zástupný symbol pro obsah 2"/>
+          <p:cNvSpPr>
+            <a:spLocks noGrp="1"/>
+          </p:cNvSpPr>
+          <p:nvPr>
+            <p:ph idx="1"/>
+          </p:nvPr>
+        </p:nvSpPr>
+        <p:spPr>
+          <a:xfrm>
+            <a:off x="323528" y="1268760"/>
+            <a:ext cx="2448272" cy="4908203"/>
+          </a:xfrm>
+        </p:spPr>
+        <p:txBody>
+          <a:bodyPr anchor="t">
+            <a:normAutofit/>
+          </a:bodyPr>
+          <a:lstStyle/>
+          <a:p>
+            <a:pPr>
+              <a:spcAft>
+                <a:spcPts val="2000"/>
+              </a:spcAft>
+            </a:pPr>
+            <a:r>
+              <a:rPr lang="cs-CZ" sz="2500" dirty="0" err="1"/>
+              <a:t>Verzovací</a:t>
+            </a:r>
+            <a:r>
+              <a:rPr lang="cs-CZ" sz="2500" dirty="0"/>
+              <a:t> systém </a:t>
+            </a:r>
+            <a:r>
+              <a:rPr lang="cs-CZ" sz="2500" b="1" dirty="0"/>
+              <a:t>Git</a:t>
+            </a:r>
+          </a:p>
+          <a:p>
+            <a:pPr>
+              <a:spcAft>
+                <a:spcPts val="2000"/>
+              </a:spcAft>
+            </a:pPr>
+            <a:r>
+              <a:rPr lang="cs-CZ" sz="2500" dirty="0"/>
+              <a:t>Online služba </a:t>
+            </a:r>
+            <a:r>
+              <a:rPr lang="cs-CZ" sz="2500" b="1" dirty="0" err="1"/>
+              <a:t>GitHub</a:t>
+            </a:r>
+            <a:endParaRPr lang="cs-CZ" sz="2500" b="1" dirty="0"/>
+          </a:p>
+          <a:p>
+            <a:pPr>
+              <a:spcAft>
+                <a:spcPts val="2000"/>
+              </a:spcAft>
+            </a:pPr>
+            <a:r>
+              <a:rPr lang="cs-CZ" sz="2500" dirty="0" err="1"/>
+              <a:t>Ticketovací</a:t>
+            </a:r>
+            <a:r>
+              <a:rPr lang="cs-CZ" sz="2500" dirty="0"/>
+              <a:t> systém</a:t>
+            </a:r>
+          </a:p>
+          <a:p>
+            <a:pPr>
+              <a:spcAft>
+                <a:spcPts val="2000"/>
+              </a:spcAft>
+            </a:pPr>
+            <a:r>
+              <a:rPr lang="cs-CZ" sz="2500" dirty="0"/>
+              <a:t> Komunikace skrze </a:t>
+            </a:r>
+            <a:r>
+              <a:rPr lang="cs-CZ" sz="2500" dirty="0" err="1"/>
+              <a:t>issues</a:t>
+            </a:r>
+            <a:r>
+              <a:rPr lang="cs-CZ" sz="2500" dirty="0"/>
+              <a:t> a messenger.com</a:t>
+            </a:r>
+          </a:p>
+          <a:p>
+            <a:endParaRPr lang="en-US" dirty="0"/>
+          </a:p>
+        </p:txBody>
+      </p:sp>
+      <p:sp>
+        <p:nvSpPr>
+          <p:cNvPr id="4" name="Zástupný symbol pro zápatí 3"/>
+          <p:cNvSpPr>
+            <a:spLocks noGrp="1"/>
+          </p:cNvSpPr>
+          <p:nvPr>
+            <p:ph type="ftr" sz="quarter" idx="11"/>
+          </p:nvPr>
+        </p:nvSpPr>
+        <p:spPr/>
+        <p:txBody>
+          <a:bodyPr/>
+          <a:lstStyle/>
+          <a:p>
+            <a:endParaRPr lang="en-150" dirty="0"/>
+          </a:p>
+        </p:txBody>
+      </p:sp>
+      <p:sp>
+        <p:nvSpPr>
+          <p:cNvPr id="5" name="Zástupný symbol pro číslo snímku 4"/>
+          <p:cNvSpPr>
+            <a:spLocks noGrp="1"/>
+          </p:cNvSpPr>
+          <p:nvPr>
+            <p:ph type="sldNum" sz="quarter" idx="12"/>
+          </p:nvPr>
+        </p:nvSpPr>
+        <p:spPr/>
+        <p:txBody>
+          <a:bodyPr/>
+          <a:lstStyle/>
+          <a:p>
+            <a:fld id="{35337AD5-3146-404F-9D87-4F437B499F8E}" type="slidenum">
+              <a:rPr lang="en-150" smtClean="0"/>
+              <a:t>10</a:t>
+            </a:fld>
+            <a:endParaRPr lang="en-150"/>
+          </a:p>
+        </p:txBody>
+      </p:sp>
+      <p:pic>
+        <p:nvPicPr>
+          <p:cNvPr id="6" name="Obrázek 5"/>
+          <p:cNvPicPr>
+            <a:picLocks noChangeAspect="1"/>
+          </p:cNvPicPr>
+          <p:nvPr/>
+        </p:nvPicPr>
+        <p:blipFill>
+          <a:blip r:embed="rId2"/>
+          <a:stretch>
+            <a:fillRect/>
+          </a:stretch>
+        </p:blipFill>
+        <p:spPr>
+          <a:xfrm>
+            <a:off x="2938239" y="764704"/>
+            <a:ext cx="6172954" cy="5586450"/>
+          </a:xfrm>
+          <a:prstGeom prst="rect">
+            <a:avLst/>
+          </a:prstGeom>
+        </p:spPr>
+      </p:pic>
+    </p:spTree>
+    <p:extLst>
+      <p:ext uri="{BB962C8B-B14F-4D97-AF65-F5344CB8AC3E}">
+        <p14:creationId xmlns:p14="http://schemas.microsoft.com/office/powerpoint/2010/main" val="3929085422"/>
+      </p:ext>
+    </p:extLst>
+  </p:cSld>
+  <p:clrMapOvr>
+    <a:masterClrMapping/>
+  </p:clrMapOvr>
+</p:sld>
+</file>
+
+<file path=ppt/slides/slide11.xml><?xml version="1.0" encoding="utf-8"?>
+<p:sld xmlns:a="http://schemas.openxmlformats.org/drawingml/2006/main" xmlns:r="http://schemas.openxmlformats.org/officeDocument/2006/relationships" xmlns:p="http://schemas.openxmlformats.org/presentationml/2006/main">
+  <p:cSld>
+    <p:spTree>
+      <p:nvGrpSpPr>
+        <p:cNvPr id="1" name=""/>
+        <p:cNvGrpSpPr/>
+        <p:nvPr/>
+      </p:nvGrpSpPr>
+      <p:grpSpPr>
+        <a:xfrm>
+          <a:off x="0" y="0"/>
+          <a:ext cx="0" cy="0"/>
+          <a:chOff x="0" y="0"/>
+          <a:chExt cx="0" cy="0"/>
+        </a:xfrm>
+      </p:grpSpPr>
+      <p:sp>
+        <p:nvSpPr>
+          <p:cNvPr id="2" name="Nadpis 1"/>
+          <p:cNvSpPr>
+            <a:spLocks noGrp="1"/>
+          </p:cNvSpPr>
+          <p:nvPr>
+            <p:ph type="title"/>
+          </p:nvPr>
+        </p:nvSpPr>
+        <p:spPr/>
+        <p:txBody>
+          <a:bodyPr>
+            <a:normAutofit fontScale="90000"/>
+          </a:bodyPr>
+          <a:lstStyle/>
+          <a:p>
+            <a:r>
+              <a:rPr lang="cs-CZ" dirty="0"/>
+              <a:t>Průběžná integrace</a:t>
+            </a:r>
+            <a:endParaRPr lang="en-US" dirty="0"/>
+          </a:p>
+        </p:txBody>
+      </p:sp>
+      <p:sp>
+        <p:nvSpPr>
+          <p:cNvPr id="3" name="Zástupný symbol pro obsah 2"/>
+          <p:cNvSpPr>
+            <a:spLocks noGrp="1"/>
+          </p:cNvSpPr>
+          <p:nvPr>
+            <p:ph idx="1"/>
+          </p:nvPr>
+        </p:nvSpPr>
+        <p:spPr/>
+        <p:txBody>
+          <a:bodyPr/>
+          <a:lstStyle/>
+          <a:p>
+            <a:r>
+              <a:rPr lang="cs-CZ" dirty="0"/>
+              <a:t>Přeložitelnost kódu pravidelně kontrolována na serveru</a:t>
+            </a:r>
+            <a:r>
+              <a:rPr lang="en-US" dirty="0"/>
+              <a:t> port</a:t>
+            </a:r>
+            <a:r>
+              <a:rPr lang="cs-CZ" dirty="0" err="1"/>
+              <a:t>álu</a:t>
+            </a:r>
+            <a:r>
+              <a:rPr lang="cs-CZ" dirty="0"/>
+              <a:t> travis.com</a:t>
+            </a:r>
+          </a:p>
+          <a:p>
+            <a:r>
+              <a:rPr lang="cs-CZ" dirty="0"/>
+              <a:t>Kontrola výpisu testů</a:t>
+            </a:r>
+          </a:p>
+          <a:p>
+            <a:endParaRPr lang="cs-CZ" dirty="0"/>
+          </a:p>
+          <a:p>
+            <a:endParaRPr lang="en-US" dirty="0"/>
+          </a:p>
+        </p:txBody>
+      </p:sp>
+      <p:sp>
+        <p:nvSpPr>
+          <p:cNvPr id="4" name="Zástupný symbol pro zápatí 3"/>
+          <p:cNvSpPr>
+            <a:spLocks noGrp="1"/>
+          </p:cNvSpPr>
+          <p:nvPr>
+            <p:ph type="ftr" sz="quarter" idx="11"/>
+          </p:nvPr>
+        </p:nvSpPr>
+        <p:spPr/>
+        <p:txBody>
+          <a:bodyPr/>
+          <a:lstStyle/>
+          <a:p>
+            <a:endParaRPr lang="en-150"/>
+          </a:p>
+        </p:txBody>
+      </p:sp>
+      <p:sp>
+        <p:nvSpPr>
+          <p:cNvPr id="5" name="Zástupný symbol pro číslo snímku 4"/>
+          <p:cNvSpPr>
+            <a:spLocks noGrp="1"/>
+          </p:cNvSpPr>
+          <p:nvPr>
+            <p:ph type="sldNum" sz="quarter" idx="12"/>
+          </p:nvPr>
+        </p:nvSpPr>
+        <p:spPr/>
+        <p:txBody>
+          <a:bodyPr/>
+          <a:lstStyle/>
+          <a:p>
+            <a:fld id="{35337AD5-3146-404F-9D87-4F437B499F8E}" type="slidenum">
+              <a:rPr lang="en-150" smtClean="0"/>
+              <a:t>11</a:t>
+            </a:fld>
+            <a:endParaRPr lang="en-150"/>
+          </a:p>
+        </p:txBody>
+      </p:sp>
+    </p:spTree>
+    <p:extLst>
+      <p:ext uri="{BB962C8B-B14F-4D97-AF65-F5344CB8AC3E}">
+        <p14:creationId xmlns:p14="http://schemas.microsoft.com/office/powerpoint/2010/main" val="467693782"/>
+      </p:ext>
+    </p:extLst>
+  </p:cSld>
+  <p:clrMapOvr>
+    <a:masterClrMapping/>
+  </p:clrMapOvr>
+</p:sld>
+</file>
+
+<file path=ppt/slides/slide12.xml><?xml version="1.0" encoding="utf-8"?>
+<p:sld xmlns:a="http://schemas.openxmlformats.org/drawingml/2006/main" xmlns:r="http://schemas.openxmlformats.org/officeDocument/2006/relationships" xmlns:p="http://schemas.openxmlformats.org/presentationml/2006/main">
+  <p:cSld>
+    <p:spTree>
+      <p:nvGrpSpPr>
+        <p:cNvPr id="1" name=""/>
+        <p:cNvGrpSpPr/>
+        <p:nvPr/>
+      </p:nvGrpSpPr>
+      <p:grpSpPr>
+        <a:xfrm>
+          <a:off x="0" y="0"/>
+          <a:ext cx="0" cy="0"/>
+          <a:chOff x="0" y="0"/>
+          <a:chExt cx="0" cy="0"/>
+        </a:xfrm>
+      </p:grpSpPr>
+      <p:sp>
+        <p:nvSpPr>
+          <p:cNvPr id="2" name="Nadpis 1"/>
+          <p:cNvSpPr>
+            <a:spLocks noGrp="1"/>
+          </p:cNvSpPr>
+          <p:nvPr>
+            <p:ph type="title"/>
+          </p:nvPr>
+        </p:nvSpPr>
+        <p:spPr/>
+        <p:txBody>
+          <a:bodyPr>
+            <a:normAutofit fontScale="90000"/>
+          </a:bodyPr>
+          <a:lstStyle/>
+          <a:p>
+            <a:r>
+              <a:rPr lang="en-US" dirty="0"/>
+              <a:t>Garbage collector</a:t>
+            </a:r>
+          </a:p>
+        </p:txBody>
+      </p:sp>
+      <p:sp>
+        <p:nvSpPr>
+          <p:cNvPr id="3" name="Zástupný symbol pro obsah 2"/>
+          <p:cNvSpPr>
+            <a:spLocks noGrp="1"/>
+          </p:cNvSpPr>
+          <p:nvPr>
+            <p:ph idx="1"/>
+          </p:nvPr>
+        </p:nvSpPr>
+        <p:spPr/>
+        <p:txBody>
+          <a:bodyPr/>
+          <a:lstStyle/>
+          <a:p>
+            <a:r>
+              <a:rPr lang="cs-CZ" dirty="0"/>
+              <a:t>Jednoduchý program pro automatickou správa paměti a usnadnění práce na projektu</a:t>
+            </a:r>
+          </a:p>
+          <a:p>
+            <a:r>
+              <a:rPr lang="cs-CZ" dirty="0"/>
+              <a:t>Implementace ve stylu oboustranně vázaného seznamu</a:t>
+            </a:r>
+          </a:p>
+          <a:p>
+            <a:r>
+              <a:rPr lang="cs-CZ" dirty="0"/>
+              <a:t>Využití funkcí:</a:t>
+            </a:r>
+          </a:p>
+          <a:p>
+            <a:pPr lvl="1"/>
+            <a:r>
+              <a:rPr lang="cs-CZ" sz="2300" dirty="0" err="1">
+                <a:latin typeface="Courier New" panose="02070309020205020404" pitchFamily="49" charset="0"/>
+                <a:cs typeface="Courier New" panose="02070309020205020404" pitchFamily="49" charset="0"/>
+              </a:rPr>
+              <a:t>gc</a:t>
+            </a:r>
+            <a:r>
+              <a:rPr lang="en-US" sz="2300" dirty="0">
+                <a:latin typeface="Courier New" panose="02070309020205020404" pitchFamily="49" charset="0"/>
+                <a:cs typeface="Courier New" panose="02070309020205020404" pitchFamily="49" charset="0"/>
+              </a:rPr>
+              <a:t>_</a:t>
+            </a:r>
+            <a:r>
+              <a:rPr lang="en-US" sz="2300" dirty="0" err="1">
+                <a:latin typeface="Courier New" panose="02070309020205020404" pitchFamily="49" charset="0"/>
+                <a:cs typeface="Courier New" panose="02070309020205020404" pitchFamily="49" charset="0"/>
+              </a:rPr>
+              <a:t>init</a:t>
+            </a:r>
+            <a:r>
+              <a:rPr lang="en-US" sz="2300" dirty="0">
+                <a:latin typeface="Courier New" panose="02070309020205020404" pitchFamily="49" charset="0"/>
+                <a:cs typeface="Courier New" panose="02070309020205020404" pitchFamily="49" charset="0"/>
+              </a:rPr>
+              <a:t>();</a:t>
+            </a:r>
+          </a:p>
+          <a:p>
+            <a:pPr lvl="1"/>
+            <a:r>
+              <a:rPr lang="en-US" sz="2300" dirty="0" err="1">
+                <a:latin typeface="Courier New" panose="02070309020205020404" pitchFamily="49" charset="0"/>
+                <a:cs typeface="Courier New" panose="02070309020205020404" pitchFamily="49" charset="0"/>
+              </a:rPr>
+              <a:t>gc_alloc</a:t>
+            </a:r>
+            <a:r>
+              <a:rPr lang="en-US" sz="2300" dirty="0">
+                <a:latin typeface="Courier New" panose="02070309020205020404" pitchFamily="49" charset="0"/>
+                <a:cs typeface="Courier New" panose="02070309020205020404" pitchFamily="49" charset="0"/>
+              </a:rPr>
+              <a:t>();</a:t>
+            </a:r>
+          </a:p>
+          <a:p>
+            <a:pPr lvl="1"/>
+            <a:r>
+              <a:rPr lang="en-US" sz="2300" dirty="0" err="1">
+                <a:latin typeface="Courier New" panose="02070309020205020404" pitchFamily="49" charset="0"/>
+                <a:cs typeface="Courier New" panose="02070309020205020404" pitchFamily="49" charset="0"/>
+              </a:rPr>
+              <a:t>gc_realloc</a:t>
+            </a:r>
+            <a:r>
+              <a:rPr lang="en-US" sz="2300" dirty="0">
+                <a:latin typeface="Courier New" panose="02070309020205020404" pitchFamily="49" charset="0"/>
+                <a:cs typeface="Courier New" panose="02070309020205020404" pitchFamily="49" charset="0"/>
+              </a:rPr>
+              <a:t>();</a:t>
+            </a:r>
+          </a:p>
+          <a:p>
+            <a:pPr lvl="1"/>
+            <a:r>
+              <a:rPr lang="en-US" sz="2300" dirty="0" err="1">
+                <a:latin typeface="Courier New" panose="02070309020205020404" pitchFamily="49" charset="0"/>
+                <a:cs typeface="Courier New" panose="02070309020205020404" pitchFamily="49" charset="0"/>
+              </a:rPr>
+              <a:t>gc_free</a:t>
+            </a:r>
+            <a:r>
+              <a:rPr lang="en-US" sz="2300" dirty="0">
+                <a:latin typeface="Courier New" panose="02070309020205020404" pitchFamily="49" charset="0"/>
+                <a:cs typeface="Courier New" panose="02070309020205020404" pitchFamily="49" charset="0"/>
+              </a:rPr>
+              <a:t>();</a:t>
+            </a:r>
+            <a:endParaRPr lang="cs-CZ" sz="2300" dirty="0">
+              <a:latin typeface="Courier New" panose="02070309020205020404" pitchFamily="49" charset="0"/>
+              <a:cs typeface="Courier New" panose="02070309020205020404" pitchFamily="49" charset="0"/>
+            </a:endParaRPr>
+          </a:p>
+          <a:p>
+            <a:pPr lvl="1"/>
+            <a:endParaRPr lang="en-US" dirty="0"/>
+          </a:p>
+        </p:txBody>
+      </p:sp>
+      <p:sp>
+        <p:nvSpPr>
+          <p:cNvPr id="4" name="Zástupný symbol pro zápatí 3"/>
+          <p:cNvSpPr>
+            <a:spLocks noGrp="1"/>
+          </p:cNvSpPr>
+          <p:nvPr>
+            <p:ph type="ftr" sz="quarter" idx="11"/>
+          </p:nvPr>
+        </p:nvSpPr>
+        <p:spPr/>
+        <p:txBody>
+          <a:bodyPr/>
+          <a:lstStyle/>
+          <a:p>
+            <a:endParaRPr lang="en-150"/>
+          </a:p>
+        </p:txBody>
+      </p:sp>
+      <p:sp>
+        <p:nvSpPr>
+          <p:cNvPr id="5" name="Zástupný symbol pro číslo snímku 4"/>
+          <p:cNvSpPr>
+            <a:spLocks noGrp="1"/>
+          </p:cNvSpPr>
+          <p:nvPr>
+            <p:ph type="sldNum" sz="quarter" idx="12"/>
+          </p:nvPr>
+        </p:nvSpPr>
+        <p:spPr/>
+        <p:txBody>
+          <a:bodyPr/>
+          <a:lstStyle/>
+          <a:p>
+            <a:fld id="{35337AD5-3146-404F-9D87-4F437B499F8E}" type="slidenum">
+              <a:rPr lang="en-150" smtClean="0"/>
+              <a:t>12</a:t>
+            </a:fld>
+            <a:endParaRPr lang="en-150"/>
+          </a:p>
+        </p:txBody>
+      </p:sp>
+    </p:spTree>
+    <p:extLst>
+      <p:ext uri="{BB962C8B-B14F-4D97-AF65-F5344CB8AC3E}">
+        <p14:creationId xmlns:p14="http://schemas.microsoft.com/office/powerpoint/2010/main" val="2837999222"/>
+      </p:ext>
+    </p:extLst>
+  </p:cSld>
+  <p:clrMapOvr>
+    <a:masterClrMapping/>
+  </p:clrMapOvr>
+</p:sld>
+</file>
+
+<file path=ppt/slides/slide13.xml><?xml version="1.0" encoding="utf-8"?>
+<p:sld xmlns:a="http://schemas.openxmlformats.org/drawingml/2006/main" xmlns:r="http://schemas.openxmlformats.org/officeDocument/2006/relationships" xmlns:p="http://schemas.openxmlformats.org/presentationml/2006/main">
+  <p:cSld>
+    <p:spTree>
+      <p:nvGrpSpPr>
+        <p:cNvPr id="1" name=""/>
+        <p:cNvGrpSpPr/>
+        <p:nvPr/>
+      </p:nvGrpSpPr>
+      <p:grpSpPr>
+        <a:xfrm>
+          <a:off x="0" y="0"/>
+          <a:ext cx="0" cy="0"/>
+          <a:chOff x="0" y="0"/>
+          <a:chExt cx="0" cy="0"/>
+        </a:xfrm>
+      </p:grpSpPr>
+      <p:sp>
+        <p:nvSpPr>
+          <p:cNvPr id="2" name="Nadpis 1"/>
+          <p:cNvSpPr>
+            <a:spLocks noGrp="1"/>
+          </p:cNvSpPr>
+          <p:nvPr>
+            <p:ph type="title"/>
+          </p:nvPr>
+        </p:nvSpPr>
+        <p:spPr/>
+        <p:txBody>
+          <a:bodyPr>
+            <a:normAutofit fontScale="90000"/>
+          </a:bodyPr>
+          <a:lstStyle/>
+          <a:p>
+            <a:r>
+              <a:rPr lang="cs-CZ" dirty="0"/>
+              <a:t>Celkové testování</a:t>
+            </a:r>
+            <a:endParaRPr lang="en-US" dirty="0"/>
+          </a:p>
+        </p:txBody>
+      </p:sp>
+      <p:sp>
+        <p:nvSpPr>
+          <p:cNvPr id="3" name="Zástupný symbol pro obsah 2"/>
+          <p:cNvSpPr>
+            <a:spLocks noGrp="1"/>
+          </p:cNvSpPr>
+          <p:nvPr>
+            <p:ph idx="1"/>
+          </p:nvPr>
+        </p:nvSpPr>
+        <p:spPr>
+          <a:xfrm>
+            <a:off x="323528" y="924469"/>
+            <a:ext cx="8568952" cy="3709056"/>
+          </a:xfrm>
+        </p:spPr>
+        <p:txBody>
+          <a:bodyPr/>
+          <a:lstStyle/>
+          <a:p>
+            <a:r>
+              <a:rPr lang="cs-CZ" b="1" dirty="0">
+                <a:solidFill>
+                  <a:schemeClr val="tx2">
+                    <a:lumMod val="50000"/>
+                  </a:schemeClr>
+                </a:solidFill>
+              </a:rPr>
+              <a:t>Unit testy</a:t>
+            </a:r>
+          </a:p>
+          <a:p>
+            <a:pPr lvl="1"/>
+            <a:r>
+              <a:rPr lang="cs-CZ" dirty="0"/>
+              <a:t>Vyhledávání podřetězce</a:t>
+            </a:r>
+          </a:p>
+          <a:p>
+            <a:pPr lvl="1"/>
+            <a:r>
+              <a:rPr lang="cs-CZ" dirty="0"/>
+              <a:t>Řazení</a:t>
+            </a:r>
+          </a:p>
+          <a:p>
+            <a:pPr lvl="1"/>
+            <a:r>
+              <a:rPr lang="cs-CZ" dirty="0"/>
+              <a:t>Tvorba binárního stromu</a:t>
+            </a:r>
+          </a:p>
+          <a:p>
+            <a:pPr lvl="1"/>
+            <a:r>
+              <a:rPr lang="cs-CZ" dirty="0"/>
+              <a:t>Zpracování výrazů</a:t>
+            </a:r>
+          </a:p>
+          <a:p>
+            <a:r>
+              <a:rPr lang="cs-CZ" b="1" dirty="0">
+                <a:solidFill>
+                  <a:schemeClr val="tx2">
+                    <a:lumMod val="50000"/>
+                  </a:schemeClr>
+                </a:solidFill>
+              </a:rPr>
+              <a:t>Systémové testy</a:t>
+            </a:r>
+          </a:p>
+          <a:p>
+            <a:pPr lvl="1"/>
+            <a:r>
+              <a:rPr lang="cs-CZ" dirty="0"/>
+              <a:t>Spouštění skriptem s kontrolou výstupu Javy SE 8</a:t>
+            </a:r>
+          </a:p>
+          <a:p>
+            <a:pPr lvl="2"/>
+            <a:r>
+              <a:rPr lang="en-US" i="1" dirty="0"/>
+              <a:t>návratovýKód_názevProgramu.ifj16</a:t>
+            </a:r>
+            <a:endParaRPr lang="cs-CZ" i="1" dirty="0"/>
+          </a:p>
+          <a:p>
+            <a:pPr lvl="2"/>
+            <a:r>
+              <a:rPr lang="en-US" i="1" dirty="0" err="1"/>
+              <a:t>návratovýKód_názevProgramu.i</a:t>
+            </a:r>
+            <a:r>
+              <a:rPr lang="cs-CZ" i="1" dirty="0"/>
+              <a:t>n</a:t>
+            </a:r>
+          </a:p>
+          <a:p>
+            <a:pPr lvl="2"/>
+            <a:endParaRPr lang="cs-CZ" i="1" dirty="0"/>
+          </a:p>
+          <a:p>
+            <a:pPr lvl="2"/>
+            <a:endParaRPr lang="cs-CZ" i="1" dirty="0"/>
+          </a:p>
+        </p:txBody>
+      </p:sp>
+      <p:sp>
+        <p:nvSpPr>
+          <p:cNvPr id="4" name="Zástupný symbol pro zápatí 3"/>
+          <p:cNvSpPr>
+            <a:spLocks noGrp="1"/>
+          </p:cNvSpPr>
+          <p:nvPr>
+            <p:ph type="ftr" sz="quarter" idx="11"/>
+          </p:nvPr>
+        </p:nvSpPr>
+        <p:spPr/>
+        <p:txBody>
+          <a:bodyPr/>
+          <a:lstStyle/>
+          <a:p>
+            <a:endParaRPr lang="en-150"/>
+          </a:p>
+        </p:txBody>
+      </p:sp>
+      <p:sp>
+        <p:nvSpPr>
+          <p:cNvPr id="5" name="Zástupný symbol pro číslo snímku 4"/>
+          <p:cNvSpPr>
+            <a:spLocks noGrp="1"/>
+          </p:cNvSpPr>
+          <p:nvPr>
+            <p:ph type="sldNum" sz="quarter" idx="12"/>
+          </p:nvPr>
+        </p:nvSpPr>
+        <p:spPr/>
+        <p:txBody>
+          <a:bodyPr/>
+          <a:lstStyle/>
+          <a:p>
+            <a:fld id="{35337AD5-3146-404F-9D87-4F437B499F8E}" type="slidenum">
+              <a:rPr lang="en-150" smtClean="0"/>
+              <a:t>13</a:t>
+            </a:fld>
+            <a:endParaRPr lang="en-150"/>
+          </a:p>
+        </p:txBody>
+      </p:sp>
+      <p:pic>
+        <p:nvPicPr>
+          <p:cNvPr id="7" name="Obrázek 6"/>
+          <p:cNvPicPr>
+            <a:picLocks noChangeAspect="1"/>
+          </p:cNvPicPr>
+          <p:nvPr/>
+        </p:nvPicPr>
+        <p:blipFill>
+          <a:blip r:embed="rId3"/>
+          <a:stretch>
+            <a:fillRect/>
+          </a:stretch>
+        </p:blipFill>
+        <p:spPr>
+          <a:xfrm>
+            <a:off x="978995" y="4725144"/>
+            <a:ext cx="7409429" cy="1553854"/>
+          </a:xfrm>
+          <a:prstGeom prst="rect">
+            <a:avLst/>
+          </a:prstGeom>
+        </p:spPr>
+      </p:pic>
+    </p:spTree>
+    <p:extLst>
+      <p:ext uri="{BB962C8B-B14F-4D97-AF65-F5344CB8AC3E}">
+        <p14:creationId xmlns:p14="http://schemas.microsoft.com/office/powerpoint/2010/main" val="1854947059"/>
+      </p:ext>
+    </p:extLst>
+  </p:cSld>
+  <p:clrMapOvr>
+    <a:masterClrMapping/>
+  </p:clrMapOvr>
+</p:sld>
+</file>
+
+<file path=ppt/slides/slide14.xml><?xml version="1.0" encoding="utf-8"?>
+<p:sld xmlns:a="http://schemas.openxmlformats.org/drawingml/2006/main" xmlns:r="http://schemas.openxmlformats.org/officeDocument/2006/relationships" xmlns:p="http://schemas.openxmlformats.org/presentationml/2006/main">
+  <p:cSld>
+    <p:spTree>
+      <p:nvGrpSpPr>
+        <p:cNvPr id="1" name=""/>
+        <p:cNvGrpSpPr/>
+        <p:nvPr/>
+      </p:nvGrpSpPr>
+      <p:grpSpPr>
+        <a:xfrm>
+          <a:off x="0" y="0"/>
+          <a:ext cx="0" cy="0"/>
+          <a:chOff x="0" y="0"/>
+          <a:chExt cx="0" cy="0"/>
+        </a:xfrm>
+      </p:grpSpPr>
+      <p:sp>
+        <p:nvSpPr>
+          <p:cNvPr id="2" name="Nadpis 1"/>
+          <p:cNvSpPr>
+            <a:spLocks noGrp="1"/>
+          </p:cNvSpPr>
+          <p:nvPr>
+            <p:ph type="title"/>
+          </p:nvPr>
+        </p:nvSpPr>
+        <p:spPr/>
+        <p:txBody>
+          <a:bodyPr>
             <a:normAutofit/>
           </a:bodyPr>
           <a:lstStyle/>
@@ -4627,8 +6309,8 @@
           <a:lstStyle/>
           <a:p>
             <a:r>
-              <a:rPr lang="en-US" dirty="0"/>
-              <a:t>Obsah</a:t>
+              <a:rPr lang="cs-CZ" dirty="0"/>
+              <a:t>Blokové schéma programu</a:t>
             </a:r>
             <a:endParaRPr lang="en-150" dirty="0"/>
           </a:p>
@@ -4644,42 +6326,19 @@
             <p:ph idx="1"/>
           </p:nvPr>
         </p:nvSpPr>
-        <p:spPr/>
-        <p:txBody>
-          <a:bodyPr/>
-          <a:lstStyle/>
-          <a:p>
-            <a:r>
-              <a:rPr lang="en-US" sz="3200" dirty="0"/>
-              <a:t>Struktura interpret</a:t>
-            </a:r>
-          </a:p>
-          <a:p>
-            <a:pPr lvl="1"/>
-            <a:r>
-              <a:rPr lang="en-US" sz="2800" dirty="0"/>
-              <a:t>Scanner</a:t>
-            </a:r>
-          </a:p>
-          <a:p>
-            <a:pPr lvl="1"/>
-            <a:r>
-              <a:rPr lang="en-US" sz="2800" dirty="0"/>
-              <a:t>Parser</a:t>
-            </a:r>
-          </a:p>
-          <a:p>
-            <a:pPr lvl="1"/>
-            <a:r>
-              <a:rPr lang="en-US" sz="2800" dirty="0"/>
-              <a:t>Interpret</a:t>
-            </a:r>
-          </a:p>
-          <a:p>
-            <a:r>
-              <a:rPr lang="en-US" sz="3200" dirty="0"/>
-              <a:t>Algoritmy</a:t>
-            </a:r>
+        <p:spPr>
+          <a:xfrm>
+            <a:off x="323528" y="5733256"/>
+            <a:ext cx="8568952" cy="443707"/>
+          </a:xfrm>
+        </p:spPr>
+        <p:txBody>
+          <a:bodyPr>
+            <a:normAutofit fontScale="92500" lnSpcReduction="20000"/>
+          </a:bodyPr>
+          <a:lstStyle/>
+          <a:p>
+            <a:endParaRPr lang="en-US" sz="3200" dirty="0"/>
           </a:p>
         </p:txBody>
       </p:sp>
@@ -4725,6 +6384,489 @@
           </a:p>
         </p:txBody>
       </p:sp>
+      <p:sp>
+        <p:nvSpPr>
+          <p:cNvPr id="6" name="Obdélník 5"/>
+          <p:cNvSpPr/>
+          <p:nvPr/>
+        </p:nvSpPr>
+        <p:spPr>
+          <a:xfrm>
+            <a:off x="2771800" y="1743673"/>
+            <a:ext cx="2016224" cy="1308217"/>
+          </a:xfrm>
+          <a:prstGeom prst="rect">
+            <a:avLst/>
+          </a:prstGeom>
+        </p:spPr>
+        <p:style>
+          <a:lnRef idx="2">
+            <a:schemeClr val="accent6">
+              <a:shade val="50000"/>
+            </a:schemeClr>
+          </a:lnRef>
+          <a:fillRef idx="1">
+            <a:schemeClr val="accent6"/>
+          </a:fillRef>
+          <a:effectRef idx="0">
+            <a:schemeClr val="accent6"/>
+          </a:effectRef>
+          <a:fontRef idx="minor">
+            <a:schemeClr val="lt1"/>
+          </a:fontRef>
+        </p:style>
+        <p:txBody>
+          <a:bodyPr rtlCol="0" anchor="ctr"/>
+          <a:lstStyle/>
+          <a:p>
+            <a:pPr algn="ctr"/>
+            <a:r>
+              <a:rPr lang="en-US" dirty="0" err="1"/>
+              <a:t>Lexik</a:t>
+            </a:r>
+            <a:r>
+              <a:rPr lang="cs-CZ" dirty="0" err="1"/>
+              <a:t>ální</a:t>
+            </a:r>
+            <a:r>
+              <a:rPr lang="cs-CZ" dirty="0"/>
+              <a:t> analýza</a:t>
+            </a:r>
+            <a:endParaRPr lang="en-US" dirty="0"/>
+          </a:p>
+        </p:txBody>
+      </p:sp>
+      <p:sp>
+        <p:nvSpPr>
+          <p:cNvPr id="7" name="Obdélník 6"/>
+          <p:cNvSpPr/>
+          <p:nvPr/>
+        </p:nvSpPr>
+        <p:spPr>
+          <a:xfrm>
+            <a:off x="5652120" y="1569690"/>
+            <a:ext cx="2448272" cy="1656184"/>
+          </a:xfrm>
+          <a:prstGeom prst="rect">
+            <a:avLst/>
+          </a:prstGeom>
+        </p:spPr>
+        <p:style>
+          <a:lnRef idx="2">
+            <a:schemeClr val="accent4">
+              <a:shade val="50000"/>
+            </a:schemeClr>
+          </a:lnRef>
+          <a:fillRef idx="1">
+            <a:schemeClr val="accent4"/>
+          </a:fillRef>
+          <a:effectRef idx="0">
+            <a:schemeClr val="accent4"/>
+          </a:effectRef>
+          <a:fontRef idx="minor">
+            <a:schemeClr val="lt1"/>
+          </a:fontRef>
+        </p:style>
+        <p:txBody>
+          <a:bodyPr rtlCol="0" anchor="ctr"/>
+          <a:lstStyle/>
+          <a:p>
+            <a:pPr algn="ctr"/>
+            <a:r>
+              <a:rPr lang="cs-CZ" dirty="0"/>
+              <a:t>Syntaktická analýza</a:t>
+            </a:r>
+          </a:p>
+          <a:p>
+            <a:pPr algn="ctr"/>
+            <a:endParaRPr lang="cs-CZ" dirty="0"/>
+          </a:p>
+          <a:p>
+            <a:pPr algn="ctr"/>
+            <a:endParaRPr lang="cs-CZ" dirty="0"/>
+          </a:p>
+          <a:p>
+            <a:pPr algn="ctr"/>
+            <a:endParaRPr lang="en-US" dirty="0"/>
+          </a:p>
+        </p:txBody>
+      </p:sp>
+      <p:sp>
+        <p:nvSpPr>
+          <p:cNvPr id="8" name="Obdélník 7"/>
+          <p:cNvSpPr/>
+          <p:nvPr/>
+        </p:nvSpPr>
+        <p:spPr>
+          <a:xfrm>
+            <a:off x="5652120" y="3742003"/>
+            <a:ext cx="2448272" cy="1656184"/>
+          </a:xfrm>
+          <a:prstGeom prst="rect">
+            <a:avLst/>
+          </a:prstGeom>
+        </p:spPr>
+        <p:style>
+          <a:lnRef idx="2">
+            <a:schemeClr val="accent1">
+              <a:shade val="50000"/>
+            </a:schemeClr>
+          </a:lnRef>
+          <a:fillRef idx="1">
+            <a:schemeClr val="accent1"/>
+          </a:fillRef>
+          <a:effectRef idx="0">
+            <a:schemeClr val="accent1"/>
+          </a:effectRef>
+          <a:fontRef idx="minor">
+            <a:schemeClr val="lt1"/>
+          </a:fontRef>
+        </p:style>
+        <p:txBody>
+          <a:bodyPr rtlCol="0" anchor="ctr"/>
+          <a:lstStyle/>
+          <a:p>
+            <a:pPr algn="ctr"/>
+            <a:endParaRPr lang="cs-CZ" dirty="0"/>
+          </a:p>
+          <a:p>
+            <a:pPr algn="ctr"/>
+            <a:endParaRPr lang="cs-CZ" dirty="0"/>
+          </a:p>
+          <a:p>
+            <a:pPr algn="ctr"/>
+            <a:endParaRPr lang="cs-CZ" dirty="0"/>
+          </a:p>
+          <a:p>
+            <a:pPr algn="ctr"/>
+            <a:r>
+              <a:rPr lang="cs-CZ" dirty="0"/>
+              <a:t>Interpret</a:t>
+            </a:r>
+            <a:endParaRPr lang="en-US" dirty="0"/>
+          </a:p>
+        </p:txBody>
+      </p:sp>
+      <p:cxnSp>
+        <p:nvCxnSpPr>
+          <p:cNvPr id="10" name="Přímá spojnice se šipkou 9"/>
+          <p:cNvCxnSpPr>
+            <a:endCxn id="7" idx="1"/>
+          </p:cNvCxnSpPr>
+          <p:nvPr/>
+        </p:nvCxnSpPr>
+        <p:spPr>
+          <a:xfrm>
+            <a:off x="4788024" y="2397782"/>
+            <a:ext cx="864096" cy="0"/>
+          </a:xfrm>
+          <a:prstGeom prst="straightConnector1">
+            <a:avLst/>
+          </a:prstGeom>
+          <a:ln w="28575">
+            <a:headEnd type="none" w="med" len="med"/>
+            <a:tailEnd type="arrow" w="med" len="med"/>
+          </a:ln>
+        </p:spPr>
+        <p:style>
+          <a:lnRef idx="3">
+            <a:schemeClr val="dk1"/>
+          </a:lnRef>
+          <a:fillRef idx="0">
+            <a:schemeClr val="dk1"/>
+          </a:fillRef>
+          <a:effectRef idx="2">
+            <a:schemeClr val="dk1"/>
+          </a:effectRef>
+          <a:fontRef idx="minor">
+            <a:schemeClr val="tx1"/>
+          </a:fontRef>
+        </p:style>
+      </p:cxnSp>
+      <p:sp>
+        <p:nvSpPr>
+          <p:cNvPr id="14" name="Obdélník 13"/>
+          <p:cNvSpPr/>
+          <p:nvPr/>
+        </p:nvSpPr>
+        <p:spPr>
+          <a:xfrm>
+            <a:off x="6209414" y="2407761"/>
+            <a:ext cx="1881773" cy="820844"/>
+          </a:xfrm>
+          <a:prstGeom prst="rect">
+            <a:avLst/>
+          </a:prstGeom>
+        </p:spPr>
+        <p:style>
+          <a:lnRef idx="2">
+            <a:schemeClr val="accent2">
+              <a:shade val="50000"/>
+            </a:schemeClr>
+          </a:lnRef>
+          <a:fillRef idx="1">
+            <a:schemeClr val="accent2"/>
+          </a:fillRef>
+          <a:effectRef idx="0">
+            <a:schemeClr val="accent2"/>
+          </a:effectRef>
+          <a:fontRef idx="minor">
+            <a:schemeClr val="lt1"/>
+          </a:fontRef>
+        </p:style>
+        <p:txBody>
+          <a:bodyPr rtlCol="0" anchor="ctr"/>
+          <a:lstStyle/>
+          <a:p>
+            <a:pPr algn="ctr"/>
+            <a:r>
+              <a:rPr lang="cs-CZ" sz="1600" dirty="0"/>
+              <a:t>Precedenční syn. analýza výrazů</a:t>
+            </a:r>
+            <a:endParaRPr lang="en-US" sz="1600" dirty="0"/>
+          </a:p>
+        </p:txBody>
+      </p:sp>
+      <p:cxnSp>
+        <p:nvCxnSpPr>
+          <p:cNvPr id="15" name="Přímá spojnice se šipkou 14"/>
+          <p:cNvCxnSpPr/>
+          <p:nvPr/>
+        </p:nvCxnSpPr>
+        <p:spPr>
+          <a:xfrm>
+            <a:off x="5952344" y="3225874"/>
+            <a:ext cx="0" cy="516129"/>
+          </a:xfrm>
+          <a:prstGeom prst="straightConnector1">
+            <a:avLst/>
+          </a:prstGeom>
+          <a:ln w="28575">
+            <a:headEnd type="none" w="med" len="med"/>
+            <a:tailEnd type="arrow" w="med" len="med"/>
+          </a:ln>
+        </p:spPr>
+        <p:style>
+          <a:lnRef idx="3">
+            <a:schemeClr val="dk1"/>
+          </a:lnRef>
+          <a:fillRef idx="0">
+            <a:schemeClr val="dk1"/>
+          </a:fillRef>
+          <a:effectRef idx="2">
+            <a:schemeClr val="dk1"/>
+          </a:effectRef>
+          <a:fontRef idx="minor">
+            <a:schemeClr val="tx1"/>
+          </a:fontRef>
+        </p:style>
+      </p:cxnSp>
+      <p:sp>
+        <p:nvSpPr>
+          <p:cNvPr id="18" name="Obdélník 17"/>
+          <p:cNvSpPr/>
+          <p:nvPr/>
+        </p:nvSpPr>
+        <p:spPr>
+          <a:xfrm>
+            <a:off x="6209413" y="3751465"/>
+            <a:ext cx="1884881" cy="863750"/>
+          </a:xfrm>
+          <a:prstGeom prst="rect">
+            <a:avLst/>
+          </a:prstGeom>
+          <a:solidFill>
+            <a:srgbClr val="8439BD"/>
+          </a:solidFill>
+          <a:ln>
+            <a:solidFill>
+              <a:srgbClr val="7030A0"/>
+            </a:solidFill>
+          </a:ln>
+        </p:spPr>
+        <p:style>
+          <a:lnRef idx="2">
+            <a:schemeClr val="accent1">
+              <a:shade val="50000"/>
+            </a:schemeClr>
+          </a:lnRef>
+          <a:fillRef idx="1">
+            <a:schemeClr val="accent1"/>
+          </a:fillRef>
+          <a:effectRef idx="0">
+            <a:schemeClr val="accent1"/>
+          </a:effectRef>
+          <a:fontRef idx="minor">
+            <a:schemeClr val="lt1"/>
+          </a:fontRef>
+        </p:style>
+        <p:txBody>
+          <a:bodyPr rtlCol="0" anchor="ctr"/>
+          <a:lstStyle/>
+          <a:p>
+            <a:pPr algn="ctr"/>
+            <a:r>
+              <a:rPr lang="cs-CZ" sz="1600" dirty="0"/>
+              <a:t>Sémantická analýza</a:t>
+            </a:r>
+            <a:endParaRPr lang="en-US" sz="1600" dirty="0"/>
+          </a:p>
+        </p:txBody>
+      </p:sp>
+      <p:sp>
+        <p:nvSpPr>
+          <p:cNvPr id="20" name="Obdélník s odříznutým jedním rohem 19"/>
+          <p:cNvSpPr/>
+          <p:nvPr/>
+        </p:nvSpPr>
+        <p:spPr>
+          <a:xfrm>
+            <a:off x="851963" y="1954087"/>
+            <a:ext cx="1436516" cy="864096"/>
+          </a:xfrm>
+          <a:prstGeom prst="snip1Rect">
+            <a:avLst/>
+          </a:prstGeom>
+        </p:spPr>
+        <p:style>
+          <a:lnRef idx="2">
+            <a:schemeClr val="dk1"/>
+          </a:lnRef>
+          <a:fillRef idx="1">
+            <a:schemeClr val="lt1"/>
+          </a:fillRef>
+          <a:effectRef idx="0">
+            <a:schemeClr val="dk1"/>
+          </a:effectRef>
+          <a:fontRef idx="minor">
+            <a:schemeClr val="dk1"/>
+          </a:fontRef>
+        </p:style>
+        <p:txBody>
+          <a:bodyPr rtlCol="0" anchor="ctr"/>
+          <a:lstStyle/>
+          <a:p>
+            <a:pPr algn="ctr"/>
+            <a:r>
+              <a:rPr lang="cs-CZ" dirty="0"/>
+              <a:t>Vstupní soubor</a:t>
+            </a:r>
+            <a:endParaRPr lang="en-US" dirty="0"/>
+          </a:p>
+        </p:txBody>
+      </p:sp>
+      <p:cxnSp>
+        <p:nvCxnSpPr>
+          <p:cNvPr id="24" name="Přímá spojnice se šipkou 23"/>
+          <p:cNvCxnSpPr/>
+          <p:nvPr/>
+        </p:nvCxnSpPr>
+        <p:spPr>
+          <a:xfrm>
+            <a:off x="2297684" y="2407761"/>
+            <a:ext cx="474116" cy="0"/>
+          </a:xfrm>
+          <a:prstGeom prst="straightConnector1">
+            <a:avLst/>
+          </a:prstGeom>
+          <a:ln w="28575">
+            <a:headEnd type="none" w="med" len="med"/>
+            <a:tailEnd type="arrow" w="med" len="med"/>
+          </a:ln>
+        </p:spPr>
+        <p:style>
+          <a:lnRef idx="3">
+            <a:schemeClr val="dk1"/>
+          </a:lnRef>
+          <a:fillRef idx="0">
+            <a:schemeClr val="dk1"/>
+          </a:fillRef>
+          <a:effectRef idx="2">
+            <a:schemeClr val="dk1"/>
+          </a:effectRef>
+          <a:fontRef idx="minor">
+            <a:schemeClr val="tx1"/>
+          </a:fontRef>
+        </p:style>
+      </p:cxnSp>
+      <p:sp>
+        <p:nvSpPr>
+          <p:cNvPr id="26" name="Obdélník s odříznutým jedním rohem 25"/>
+          <p:cNvSpPr/>
+          <p:nvPr/>
+        </p:nvSpPr>
+        <p:spPr>
+          <a:xfrm>
+            <a:off x="3494297" y="4138047"/>
+            <a:ext cx="1436516" cy="864096"/>
+          </a:xfrm>
+          <a:prstGeom prst="snip1Rect">
+            <a:avLst/>
+          </a:prstGeom>
+        </p:spPr>
+        <p:style>
+          <a:lnRef idx="2">
+            <a:schemeClr val="accent3">
+              <a:shade val="50000"/>
+            </a:schemeClr>
+          </a:lnRef>
+          <a:fillRef idx="1">
+            <a:schemeClr val="accent3"/>
+          </a:fillRef>
+          <a:effectRef idx="0">
+            <a:schemeClr val="accent3"/>
+          </a:effectRef>
+          <a:fontRef idx="minor">
+            <a:schemeClr val="lt1"/>
+          </a:fontRef>
+        </p:style>
+        <p:txBody>
+          <a:bodyPr rtlCol="0" anchor="ctr"/>
+          <a:lstStyle/>
+          <a:p>
+            <a:pPr algn="ctr"/>
+            <a:r>
+              <a:rPr lang="cs-CZ" dirty="0"/>
+              <a:t>Standartní výstup</a:t>
+            </a:r>
+            <a:endParaRPr lang="en-US" dirty="0"/>
+          </a:p>
+        </p:txBody>
+      </p:sp>
+      <p:cxnSp>
+        <p:nvCxnSpPr>
+          <p:cNvPr id="27" name="Přímá spojnice se šipkou 26"/>
+          <p:cNvCxnSpPr/>
+          <p:nvPr/>
+        </p:nvCxnSpPr>
+        <p:spPr>
+          <a:xfrm flipH="1">
+            <a:off x="4924120" y="4621905"/>
+            <a:ext cx="721902" cy="4533"/>
+          </a:xfrm>
+          <a:prstGeom prst="straightConnector1">
+            <a:avLst/>
+          </a:prstGeom>
+          <a:ln w="28575">
+            <a:headEnd type="none" w="med" len="med"/>
+            <a:tailEnd type="arrow" w="med" len="med"/>
+          </a:ln>
+        </p:spPr>
+        <p:style>
+          <a:lnRef idx="3">
+            <a:schemeClr val="dk1"/>
+          </a:lnRef>
+          <a:fillRef idx="0">
+            <a:schemeClr val="dk1"/>
+          </a:fillRef>
+          <a:effectRef idx="2">
+            <a:schemeClr val="dk1"/>
+          </a:effectRef>
+          <a:fontRef idx="minor">
+            <a:schemeClr val="tx1"/>
+          </a:fontRef>
+        </p:style>
+      </p:cxnSp>
     </p:spTree>
     <p:extLst>
       <p:ext uri="{BB962C8B-B14F-4D97-AF65-F5344CB8AC3E}">
@@ -4773,8 +6915,8 @@
           <a:lstStyle/>
           <a:p>
             <a:r>
-              <a:rPr lang="en-US" dirty="0"/>
-              <a:t>Struktura interpretu</a:t>
+              <a:rPr lang="cs-CZ" dirty="0"/>
+              <a:t>Lexikální analyzátor</a:t>
             </a:r>
             <a:endParaRPr lang="en-150" dirty="0"/>
           </a:p>
@@ -4795,6 +6937,110 @@
           <a:bodyPr/>
           <a:lstStyle/>
           <a:p>
+            <a:r>
+              <a:rPr lang="cs-CZ" dirty="0"/>
+              <a:t>Co je to lexikální analýza = </a:t>
+            </a:r>
+            <a:r>
+              <a:rPr lang="cs-CZ" dirty="0" err="1"/>
+              <a:t>def</a:t>
+            </a:r>
+            <a:r>
+              <a:rPr lang="cs-CZ" dirty="0"/>
+              <a:t>.</a:t>
+            </a:r>
+          </a:p>
+          <a:p>
+            <a:r>
+              <a:rPr lang="cs-CZ" dirty="0"/>
+              <a:t>Konečný automat</a:t>
+            </a:r>
+          </a:p>
+          <a:p>
+            <a:r>
+              <a:rPr lang="cs-CZ" dirty="0" err="1"/>
+              <a:t>Lookahead</a:t>
+            </a:r>
+            <a:r>
+              <a:rPr lang="cs-CZ" dirty="0"/>
+              <a:t> = </a:t>
+            </a:r>
+            <a:r>
+              <a:rPr lang="cs-CZ" sz="2500" dirty="0" err="1">
+                <a:latin typeface="Courier New" panose="02070309020205020404" pitchFamily="49" charset="0"/>
+                <a:cs typeface="Courier New" panose="02070309020205020404" pitchFamily="49" charset="0"/>
+              </a:rPr>
+              <a:t>peek_token</a:t>
+            </a:r>
+            <a:r>
+              <a:rPr lang="en-US" sz="2500" dirty="0">
+                <a:latin typeface="Courier New" panose="02070309020205020404" pitchFamily="49" charset="0"/>
+                <a:cs typeface="Courier New" panose="02070309020205020404" pitchFamily="49" charset="0"/>
+              </a:rPr>
+              <a:t>();</a:t>
+            </a:r>
+            <a:endParaRPr lang="cs-CZ" sz="2500" dirty="0">
+              <a:latin typeface="Courier New" panose="02070309020205020404" pitchFamily="49" charset="0"/>
+              <a:cs typeface="Courier New" panose="02070309020205020404" pitchFamily="49" charset="0"/>
+            </a:endParaRPr>
+          </a:p>
+          <a:p>
+            <a:r>
+              <a:rPr lang="cs-CZ" dirty="0"/>
+              <a:t>Struktura tokenu</a:t>
+            </a:r>
+          </a:p>
+          <a:p>
+            <a:r>
+              <a:rPr lang="cs-CZ" dirty="0"/>
+              <a:t>Funkce </a:t>
+            </a:r>
+            <a:r>
+              <a:rPr lang="cs-CZ" sz="2500" dirty="0" err="1">
+                <a:latin typeface="Courier New" panose="02070309020205020404" pitchFamily="49" charset="0"/>
+                <a:cs typeface="Courier New" panose="02070309020205020404" pitchFamily="49" charset="0"/>
+              </a:rPr>
+              <a:t>init</a:t>
+            </a:r>
+            <a:r>
+              <a:rPr lang="en-US" sz="2500" dirty="0">
+                <a:latin typeface="Courier New" panose="02070309020205020404" pitchFamily="49" charset="0"/>
+                <a:cs typeface="Courier New" panose="02070309020205020404" pitchFamily="49" charset="0"/>
+              </a:rPr>
+              <a:t>_</a:t>
+            </a:r>
+            <a:r>
+              <a:rPr lang="cs-CZ" sz="2500" dirty="0">
+                <a:latin typeface="Courier New" panose="02070309020205020404" pitchFamily="49" charset="0"/>
+                <a:cs typeface="Courier New" panose="02070309020205020404" pitchFamily="49" charset="0"/>
+              </a:rPr>
+              <a:t>s</a:t>
+            </a:r>
+            <a:r>
+              <a:rPr lang="en-US" sz="2500" dirty="0">
+                <a:latin typeface="Courier New" panose="02070309020205020404" pitchFamily="49" charset="0"/>
+                <a:cs typeface="Courier New" panose="02070309020205020404" pitchFamily="49" charset="0"/>
+              </a:rPr>
+              <a:t>can</a:t>
+            </a:r>
+            <a:r>
+              <a:rPr lang="cs-CZ" sz="2500" dirty="0" err="1">
+                <a:latin typeface="Courier New" panose="02070309020205020404" pitchFamily="49" charset="0"/>
+                <a:cs typeface="Courier New" panose="02070309020205020404" pitchFamily="49" charset="0"/>
+              </a:rPr>
+              <a:t>ner</a:t>
+            </a:r>
+            <a:r>
+              <a:rPr lang="en-US" sz="2500" dirty="0">
+                <a:latin typeface="Courier New" panose="02070309020205020404" pitchFamily="49" charset="0"/>
+                <a:cs typeface="Courier New" panose="02070309020205020404" pitchFamily="49" charset="0"/>
+              </a:rPr>
+              <a:t>();</a:t>
+            </a:r>
+            <a:r>
+              <a:rPr lang="cs-CZ" dirty="0"/>
+              <a:t> při každém volání skeneru</a:t>
+            </a:r>
             <a:endParaRPr lang="en-150" dirty="0"/>
           </a:p>
         </p:txBody>
@@ -4889,8 +7135,8 @@
           <a:lstStyle/>
           <a:p>
             <a:r>
-              <a:rPr lang="en-US" dirty="0"/>
-              <a:t>Scanner</a:t>
+              <a:rPr lang="cs-CZ" dirty="0"/>
+              <a:t>Syntaktická analýza</a:t>
             </a:r>
             <a:endParaRPr lang="en-150" dirty="0"/>
           </a:p>
@@ -4911,7 +7157,22 @@
           <a:bodyPr/>
           <a:lstStyle/>
           <a:p>
-            <a:endParaRPr lang="en-150"/>
+            <a:r>
+              <a:rPr lang="cs-CZ" dirty="0"/>
+              <a:t>Hlavni část = mozek – syntaxí řízený překlad</a:t>
+            </a:r>
+          </a:p>
+          <a:p>
+            <a:r>
+              <a:rPr lang="cs-CZ" dirty="0"/>
+              <a:t>Rekurzivní sestup – proč</a:t>
+            </a:r>
+          </a:p>
+          <a:p>
+            <a:r>
+              <a:rPr lang="cs-CZ" dirty="0"/>
+              <a:t>Tabulka symbolů</a:t>
+            </a:r>
           </a:p>
         </p:txBody>
       </p:sp>
@@ -5005,29 +7266,54 @@
           <a:lstStyle/>
           <a:p>
             <a:r>
+              <a:rPr lang="cs-CZ" dirty="0"/>
+              <a:t>Precedenční syntaktická analýza výrazů</a:t>
+            </a:r>
+            <a:endParaRPr lang="en-150" dirty="0"/>
+          </a:p>
+        </p:txBody>
+      </p:sp>
+      <p:sp>
+        <p:nvSpPr>
+          <p:cNvPr id="3" name="Zástupný symbol pro obsah 2"/>
+          <p:cNvSpPr>
+            <a:spLocks noGrp="1"/>
+          </p:cNvSpPr>
+          <p:nvPr>
+            <p:ph idx="1"/>
+          </p:nvPr>
+        </p:nvSpPr>
+        <p:spPr/>
+        <p:txBody>
+          <a:bodyPr/>
+          <a:lstStyle/>
+          <a:p>
+            <a:r>
+              <a:rPr lang="cs-CZ" dirty="0"/>
+              <a:t>Priorita operátorů</a:t>
+            </a:r>
+          </a:p>
+          <a:p>
+            <a:pPr lvl="1"/>
+            <a:r>
+              <a:rPr lang="cs-CZ" dirty="0"/>
+              <a:t>Unární vykřičník má nejvyšší prioritu</a:t>
+            </a:r>
+          </a:p>
+          <a:p>
+            <a:r>
+              <a:rPr lang="cs-CZ" dirty="0"/>
+              <a:t>Tečka = původně jako operátor</a:t>
+            </a:r>
+          </a:p>
+          <a:p>
+            <a:r>
               <a:rPr lang="en-US" dirty="0"/>
-              <a:t>Parser</a:t>
-            </a:r>
+              <a:t>Function Call</a:t>
+            </a:r>
+          </a:p>
+          <a:p>
             <a:endParaRPr lang="en-150" dirty="0"/>
-          </a:p>
-        </p:txBody>
-      </p:sp>
-      <p:sp>
-        <p:nvSpPr>
-          <p:cNvPr id="3" name="Zástupný symbol pro obsah 2"/>
-          <p:cNvSpPr>
-            <a:spLocks noGrp="1"/>
-          </p:cNvSpPr>
-          <p:nvPr>
-            <p:ph idx="1"/>
-          </p:nvPr>
-        </p:nvSpPr>
-        <p:spPr/>
-        <p:txBody>
-          <a:bodyPr/>
-          <a:lstStyle/>
-          <a:p>
-            <a:endParaRPr lang="en-150"/>
           </a:p>
         </p:txBody>
       </p:sp>
@@ -5143,7 +7429,28 @@
           <a:bodyPr/>
           <a:lstStyle/>
           <a:p>
-            <a:endParaRPr lang="en-150"/>
+            <a:r>
+              <a:rPr lang="cs-CZ" dirty="0"/>
+              <a:t>Rekurzivní</a:t>
+            </a:r>
+          </a:p>
+          <a:p>
+            <a:r>
+              <a:rPr lang="cs-CZ" dirty="0"/>
+              <a:t>Z velké části zastupuje sémantickou analýzu</a:t>
+            </a:r>
+          </a:p>
+          <a:p>
+            <a:r>
+              <a:rPr lang="cs-CZ" dirty="0"/>
+              <a:t>Rekurzivní průchod AST</a:t>
+            </a:r>
+          </a:p>
+          <a:p>
+            <a:pPr marL="0" indent="0">
+              <a:buNone/>
+            </a:pPr>
+            <a:endParaRPr lang="cs-CZ" dirty="0"/>
           </a:p>
         </p:txBody>
       </p:sp>
@@ -5259,7 +7566,7 @@
           <a:bodyPr/>
           <a:lstStyle/>
           <a:p>
-            <a:endParaRPr lang="en-150"/>
+            <a:endParaRPr lang="en-150" dirty="0"/>
           </a:p>
         </p:txBody>
       </p:sp>

</xml_diff>

<commit_message>
Upraveny slajd precedenčnej anylyzy a z lexikalky zmazana jedne veta
</commit_message>
<xml_diff>
--- a/docs/prezentace.pptx
+++ b/docs/prezentace.pptx
@@ -2555,7 +2555,7 @@
           <a:p>
             <a:fld id="{1F06EB26-DD9D-43B9-A8A9-BB5142A01BE2}" type="datetime8">
               <a:rPr lang="en-150" smtClean="0"/>
-              <a:t>14/12/2016 11:13</a:t>
+              <a:t>12/14/2016 18:35</a:t>
             </a:fld>
             <a:endParaRPr lang="en-150" dirty="0"/>
           </a:p>
@@ -2777,7 +2777,7 @@
           <a:p>
             <a:fld id="{7307E821-782C-4746-9F61-64DDC0450AB3}" type="datetime8">
               <a:rPr lang="en-150" smtClean="0"/>
-              <a:t>14/12/2016 11:13</a:t>
+              <a:t>12/14/2016 18:35</a:t>
             </a:fld>
             <a:endParaRPr lang="en-150"/>
           </a:p>
@@ -2957,7 +2957,7 @@
           <a:p>
             <a:fld id="{D45B8E45-F186-418E-94E2-64E602834796}" type="datetime8">
               <a:rPr lang="en-150" smtClean="0"/>
-              <a:t>14/12/2016 11:13</a:t>
+              <a:t>12/14/2016 18:35</a:t>
             </a:fld>
             <a:endParaRPr lang="en-150"/>
           </a:p>
@@ -3579,7 +3579,7 @@
           <a:p>
             <a:fld id="{18F9EDC9-AFBA-4C40-9BB4-697BD56049CF}" type="datetime8">
               <a:rPr lang="en-150" smtClean="0"/>
-              <a:t>14/12/2016 11:13</a:t>
+              <a:t>12/14/2016 18:35</a:t>
             </a:fld>
             <a:endParaRPr lang="en-150"/>
           </a:p>
@@ -3836,7 +3836,7 @@
             <a:fld id="{68D751F2-C7E9-4775-BE8E-824CD7C75291}" type="datetime8">
               <a:rPr lang="en-150" smtClean="0"/>
               <a:pPr/>
-              <a:t>14/12/2016 11:13</a:t>
+              <a:t>12/14/2016 18:35</a:t>
             </a:fld>
             <a:endParaRPr lang="en-150"/>
           </a:p>
@@ -4085,7 +4085,7 @@
           <a:p>
             <a:fld id="{EA4320CA-C850-4386-BE30-5C4ED912B6EF}" type="datetime8">
               <a:rPr lang="en-150" smtClean="0"/>
-              <a:t>14/12/2016 11:13</a:t>
+              <a:t>12/14/2016 18:35</a:t>
             </a:fld>
             <a:endParaRPr lang="en-150"/>
           </a:p>
@@ -4452,7 +4452,7 @@
           <a:p>
             <a:fld id="{C01FE258-AD17-46FD-8C7C-4FA8CBA36D42}" type="datetime8">
               <a:rPr lang="en-150" smtClean="0"/>
-              <a:t>14/12/2016 11:13</a:t>
+              <a:t>12/14/2016 18:35</a:t>
             </a:fld>
             <a:endParaRPr lang="en-150"/>
           </a:p>
@@ -4570,7 +4570,7 @@
           <a:p>
             <a:fld id="{42A97EB4-EBEC-4FBE-BC73-CC4101237DB8}" type="datetime8">
               <a:rPr lang="en-150" smtClean="0"/>
-              <a:t>14/12/2016 11:13</a:t>
+              <a:t>12/14/2016 18:35</a:t>
             </a:fld>
             <a:endParaRPr lang="en-150"/>
           </a:p>
@@ -4665,7 +4665,7 @@
           <a:p>
             <a:fld id="{101E2C3B-894B-41C2-B150-6EB0A043C8AC}" type="datetime8">
               <a:rPr lang="en-150" smtClean="0"/>
-              <a:t>14/12/2016 11:13</a:t>
+              <a:t>12/14/2016 18:35</a:t>
             </a:fld>
             <a:endParaRPr lang="en-150"/>
           </a:p>
@@ -4942,7 +4942,7 @@
           <a:p>
             <a:fld id="{C5C22882-DBD6-438F-87B6-D3A6ED4BB9CB}" type="datetime8">
               <a:rPr lang="en-150" smtClean="0"/>
-              <a:t>14/12/2016 11:13</a:t>
+              <a:t>12/14/2016 18:35</a:t>
             </a:fld>
             <a:endParaRPr lang="en-150"/>
           </a:p>
@@ -5195,7 +5195,7 @@
           <a:p>
             <a:fld id="{8EC26B56-D89F-40C9-AF42-B521A92485B8}" type="datetime8">
               <a:rPr lang="en-150" smtClean="0"/>
-              <a:t>14/12/2016 11:13</a:t>
+              <a:t>12/14/2016 18:35</a:t>
             </a:fld>
             <a:endParaRPr lang="en-150"/>
           </a:p>
@@ -5502,7 +5502,7 @@
             <a:fld id="{52D9D283-C366-441B-913D-EA9C8D5A0C53}" type="datetime8">
               <a:rPr lang="en-150" smtClean="0"/>
               <a:pPr/>
-              <a:t>14/12/2016 11:13</a:t>
+              <a:t>12/14/2016 18:35</a:t>
             </a:fld>
             <a:endParaRPr lang="en-150" dirty="0"/>
           </a:p>
@@ -8148,15 +8148,13 @@
             </a:endParaRPr>
           </a:p>
           <a:p>
-            <a:pPr marL="358775" indent="-266700">
+            <a:pPr marL="92075" indent="0">
               <a:spcAft>
                 <a:spcPts val="200"/>
               </a:spcAft>
+              <a:buNone/>
             </a:pPr>
-            <a:r>
-              <a:rPr lang="cs-CZ" sz="2500" dirty="0"/>
-              <a:t>Struktura tokenu – typ, řetězec, délka řetězce, řádek v kódu</a:t>
-            </a:r>
+            <a:endParaRPr lang="cs-CZ" sz="2500" dirty="0"/>
           </a:p>
         </p:txBody>
       </p:sp>
@@ -8664,7 +8662,7 @@
           <a:p>
             <a:r>
               <a:rPr lang="cs-CZ" dirty="0"/>
-              <a:t>Precedenční syntaktická analýza výrazů</a:t>
+              <a:t>Precedenční syntaktická analýza</a:t>
             </a:r>
             <a:endParaRPr lang="en-150" dirty="0"/>
           </a:p>
@@ -8683,7 +8681,7 @@
         <p:spPr>
           <a:xfrm>
             <a:off x="323527" y="924468"/>
-            <a:ext cx="6676199" cy="5252495"/>
+            <a:ext cx="8280921" cy="5252495"/>
           </a:xfrm>
         </p:spPr>
         <p:txBody>
@@ -8693,45 +8691,82 @@
           <a:lstStyle/>
           <a:p>
             <a:r>
-              <a:rPr lang="cs-CZ" sz="2450" dirty="0"/>
-              <a:t>Rozsáhlá </a:t>
-            </a:r>
-            <a:r>
-              <a:rPr lang="cs-CZ" sz="2450" b="1" dirty="0"/>
-              <a:t>precedenční tabulka </a:t>
-            </a:r>
-            <a:r>
-              <a:rPr lang="cs-CZ" sz="2450" dirty="0"/>
-              <a:t>operátorů </a:t>
+              <a:rPr lang="sk-SK" sz="2450" dirty="0"/>
+              <a:t>Používaná na </a:t>
+            </a:r>
+            <a:r>
+              <a:rPr lang="sk-SK" sz="2450" dirty="0" err="1"/>
+              <a:t>vyhodnocování</a:t>
+            </a:r>
+            <a:r>
+              <a:rPr lang="sk-SK" sz="2450" dirty="0"/>
+              <a:t> </a:t>
+            </a:r>
+            <a:r>
+              <a:rPr lang="sk-SK" sz="2450" dirty="0" err="1"/>
+              <a:t>výrazů</a:t>
+            </a:r>
+            <a:endParaRPr lang="sk-SK" sz="2450" dirty="0"/>
+          </a:p>
+          <a:p>
+            <a:r>
+              <a:rPr lang="sk-SK" sz="2450" dirty="0" err="1"/>
+              <a:t>Řízená</a:t>
+            </a:r>
+            <a:r>
+              <a:rPr lang="sk-SK" sz="2450" dirty="0"/>
+              <a:t> pomocí </a:t>
+            </a:r>
+            <a:r>
+              <a:rPr lang="sk-SK" sz="2450" dirty="0" err="1"/>
+              <a:t>precedenčí</a:t>
+            </a:r>
+            <a:r>
+              <a:rPr lang="sk-SK" sz="2450" dirty="0"/>
+              <a:t> </a:t>
+            </a:r>
+            <a:r>
+              <a:rPr lang="sk-SK" sz="2450" dirty="0" err="1"/>
+              <a:t>tabulky</a:t>
+            </a:r>
+            <a:endParaRPr lang="sk-SK" sz="2450" dirty="0"/>
+          </a:p>
+          <a:p>
+            <a:r>
+              <a:rPr lang="sk-SK" sz="2450" dirty="0"/>
+              <a:t>Vstupní tokeny </a:t>
+            </a:r>
+            <a:r>
+              <a:rPr lang="sk-SK" sz="2450" dirty="0" err="1"/>
+              <a:t>jsou</a:t>
+            </a:r>
+            <a:r>
+              <a:rPr lang="sk-SK" sz="2450" dirty="0"/>
+              <a:t> postupne </a:t>
+            </a:r>
+            <a:r>
+              <a:rPr lang="sk-SK" sz="2450" dirty="0" err="1"/>
+              <a:t>vkládány</a:t>
+            </a:r>
+            <a:r>
+              <a:rPr lang="sk-SK" sz="2450" dirty="0"/>
+              <a:t> na zásobník </a:t>
             </a:r>
             <a:br>
-              <a:rPr lang="en-US" sz="2450" dirty="0"/>
+              <a:rPr lang="sk-SK" sz="2450" dirty="0"/>
             </a:br>
             <a:r>
-              <a:rPr lang="cs-CZ" sz="2450" dirty="0"/>
-              <a:t>i s podporou </a:t>
-            </a:r>
-            <a:r>
-              <a:rPr lang="cs-CZ" sz="2450" i="1" dirty="0" err="1"/>
-              <a:t>Function</a:t>
-            </a:r>
-            <a:r>
-              <a:rPr lang="cs-CZ" sz="2450" i="1" dirty="0"/>
-              <a:t> Call</a:t>
-            </a:r>
-          </a:p>
-          <a:p>
-            <a:r>
-              <a:rPr lang="cs-CZ" sz="2450" dirty="0"/>
-              <a:t>Řízení běhu zajišťují operace se zásobníkem </a:t>
-            </a:r>
-            <a:br>
-              <a:rPr lang="en-US" sz="2450" dirty="0"/>
-            </a:br>
-            <a:r>
-              <a:rPr lang="cs-CZ" sz="2450" dirty="0"/>
-              <a:t>s podmínkami na prioritu a asociativitu operátorů</a:t>
-            </a:r>
+              <a:rPr lang="sk-SK" sz="2450" dirty="0"/>
+              <a:t>a redukovaný pomocí </a:t>
+            </a:r>
+            <a:r>
+              <a:rPr lang="sk-SK" sz="2450" dirty="0" err="1"/>
+              <a:t>pravidel</a:t>
+            </a:r>
+            <a:endParaRPr lang="sk-SK" sz="2450" dirty="0"/>
+          </a:p>
+          <a:p>
+            <a:endParaRPr lang="cs-CZ" sz="2450" i="1" dirty="0"/>
           </a:p>
         </p:txBody>
       </p:sp>
@@ -8786,13 +8821,13 @@
           <p:nvPr>
             <p:extLst>
               <p:ext uri="{D42A27DB-BD31-4B8C-83A1-F6EECF244321}">
-                <p14:modId xmlns:p14="http://schemas.microsoft.com/office/powerpoint/2010/main" val="3239403804"/>
+                <p14:modId xmlns:p14="http://schemas.microsoft.com/office/powerpoint/2010/main" val="2323363062"/>
               </p:ext>
             </p:extLst>
           </p:nvPr>
         </p:nvGraphicFramePr>
         <p:xfrm>
-          <a:off x="670503" y="4123426"/>
+          <a:off x="779511" y="2870694"/>
           <a:ext cx="2125000" cy="1828800"/>
         </p:xfrm>
         <a:graphic>
@@ -9181,8 +9216,12 @@
                     <a:p>
                       <a:pPr algn="ctr"/>
                       <a:r>
+                        <a:rPr lang="sk-SK" dirty="0"/>
+                        <a:t>i</a:t>
+                      </a:r>
+                      <a:r>
                         <a:rPr lang="en-US" dirty="0"/>
-                        <a:t>Id</a:t>
+                        <a:t>d</a:t>
                       </a:r>
                       <a:endParaRPr lang="cs-CZ" dirty="0"/>
                     </a:p>
@@ -9411,7 +9450,7 @@
         </p:nvCxnSpPr>
         <p:spPr>
           <a:xfrm flipV="1">
-            <a:off x="7143873" y="3930702"/>
+            <a:off x="7396692" y="3508437"/>
             <a:ext cx="559306" cy="255231"/>
           </a:xfrm>
           <a:prstGeom prst="line">
@@ -9449,7 +9488,7 @@
         </p:nvCxnSpPr>
         <p:spPr>
           <a:xfrm flipV="1">
-            <a:off x="7138234" y="4945907"/>
+            <a:off x="7391053" y="4523642"/>
             <a:ext cx="5639" cy="351705"/>
           </a:xfrm>
           <a:prstGeom prst="line">
@@ -9487,7 +9526,7 @@
         </p:nvCxnSpPr>
         <p:spPr>
           <a:xfrm flipH="1" flipV="1">
-            <a:off x="7703179" y="3930702"/>
+            <a:off x="7955998" y="3508437"/>
             <a:ext cx="518740" cy="255231"/>
           </a:xfrm>
           <a:prstGeom prst="line">
@@ -9522,7 +9561,7 @@
         </p:nvSpPr>
         <p:spPr>
           <a:xfrm>
-            <a:off x="6758246" y="5297612"/>
+            <a:off x="7011065" y="4875347"/>
             <a:ext cx="759975" cy="759974"/>
           </a:xfrm>
           <a:prstGeom prst="ellipse">
@@ -9551,9 +9590,7 @@
             <a:r>
               <a:rPr lang="en-US" sz="2400" dirty="0">
                 <a:ln w="19050">
-                  <a:solidFill>
-                    <a:schemeClr val="tx1"/>
-                  </a:solidFill>
+                  <a:noFill/>
                 </a:ln>
                 <a:solidFill>
                   <a:schemeClr val="tx1">
@@ -9566,9 +9603,7 @@
             </a:r>
             <a:endParaRPr lang="cs-CZ" sz="2400" dirty="0">
               <a:ln w="19050">
-                <a:solidFill>
-                  <a:schemeClr val="tx1"/>
-                </a:solidFill>
+                <a:noFill/>
               </a:ln>
               <a:solidFill>
                 <a:schemeClr val="tx1">
@@ -9588,7 +9623,7 @@
         </p:nvSpPr>
         <p:spPr>
           <a:xfrm>
-            <a:off x="7841931" y="4185933"/>
+            <a:off x="8094750" y="3763668"/>
             <a:ext cx="759975" cy="759974"/>
           </a:xfrm>
           <a:prstGeom prst="ellipse">
@@ -9617,9 +9652,7 @@
             <a:r>
               <a:rPr lang="en-US" sz="2400" dirty="0">
                 <a:ln w="19050">
-                  <a:solidFill>
-                    <a:schemeClr val="tx1"/>
-                  </a:solidFill>
+                  <a:noFill/>
                 </a:ln>
                 <a:solidFill>
                   <a:schemeClr val="tx1">
@@ -9632,9 +9665,7 @@
             </a:r>
             <a:endParaRPr lang="cs-CZ" sz="2400" dirty="0">
               <a:ln w="19050">
-                <a:solidFill>
-                  <a:schemeClr val="tx1"/>
-                </a:solidFill>
+                <a:noFill/>
               </a:ln>
               <a:solidFill>
                 <a:schemeClr val="tx1">
@@ -9654,7 +9685,7 @@
         </p:nvSpPr>
         <p:spPr>
           <a:xfrm>
-            <a:off x="6763885" y="4185933"/>
+            <a:off x="7016704" y="3763668"/>
             <a:ext cx="759975" cy="759974"/>
           </a:xfrm>
           <a:prstGeom prst="ellipse">
@@ -9683,9 +9714,7 @@
             <a:r>
               <a:rPr lang="en-US" dirty="0">
                 <a:ln w="19050">
-                  <a:solidFill>
-                    <a:schemeClr val="tx1"/>
-                  </a:solidFill>
+                  <a:noFill/>
                 </a:ln>
                 <a:solidFill>
                   <a:schemeClr val="tx1">
@@ -9698,9 +9727,7 @@
             </a:r>
             <a:endParaRPr lang="cs-CZ" dirty="0">
               <a:ln w="19050">
-                <a:solidFill>
-                  <a:schemeClr val="tx1"/>
-                </a:solidFill>
+                <a:noFill/>
               </a:ln>
               <a:solidFill>
                 <a:schemeClr val="tx1">
@@ -9720,7 +9747,7 @@
         </p:nvSpPr>
         <p:spPr>
           <a:xfrm>
-            <a:off x="7323191" y="3170728"/>
+            <a:off x="7576010" y="2748463"/>
             <a:ext cx="759975" cy="759974"/>
           </a:xfrm>
           <a:prstGeom prst="ellipse">
@@ -9749,9 +9776,7 @@
             <a:r>
               <a:rPr lang="en-US" sz="2000" dirty="0">
                 <a:ln w="19050">
-                  <a:solidFill>
-                    <a:schemeClr val="tx1"/>
-                  </a:solidFill>
+                  <a:noFill/>
                 </a:ln>
                 <a:solidFill>
                   <a:schemeClr val="tx1">
@@ -9764,9 +9789,7 @@
             </a:r>
             <a:endParaRPr lang="cs-CZ" sz="2000" dirty="0">
               <a:ln w="19050">
-                <a:solidFill>
-                  <a:schemeClr val="tx1"/>
-                </a:solidFill>
+                <a:noFill/>
               </a:ln>
               <a:solidFill>
                 <a:schemeClr val="tx1">
@@ -9786,8 +9809,8 @@
         </p:nvGrpSpPr>
         <p:grpSpPr>
           <a:xfrm>
-            <a:off x="670503" y="2770679"/>
-            <a:ext cx="5112568" cy="873250"/>
+            <a:off x="3622831" y="5301208"/>
+            <a:ext cx="2821377" cy="873250"/>
             <a:chOff x="611560" y="2869986"/>
             <a:chExt cx="4826359" cy="694075"/>
           </a:xfrm>
@@ -9895,8 +9918,8 @@
         </p:nvSpPr>
         <p:spPr>
           <a:xfrm>
-            <a:off x="3977272" y="5130954"/>
-            <a:ext cx="1782287" cy="707886"/>
+            <a:off x="917505" y="5445224"/>
+            <a:ext cx="1782287" cy="615553"/>
           </a:xfrm>
           <a:prstGeom prst="rect">
             <a:avLst/>
@@ -9905,9 +9928,7 @@
             <a:schemeClr val="bg1"/>
           </a:solidFill>
           <a:ln>
-            <a:solidFill>
-              <a:schemeClr val="tx1"/>
-            </a:solidFill>
+            <a:noFill/>
             <a:prstDash val="solid"/>
           </a:ln>
         </p:spPr>
@@ -9918,7 +9939,7 @@
           <a:lstStyle/>
           <a:p>
             <a:r>
-              <a:rPr lang="en-US" sz="4000" dirty="0">
+              <a:rPr lang="en-US" sz="3400" dirty="0">
                 <a:solidFill>
                   <a:srgbClr val="FF0000"/>
                 </a:solidFill>
@@ -9926,10 +9947,10 @@
               <a:t>!</a:t>
             </a:r>
             <a:r>
-              <a:rPr lang="en-US" sz="4000" dirty="0"/>
+              <a:rPr lang="en-US" sz="3400" dirty="0"/>
               <a:t>x&amp;&amp;y$</a:t>
             </a:r>
-            <a:endParaRPr lang="cs-CZ" sz="4000" dirty="0"/>
+            <a:endParaRPr lang="cs-CZ" sz="3400" dirty="0"/>
           </a:p>
         </p:txBody>
       </p:sp>
@@ -9941,8 +9962,8 @@
         </p:nvSpPr>
         <p:spPr>
           <a:xfrm>
-            <a:off x="3977272" y="5130954"/>
-            <a:ext cx="1782287" cy="707886"/>
+            <a:off x="917505" y="5445224"/>
+            <a:ext cx="1782287" cy="615553"/>
           </a:xfrm>
           <a:prstGeom prst="rect">
             <a:avLst/>
@@ -9951,9 +9972,7 @@
             <a:schemeClr val="bg1"/>
           </a:solidFill>
           <a:ln>
-            <a:solidFill>
-              <a:schemeClr val="tx1"/>
-            </a:solidFill>
+            <a:noFill/>
             <a:prstDash val="solid"/>
           </a:ln>
         </p:spPr>
@@ -9964,11 +9983,11 @@
           <a:lstStyle/>
           <a:p>
             <a:r>
-              <a:rPr lang="en-US" sz="4000" dirty="0"/>
+              <a:rPr lang="en-US" sz="3400" dirty="0"/>
               <a:t>!</a:t>
             </a:r>
             <a:r>
-              <a:rPr lang="en-US" sz="4000" dirty="0">
+              <a:rPr lang="en-US" sz="3400" dirty="0">
                 <a:solidFill>
                   <a:srgbClr val="FF0000"/>
                 </a:solidFill>
@@ -9976,10 +9995,10 @@
               <a:t>x</a:t>
             </a:r>
             <a:r>
-              <a:rPr lang="en-US" sz="4000" dirty="0"/>
+              <a:rPr lang="en-US" sz="3400" dirty="0"/>
               <a:t>&amp;&amp;y$</a:t>
             </a:r>
-            <a:endParaRPr lang="cs-CZ" sz="4000" dirty="0"/>
+            <a:endParaRPr lang="cs-CZ" sz="3400" dirty="0"/>
           </a:p>
         </p:txBody>
       </p:sp>
@@ -9991,8 +10010,8 @@
         </p:nvSpPr>
         <p:spPr>
           <a:xfrm>
-            <a:off x="3977272" y="5130954"/>
-            <a:ext cx="1782287" cy="707886"/>
+            <a:off x="917505" y="5445224"/>
+            <a:ext cx="1782287" cy="615553"/>
           </a:xfrm>
           <a:prstGeom prst="rect">
             <a:avLst/>
@@ -10001,9 +10020,7 @@
             <a:schemeClr val="bg1"/>
           </a:solidFill>
           <a:ln>
-            <a:solidFill>
-              <a:schemeClr val="tx1"/>
-            </a:solidFill>
+            <a:noFill/>
             <a:prstDash val="solid"/>
           </a:ln>
         </p:spPr>
@@ -10014,11 +10031,11 @@
           <a:lstStyle/>
           <a:p>
             <a:r>
-              <a:rPr lang="en-US" sz="4000" dirty="0"/>
+              <a:rPr lang="en-US" sz="3400" dirty="0"/>
               <a:t>!x</a:t>
             </a:r>
             <a:r>
-              <a:rPr lang="en-US" sz="4000" dirty="0">
+              <a:rPr lang="en-US" sz="3400" dirty="0">
                 <a:solidFill>
                   <a:srgbClr val="FF0000"/>
                 </a:solidFill>
@@ -10026,10 +10043,10 @@
               <a:t>&amp;&amp;</a:t>
             </a:r>
             <a:r>
-              <a:rPr lang="en-US" sz="4000" dirty="0"/>
+              <a:rPr lang="en-US" sz="3400" dirty="0"/>
               <a:t>y$</a:t>
             </a:r>
-            <a:endParaRPr lang="cs-CZ" sz="4000" dirty="0"/>
+            <a:endParaRPr lang="cs-CZ" sz="3400" dirty="0"/>
           </a:p>
         </p:txBody>
       </p:sp>
@@ -10041,8 +10058,8 @@
         </p:nvSpPr>
         <p:spPr>
           <a:xfrm>
-            <a:off x="3977272" y="5130954"/>
-            <a:ext cx="1782287" cy="707886"/>
+            <a:off x="917505" y="5445224"/>
+            <a:ext cx="1782287" cy="615553"/>
           </a:xfrm>
           <a:prstGeom prst="rect">
             <a:avLst/>
@@ -10051,9 +10068,7 @@
             <a:schemeClr val="bg1"/>
           </a:solidFill>
           <a:ln>
-            <a:solidFill>
-              <a:schemeClr val="tx1"/>
-            </a:solidFill>
+            <a:noFill/>
             <a:prstDash val="solid"/>
           </a:ln>
         </p:spPr>
@@ -10064,11 +10079,11 @@
           <a:lstStyle/>
           <a:p>
             <a:r>
-              <a:rPr lang="en-US" sz="4000" dirty="0"/>
+              <a:rPr lang="en-US" sz="3400" dirty="0"/>
               <a:t>!x&amp;&amp;</a:t>
             </a:r>
             <a:r>
-              <a:rPr lang="en-US" sz="4000" dirty="0">
+              <a:rPr lang="en-US" sz="3400" dirty="0">
                 <a:solidFill>
                   <a:srgbClr val="FF0000"/>
                 </a:solidFill>
@@ -10076,10 +10091,10 @@
               <a:t>y</a:t>
             </a:r>
             <a:r>
-              <a:rPr lang="en-US" sz="4000" dirty="0"/>
+              <a:rPr lang="en-US" sz="3400" dirty="0"/>
               <a:t>$</a:t>
             </a:r>
-            <a:endParaRPr lang="cs-CZ" sz="4000" dirty="0"/>
+            <a:endParaRPr lang="cs-CZ" sz="3400" dirty="0"/>
           </a:p>
         </p:txBody>
       </p:sp>
@@ -10091,8 +10106,8 @@
         </p:nvSpPr>
         <p:spPr>
           <a:xfrm>
-            <a:off x="3977272" y="5130954"/>
-            <a:ext cx="1782287" cy="707886"/>
+            <a:off x="917505" y="5445224"/>
+            <a:ext cx="1782287" cy="615553"/>
           </a:xfrm>
           <a:prstGeom prst="rect">
             <a:avLst/>
@@ -10101,9 +10116,7 @@
             <a:schemeClr val="bg1"/>
           </a:solidFill>
           <a:ln>
-            <a:solidFill>
-              <a:schemeClr val="tx1"/>
-            </a:solidFill>
+            <a:noFill/>
             <a:prstDash val="solid"/>
           </a:ln>
         </p:spPr>
@@ -10114,18 +10127,18 @@
           <a:lstStyle/>
           <a:p>
             <a:r>
-              <a:rPr lang="en-US" sz="4000" dirty="0"/>
+              <a:rPr lang="en-US" sz="3400" dirty="0"/>
               <a:t>!x&amp;&amp;y</a:t>
             </a:r>
             <a:r>
-              <a:rPr lang="en-US" sz="4000" dirty="0">
+              <a:rPr lang="en-US" sz="3400" dirty="0">
                 <a:solidFill>
                   <a:srgbClr val="FF0000"/>
                 </a:solidFill>
               </a:rPr>
               <a:t>$</a:t>
             </a:r>
-            <a:endParaRPr lang="cs-CZ" sz="4000" dirty="0">
+            <a:endParaRPr lang="cs-CZ" sz="3400" dirty="0">
               <a:solidFill>
                 <a:srgbClr val="FF0000"/>
               </a:solidFill>
@@ -10141,7 +10154,7 @@
         </p:nvSpPr>
         <p:spPr>
           <a:xfrm>
-            <a:off x="7271317" y="898561"/>
+            <a:off x="4036318" y="3164775"/>
             <a:ext cx="1598742" cy="1200329"/>
           </a:xfrm>
           <a:prstGeom prst="rect">
@@ -10149,9 +10162,7 @@
           </a:prstGeom>
           <a:noFill/>
           <a:ln w="12700">
-            <a:solidFill>
-              <a:schemeClr val="tx1"/>
-            </a:solidFill>
+            <a:noFill/>
           </a:ln>
         </p:spPr>
         <p:txBody>
@@ -10161,38 +10172,27 @@
           <a:lstStyle/>
           <a:p>
             <a:r>
-              <a:rPr lang="en-US" sz="2400" dirty="0">
-                <a:solidFill>
-                  <a:srgbClr val="002060"/>
-                </a:solidFill>
-              </a:rPr>
+              <a:rPr lang="en-US" sz="2400" dirty="0"/>
               <a:t>E → !E</a:t>
             </a:r>
           </a:p>
           <a:p>
             <a:r>
-              <a:rPr lang="en-US" sz="2400" dirty="0">
-                <a:solidFill>
-                  <a:srgbClr val="002060"/>
-                </a:solidFill>
-              </a:rPr>
-              <a:t>E → I</a:t>
-            </a:r>
-          </a:p>
-          <a:p>
-            <a:r>
-              <a:rPr lang="en-US" sz="2400" dirty="0">
-                <a:solidFill>
-                  <a:srgbClr val="002060"/>
-                </a:solidFill>
-              </a:rPr>
+              <a:rPr lang="en-US" sz="2400" dirty="0"/>
+              <a:t>E → </a:t>
+            </a:r>
+            <a:r>
+              <a:rPr lang="sk-SK" sz="2400" dirty="0"/>
+              <a:t>i</a:t>
+            </a:r>
+            <a:endParaRPr lang="en-US" sz="2400" dirty="0"/>
+          </a:p>
+          <a:p>
+            <a:r>
+              <a:rPr lang="en-US" sz="2400" dirty="0"/>
               <a:t>E → E &amp;&amp; E</a:t>
             </a:r>
-            <a:endParaRPr lang="cs-CZ" sz="2400" dirty="0">
-              <a:solidFill>
-                <a:srgbClr val="002060"/>
-              </a:solidFill>
-            </a:endParaRPr>
+            <a:endParaRPr lang="cs-CZ" sz="2400" dirty="0"/>
           </a:p>
         </p:txBody>
       </p:sp>
@@ -10204,8 +10204,8 @@
         </p:nvSpPr>
         <p:spPr>
           <a:xfrm>
-            <a:off x="779511" y="2892884"/>
-            <a:ext cx="4724709" cy="615553"/>
+            <a:off x="3731839" y="5423413"/>
+            <a:ext cx="2607337" cy="615553"/>
           </a:xfrm>
           <a:prstGeom prst="rect">
             <a:avLst/>
@@ -10236,8 +10236,8 @@
         </p:nvSpPr>
         <p:spPr>
           <a:xfrm>
-            <a:off x="779511" y="2892884"/>
-            <a:ext cx="4724709" cy="615553"/>
+            <a:off x="3731839" y="5423413"/>
+            <a:ext cx="2607337" cy="615553"/>
           </a:xfrm>
           <a:prstGeom prst="rect">
             <a:avLst/>
@@ -10268,8 +10268,8 @@
         </p:nvSpPr>
         <p:spPr>
           <a:xfrm>
-            <a:off x="779511" y="2892884"/>
-            <a:ext cx="4724709" cy="615553"/>
+            <a:off x="3731839" y="5423413"/>
+            <a:ext cx="2607337" cy="615553"/>
           </a:xfrm>
           <a:prstGeom prst="rect">
             <a:avLst/>
@@ -10300,8 +10300,8 @@
         </p:nvSpPr>
         <p:spPr>
           <a:xfrm>
-            <a:off x="779511" y="2892884"/>
-            <a:ext cx="4724709" cy="615553"/>
+            <a:off x="3731839" y="5423413"/>
+            <a:ext cx="2607337" cy="615553"/>
           </a:xfrm>
           <a:prstGeom prst="rect">
             <a:avLst/>
@@ -10332,8 +10332,8 @@
         </p:nvSpPr>
         <p:spPr>
           <a:xfrm>
-            <a:off x="779511" y="2892884"/>
-            <a:ext cx="4724709" cy="615553"/>
+            <a:off x="3731839" y="5423413"/>
+            <a:ext cx="2607337" cy="615553"/>
           </a:xfrm>
           <a:prstGeom prst="rect">
             <a:avLst/>
@@ -10364,8 +10364,8 @@
         </p:nvSpPr>
         <p:spPr>
           <a:xfrm>
-            <a:off x="779511" y="2892884"/>
-            <a:ext cx="4724709" cy="615553"/>
+            <a:off x="3731839" y="5423413"/>
+            <a:ext cx="2607337" cy="615553"/>
           </a:xfrm>
           <a:prstGeom prst="rect">
             <a:avLst/>
@@ -10396,8 +10396,8 @@
         </p:nvSpPr>
         <p:spPr>
           <a:xfrm>
-            <a:off x="779511" y="2892884"/>
-            <a:ext cx="4724709" cy="615553"/>
+            <a:off x="3731839" y="5423413"/>
+            <a:ext cx="2607337" cy="615553"/>
           </a:xfrm>
           <a:prstGeom prst="rect">
             <a:avLst/>
@@ -10428,8 +10428,8 @@
         </p:nvSpPr>
         <p:spPr>
           <a:xfrm>
-            <a:off x="779511" y="2892884"/>
-            <a:ext cx="4724709" cy="615553"/>
+            <a:off x="3731839" y="5423413"/>
+            <a:ext cx="2607337" cy="615553"/>
           </a:xfrm>
           <a:prstGeom prst="rect">
             <a:avLst/>
@@ -10460,8 +10460,8 @@
         </p:nvSpPr>
         <p:spPr>
           <a:xfrm>
-            <a:off x="779511" y="2892884"/>
-            <a:ext cx="4724709" cy="615553"/>
+            <a:off x="3731839" y="5423413"/>
+            <a:ext cx="2607337" cy="615553"/>
           </a:xfrm>
           <a:prstGeom prst="rect">
             <a:avLst/>
@@ -10481,49 +10481,6 @@
               <a:t>$D</a:t>
             </a:r>
             <a:endParaRPr lang="cs-CZ" sz="3400" dirty="0"/>
-          </a:p>
-        </p:txBody>
-      </p:sp>
-      <p:sp>
-        <p:nvSpPr>
-          <p:cNvPr id="77" name="TextovéPole 76"/>
-          <p:cNvSpPr txBox="1"/>
-          <p:nvPr/>
-        </p:nvSpPr>
-        <p:spPr>
-          <a:xfrm>
-            <a:off x="7271317" y="2348880"/>
-            <a:ext cx="1621163" cy="584775"/>
-          </a:xfrm>
-          <a:prstGeom prst="rect">
-            <a:avLst/>
-          </a:prstGeom>
-          <a:solidFill>
-            <a:schemeClr val="bg1"/>
-          </a:solidFill>
-          <a:ln>
-            <a:solidFill>
-              <a:schemeClr val="tx1"/>
-            </a:solidFill>
-            <a:prstDash val="solid"/>
-          </a:ln>
-        </p:spPr>
-        <p:txBody>
-          <a:bodyPr wrap="square" rtlCol="0">
-            <a:spAutoFit/>
-          </a:bodyPr>
-          <a:lstStyle/>
-          <a:p>
-            <a:pPr algn="ctr"/>
-            <a:r>
-              <a:rPr lang="en-US" sz="3200" dirty="0"/>
-              <a:t>!x&amp;&amp;y</a:t>
-            </a:r>
-            <a:endParaRPr lang="cs-CZ" sz="3200" dirty="0">
-              <a:solidFill>
-                <a:srgbClr val="FF0000"/>
-              </a:solidFill>
-            </a:endParaRPr>
           </a:p>
         </p:txBody>
       </p:sp>

</xml_diff>

<commit_message>
Popisky k obrázkům, upravena zarážka.
</commit_message>
<xml_diff>
--- a/docs/prezentace.pptx
+++ b/docs/prezentace.pptx
@@ -2555,7 +2555,7 @@
           <a:p>
             <a:fld id="{1F06EB26-DD9D-43B9-A8A9-BB5142A01BE2}" type="datetime8">
               <a:rPr lang="en-150" smtClean="0"/>
-              <a:t>12/14/2016 18:35</a:t>
+              <a:t>14/12/2016 19:19</a:t>
             </a:fld>
             <a:endParaRPr lang="en-150" dirty="0"/>
           </a:p>
@@ -2777,7 +2777,7 @@
           <a:p>
             <a:fld id="{7307E821-782C-4746-9F61-64DDC0450AB3}" type="datetime8">
               <a:rPr lang="en-150" smtClean="0"/>
-              <a:t>12/14/2016 18:35</a:t>
+              <a:t>14/12/2016 19:19</a:t>
             </a:fld>
             <a:endParaRPr lang="en-150"/>
           </a:p>
@@ -2957,7 +2957,7 @@
           <a:p>
             <a:fld id="{D45B8E45-F186-418E-94E2-64E602834796}" type="datetime8">
               <a:rPr lang="en-150" smtClean="0"/>
-              <a:t>12/14/2016 18:35</a:t>
+              <a:t>14/12/2016 19:19</a:t>
             </a:fld>
             <a:endParaRPr lang="en-150"/>
           </a:p>
@@ -3579,7 +3579,7 @@
           <a:p>
             <a:fld id="{18F9EDC9-AFBA-4C40-9BB4-697BD56049CF}" type="datetime8">
               <a:rPr lang="en-150" smtClean="0"/>
-              <a:t>12/14/2016 18:35</a:t>
+              <a:t>14/12/2016 19:19</a:t>
             </a:fld>
             <a:endParaRPr lang="en-150"/>
           </a:p>
@@ -3836,7 +3836,7 @@
             <a:fld id="{68D751F2-C7E9-4775-BE8E-824CD7C75291}" type="datetime8">
               <a:rPr lang="en-150" smtClean="0"/>
               <a:pPr/>
-              <a:t>12/14/2016 18:35</a:t>
+              <a:t>14/12/2016 19:19</a:t>
             </a:fld>
             <a:endParaRPr lang="en-150"/>
           </a:p>
@@ -4085,7 +4085,7 @@
           <a:p>
             <a:fld id="{EA4320CA-C850-4386-BE30-5C4ED912B6EF}" type="datetime8">
               <a:rPr lang="en-150" smtClean="0"/>
-              <a:t>12/14/2016 18:35</a:t>
+              <a:t>14/12/2016 19:19</a:t>
             </a:fld>
             <a:endParaRPr lang="en-150"/>
           </a:p>
@@ -4452,7 +4452,7 @@
           <a:p>
             <a:fld id="{C01FE258-AD17-46FD-8C7C-4FA8CBA36D42}" type="datetime8">
               <a:rPr lang="en-150" smtClean="0"/>
-              <a:t>12/14/2016 18:35</a:t>
+              <a:t>14/12/2016 19:19</a:t>
             </a:fld>
             <a:endParaRPr lang="en-150"/>
           </a:p>
@@ -4570,7 +4570,7 @@
           <a:p>
             <a:fld id="{42A97EB4-EBEC-4FBE-BC73-CC4101237DB8}" type="datetime8">
               <a:rPr lang="en-150" smtClean="0"/>
-              <a:t>12/14/2016 18:35</a:t>
+              <a:t>14/12/2016 19:19</a:t>
             </a:fld>
             <a:endParaRPr lang="en-150"/>
           </a:p>
@@ -4665,7 +4665,7 @@
           <a:p>
             <a:fld id="{101E2C3B-894B-41C2-B150-6EB0A043C8AC}" type="datetime8">
               <a:rPr lang="en-150" smtClean="0"/>
-              <a:t>12/14/2016 18:35</a:t>
+              <a:t>14/12/2016 19:19</a:t>
             </a:fld>
             <a:endParaRPr lang="en-150"/>
           </a:p>
@@ -4942,7 +4942,7 @@
           <a:p>
             <a:fld id="{C5C22882-DBD6-438F-87B6-D3A6ED4BB9CB}" type="datetime8">
               <a:rPr lang="en-150" smtClean="0"/>
-              <a:t>12/14/2016 18:35</a:t>
+              <a:t>14/12/2016 19:19</a:t>
             </a:fld>
             <a:endParaRPr lang="en-150"/>
           </a:p>
@@ -5195,7 +5195,7 @@
           <a:p>
             <a:fld id="{8EC26B56-D89F-40C9-AF42-B521A92485B8}" type="datetime8">
               <a:rPr lang="en-150" smtClean="0"/>
-              <a:t>12/14/2016 18:35</a:t>
+              <a:t>14/12/2016 19:19</a:t>
             </a:fld>
             <a:endParaRPr lang="en-150"/>
           </a:p>
@@ -5502,7 +5502,7 @@
             <a:fld id="{52D9D283-C366-441B-913D-EA9C8D5A0C53}" type="datetime8">
               <a:rPr lang="en-150" smtClean="0"/>
               <a:pPr/>
-              <a:t>12/14/2016 18:35</a:t>
+              <a:t>14/12/2016 19:19</a:t>
             </a:fld>
             <a:endParaRPr lang="en-150" dirty="0"/>
           </a:p>
@@ -6941,14 +6941,60 @@
         </p:blipFill>
         <p:spPr>
           <a:xfrm>
-            <a:off x="3059832" y="763983"/>
-            <a:ext cx="5957726" cy="5391672"/>
+            <a:off x="3293102" y="757023"/>
+            <a:ext cx="5724456" cy="5180566"/>
           </a:xfrm>
           <a:prstGeom prst="rect">
             <a:avLst/>
           </a:prstGeom>
         </p:spPr>
       </p:pic>
+      <p:sp>
+        <p:nvSpPr>
+          <p:cNvPr id="7" name="TextovéPole 6"/>
+          <p:cNvSpPr txBox="1"/>
+          <p:nvPr/>
+        </p:nvSpPr>
+        <p:spPr>
+          <a:xfrm>
+            <a:off x="4875572" y="5917464"/>
+            <a:ext cx="2970242" cy="307777"/>
+          </a:xfrm>
+          <a:prstGeom prst="rect">
+            <a:avLst/>
+          </a:prstGeom>
+          <a:noFill/>
+        </p:spPr>
+        <p:txBody>
+          <a:bodyPr wrap="square" rtlCol="0">
+            <a:spAutoFit/>
+          </a:bodyPr>
+          <a:lstStyle/>
+          <a:p>
+            <a:r>
+              <a:rPr lang="en-US" sz="1400" dirty="0" err="1"/>
+              <a:t>Obr</a:t>
+            </a:r>
+            <a:r>
+              <a:rPr lang="cs-CZ" sz="1400" dirty="0"/>
+              <a:t> 7</a:t>
+            </a:r>
+            <a:r>
+              <a:rPr lang="en-US" sz="1400" dirty="0"/>
+              <a:t>. </a:t>
+            </a:r>
+            <a:r>
+              <a:rPr lang="cs-CZ" sz="1400" dirty="0"/>
+              <a:t>– Přehled činnosti na </a:t>
+            </a:r>
+            <a:r>
+              <a:rPr lang="cs-CZ" sz="1400" dirty="0" err="1"/>
+              <a:t>GitHubu</a:t>
+            </a:r>
+            <a:endParaRPr lang="cs-CZ" sz="1400" dirty="0"/>
+          </a:p>
+        </p:txBody>
+      </p:sp>
     </p:spTree>
     <p:extLst>
       <p:ext uri="{BB962C8B-B14F-4D97-AF65-F5344CB8AC3E}">
@@ -7016,8 +7062,8 @@
         </p:nvSpPr>
         <p:spPr>
           <a:xfrm>
-            <a:off x="323528" y="924469"/>
-            <a:ext cx="8568952" cy="3709056"/>
+            <a:off x="323528" y="836712"/>
+            <a:ext cx="8568952" cy="3796813"/>
           </a:xfrm>
         </p:spPr>
         <p:txBody>
@@ -7078,26 +7124,26 @@
           <a:p>
             <a:pPr lvl="1"/>
             <a:r>
-              <a:rPr lang="cs-CZ" dirty="0"/>
+              <a:rPr lang="cs-CZ" sz="2200" dirty="0"/>
               <a:t>Spouštění skriptem s kontrolou výstupu Javy SE 8</a:t>
             </a:r>
           </a:p>
           <a:p>
             <a:pPr lvl="2"/>
             <a:r>
-              <a:rPr lang="en-US" i="1" dirty="0"/>
+              <a:rPr lang="en-US" sz="1900" i="1" dirty="0"/>
               <a:t>návratovýKód_názevProgramu.ifj16</a:t>
             </a:r>
-            <a:endParaRPr lang="cs-CZ" i="1" dirty="0"/>
+            <a:endParaRPr lang="cs-CZ" sz="1900" i="1" dirty="0"/>
           </a:p>
           <a:p>
             <a:pPr lvl="2"/>
             <a:r>
-              <a:rPr lang="en-US" i="1" dirty="0" err="1"/>
+              <a:rPr lang="en-US" sz="1900" i="1" dirty="0" err="1"/>
               <a:t>návratovýKód_názevProgramu.i</a:t>
             </a:r>
             <a:r>
-              <a:rPr lang="cs-CZ" i="1" dirty="0"/>
+              <a:rPr lang="cs-CZ" sz="1900" i="1" dirty="0"/>
               <a:t>n</a:t>
             </a:r>
           </a:p>
@@ -7169,7 +7215,7 @@
         </p:blipFill>
         <p:spPr>
           <a:xfrm>
-            <a:off x="978995" y="4725144"/>
+            <a:off x="903289" y="4509120"/>
             <a:ext cx="7409429" cy="1553854"/>
           </a:xfrm>
           <a:prstGeom prst="rect">
@@ -7177,6 +7223,47 @@
           </a:prstGeom>
         </p:spPr>
       </p:pic>
+      <p:sp>
+        <p:nvSpPr>
+          <p:cNvPr id="8" name="TextovéPole 7"/>
+          <p:cNvSpPr txBox="1"/>
+          <p:nvPr/>
+        </p:nvSpPr>
+        <p:spPr>
+          <a:xfrm>
+            <a:off x="3923928" y="6042878"/>
+            <a:ext cx="1701146" cy="318354"/>
+          </a:xfrm>
+          <a:prstGeom prst="rect">
+            <a:avLst/>
+          </a:prstGeom>
+          <a:noFill/>
+        </p:spPr>
+        <p:txBody>
+          <a:bodyPr wrap="square" rtlCol="0">
+            <a:spAutoFit/>
+          </a:bodyPr>
+          <a:lstStyle/>
+          <a:p>
+            <a:r>
+              <a:rPr lang="en-US" sz="1400" dirty="0" err="1"/>
+              <a:t>Obr</a:t>
+            </a:r>
+            <a:r>
+              <a:rPr lang="cs-CZ" sz="1400" dirty="0"/>
+              <a:t> 8</a:t>
+            </a:r>
+            <a:r>
+              <a:rPr lang="en-US" sz="1400" dirty="0"/>
+              <a:t>. </a:t>
+            </a:r>
+            <a:r>
+              <a:rPr lang="cs-CZ" sz="1400" dirty="0"/>
+              <a:t>– Výpis testů</a:t>
+            </a:r>
+          </a:p>
+        </p:txBody>
+      </p:sp>
     </p:spTree>
     <p:extLst>
       <p:ext uri="{BB962C8B-B14F-4D97-AF65-F5344CB8AC3E}">
@@ -7817,6 +7904,47 @@
           </a:fontRef>
         </p:style>
       </p:cxnSp>
+      <p:sp>
+        <p:nvSpPr>
+          <p:cNvPr id="16" name="TextovéPole 15"/>
+          <p:cNvSpPr txBox="1"/>
+          <p:nvPr/>
+        </p:nvSpPr>
+        <p:spPr>
+          <a:xfrm>
+            <a:off x="3554931" y="5753595"/>
+            <a:ext cx="2466186" cy="315882"/>
+          </a:xfrm>
+          <a:prstGeom prst="rect">
+            <a:avLst/>
+          </a:prstGeom>
+          <a:noFill/>
+        </p:spPr>
+        <p:txBody>
+          <a:bodyPr wrap="square" rtlCol="0">
+            <a:spAutoFit/>
+          </a:bodyPr>
+          <a:lstStyle/>
+          <a:p>
+            <a:r>
+              <a:rPr lang="en-US" sz="1400" dirty="0" err="1"/>
+              <a:t>Obr</a:t>
+            </a:r>
+            <a:r>
+              <a:rPr lang="cs-CZ" sz="1400" dirty="0"/>
+              <a:t> 1</a:t>
+            </a:r>
+            <a:r>
+              <a:rPr lang="en-US" sz="1400" dirty="0"/>
+              <a:t>. </a:t>
+            </a:r>
+            <a:r>
+              <a:rPr lang="cs-CZ" sz="1400" dirty="0"/>
+              <a:t>– Schéma projektu</a:t>
+            </a:r>
+          </a:p>
+        </p:txBody>
+      </p:sp>
     </p:spTree>
     <p:extLst>
       <p:ext uri="{BB962C8B-B14F-4D97-AF65-F5344CB8AC3E}">
@@ -7869,7 +7997,7 @@
         </p:blipFill>
         <p:spPr>
           <a:xfrm>
-            <a:off x="1260000" y="3060000"/>
+            <a:off x="1296895" y="2708920"/>
             <a:ext cx="6550588" cy="3240000"/>
           </a:xfrm>
           <a:prstGeom prst="rect">
@@ -7899,7 +8027,7 @@
         </p:blipFill>
         <p:spPr>
           <a:xfrm>
-            <a:off x="1260000" y="3060000"/>
+            <a:off x="1296895" y="2708920"/>
             <a:ext cx="6550588" cy="3240000"/>
           </a:xfrm>
           <a:prstGeom prst="rect">
@@ -7929,7 +8057,7 @@
         </p:blipFill>
         <p:spPr>
           <a:xfrm>
-            <a:off x="1260000" y="3060000"/>
+            <a:off x="1296895" y="2708920"/>
             <a:ext cx="6550588" cy="3240000"/>
           </a:xfrm>
           <a:prstGeom prst="rect">
@@ -7959,7 +8087,7 @@
         </p:blipFill>
         <p:spPr>
           <a:xfrm>
-            <a:off x="1260000" y="3060000"/>
+            <a:off x="1296895" y="2708920"/>
             <a:ext cx="6550588" cy="3240000"/>
           </a:xfrm>
           <a:prstGeom prst="rect">
@@ -7989,7 +8117,7 @@
         </p:blipFill>
         <p:spPr>
           <a:xfrm>
-            <a:off x="1260000" y="3060000"/>
+            <a:off x="1296895" y="2708920"/>
             <a:ext cx="6550588" cy="3240000"/>
           </a:xfrm>
           <a:prstGeom prst="rect">
@@ -8019,7 +8147,7 @@
         </p:blipFill>
         <p:spPr>
           <a:xfrm>
-            <a:off x="1260000" y="3060000"/>
+            <a:off x="1296895" y="2708920"/>
             <a:ext cx="6550588" cy="3240000"/>
           </a:xfrm>
           <a:prstGeom prst="rect">
@@ -8197,6 +8325,47 @@
               <a:t>3</a:t>
             </a:fld>
             <a:endParaRPr lang="en-150"/>
+          </a:p>
+        </p:txBody>
+      </p:sp>
+      <p:sp>
+        <p:nvSpPr>
+          <p:cNvPr id="12" name="TextovéPole 11"/>
+          <p:cNvSpPr txBox="1"/>
+          <p:nvPr/>
+        </p:nvSpPr>
+        <p:spPr>
+          <a:xfrm>
+            <a:off x="3420186" y="5889488"/>
+            <a:ext cx="2663982" cy="307777"/>
+          </a:xfrm>
+          <a:prstGeom prst="rect">
+            <a:avLst/>
+          </a:prstGeom>
+          <a:noFill/>
+        </p:spPr>
+        <p:txBody>
+          <a:bodyPr wrap="square" rtlCol="0">
+            <a:spAutoFit/>
+          </a:bodyPr>
+          <a:lstStyle/>
+          <a:p>
+            <a:r>
+              <a:rPr lang="en-US" sz="1400" dirty="0" err="1"/>
+              <a:t>Obr</a:t>
+            </a:r>
+            <a:r>
+              <a:rPr lang="cs-CZ" sz="1400" dirty="0"/>
+              <a:t> 2</a:t>
+            </a:r>
+            <a:r>
+              <a:rPr lang="en-US" sz="1400" dirty="0"/>
+              <a:t>. </a:t>
+            </a:r>
+            <a:r>
+              <a:rPr lang="cs-CZ" sz="1400" dirty="0"/>
+              <a:t>– Část KA lexikální analýzy</a:t>
+            </a:r>
           </a:p>
         </p:txBody>
       </p:sp>
@@ -8691,79 +8860,28 @@
           <a:lstStyle/>
           <a:p>
             <a:r>
-              <a:rPr lang="sk-SK" sz="2450" dirty="0"/>
-              <a:t>Používaná na </a:t>
-            </a:r>
-            <a:r>
-              <a:rPr lang="sk-SK" sz="2450" dirty="0" err="1"/>
-              <a:t>vyhodnocování</a:t>
-            </a:r>
-            <a:r>
-              <a:rPr lang="sk-SK" sz="2450" dirty="0"/>
-              <a:t> </a:t>
-            </a:r>
-            <a:r>
-              <a:rPr lang="sk-SK" sz="2450" dirty="0" err="1"/>
-              <a:t>výrazů</a:t>
-            </a:r>
-            <a:endParaRPr lang="sk-SK" sz="2450" dirty="0"/>
-          </a:p>
-          <a:p>
-            <a:r>
-              <a:rPr lang="sk-SK" sz="2450" dirty="0" err="1"/>
-              <a:t>Řízená</a:t>
-            </a:r>
-            <a:r>
-              <a:rPr lang="sk-SK" sz="2450" dirty="0"/>
-              <a:t> pomocí </a:t>
-            </a:r>
-            <a:r>
-              <a:rPr lang="sk-SK" sz="2450" dirty="0" err="1"/>
-              <a:t>precedenčí</a:t>
-            </a:r>
-            <a:r>
-              <a:rPr lang="sk-SK" sz="2450" dirty="0"/>
-              <a:t> </a:t>
-            </a:r>
-            <a:r>
-              <a:rPr lang="sk-SK" sz="2450" dirty="0" err="1"/>
-              <a:t>tabulky</a:t>
-            </a:r>
-            <a:endParaRPr lang="sk-SK" sz="2450" dirty="0"/>
-          </a:p>
-          <a:p>
-            <a:r>
-              <a:rPr lang="sk-SK" sz="2450" dirty="0"/>
-              <a:t>Vstupní tokeny </a:t>
-            </a:r>
-            <a:r>
-              <a:rPr lang="sk-SK" sz="2450" dirty="0" err="1"/>
-              <a:t>jsou</a:t>
-            </a:r>
-            <a:r>
-              <a:rPr lang="sk-SK" sz="2450" dirty="0"/>
-              <a:t> postupne </a:t>
-            </a:r>
-            <a:r>
-              <a:rPr lang="sk-SK" sz="2450" dirty="0" err="1"/>
-              <a:t>vkládány</a:t>
-            </a:r>
-            <a:r>
-              <a:rPr lang="sk-SK" sz="2450" dirty="0"/>
-              <a:t> na zásobník </a:t>
+              <a:rPr lang="cs-CZ" sz="2450" dirty="0"/>
+              <a:t>Používaná na vyhodnocování výrazů</a:t>
+            </a:r>
+          </a:p>
+          <a:p>
+            <a:r>
+              <a:rPr lang="cs-CZ" sz="2450" dirty="0"/>
+              <a:t>Řízená pomocí precedenční tabulky</a:t>
+            </a:r>
+          </a:p>
+          <a:p>
+            <a:r>
+              <a:rPr lang="cs-CZ" sz="2450" dirty="0"/>
+              <a:t>Vstupní tokeny jsou postupně vkládány na zásobník </a:t>
             </a:r>
             <a:br>
-              <a:rPr lang="sk-SK" sz="2450" dirty="0"/>
+              <a:rPr lang="cs-CZ" sz="2450" dirty="0"/>
             </a:br>
             <a:r>
-              <a:rPr lang="sk-SK" sz="2450" dirty="0"/>
-              <a:t>a redukovaný pomocí </a:t>
-            </a:r>
-            <a:r>
-              <a:rPr lang="sk-SK" sz="2450" dirty="0" err="1"/>
-              <a:t>pravidel</a:t>
-            </a:r>
-            <a:endParaRPr lang="sk-SK" sz="2450" dirty="0"/>
+              <a:rPr lang="cs-CZ" sz="2450" dirty="0"/>
+              <a:t>a redukovány pomocí pravidel</a:t>
+            </a:r>
           </a:p>
           <a:p>
             <a:endParaRPr lang="cs-CZ" sz="2450" i="1" dirty="0"/>
@@ -9450,7 +9568,7 @@
         </p:nvCxnSpPr>
         <p:spPr>
           <a:xfrm flipV="1">
-            <a:off x="7396692" y="3508437"/>
+            <a:off x="7246741" y="3630668"/>
             <a:ext cx="559306" cy="255231"/>
           </a:xfrm>
           <a:prstGeom prst="line">
@@ -9488,7 +9606,7 @@
         </p:nvCxnSpPr>
         <p:spPr>
           <a:xfrm flipV="1">
-            <a:off x="7391053" y="4523642"/>
+            <a:off x="7241102" y="4645873"/>
             <a:ext cx="5639" cy="351705"/>
           </a:xfrm>
           <a:prstGeom prst="line">
@@ -9526,7 +9644,7 @@
         </p:nvCxnSpPr>
         <p:spPr>
           <a:xfrm flipH="1" flipV="1">
-            <a:off x="7955998" y="3508437"/>
+            <a:off x="7806047" y="3630668"/>
             <a:ext cx="518740" cy="255231"/>
           </a:xfrm>
           <a:prstGeom prst="line">
@@ -9561,7 +9679,7 @@
         </p:nvSpPr>
         <p:spPr>
           <a:xfrm>
-            <a:off x="7011065" y="4875347"/>
+            <a:off x="6861114" y="4997578"/>
             <a:ext cx="759975" cy="759974"/>
           </a:xfrm>
           <a:prstGeom prst="ellipse">
@@ -9623,7 +9741,7 @@
         </p:nvSpPr>
         <p:spPr>
           <a:xfrm>
-            <a:off x="8094750" y="3763668"/>
+            <a:off x="7944799" y="3885899"/>
             <a:ext cx="759975" cy="759974"/>
           </a:xfrm>
           <a:prstGeom prst="ellipse">
@@ -9685,7 +9803,7 @@
         </p:nvSpPr>
         <p:spPr>
           <a:xfrm>
-            <a:off x="7016704" y="3763668"/>
+            <a:off x="6866753" y="3885899"/>
             <a:ext cx="759975" cy="759974"/>
           </a:xfrm>
           <a:prstGeom prst="ellipse">
@@ -9747,7 +9865,7 @@
         </p:nvSpPr>
         <p:spPr>
           <a:xfrm>
-            <a:off x="7576010" y="2748463"/>
+            <a:off x="7426059" y="2870694"/>
             <a:ext cx="759975" cy="759974"/>
           </a:xfrm>
           <a:prstGeom prst="ellipse">
@@ -9809,7 +9927,7 @@
         </p:nvGrpSpPr>
         <p:grpSpPr>
           <a:xfrm>
-            <a:off x="3622831" y="5301208"/>
+            <a:off x="3398892" y="5187527"/>
             <a:ext cx="2821377" cy="873250"/>
             <a:chOff x="611560" y="2869986"/>
             <a:chExt cx="4826359" cy="694075"/>
@@ -10106,7 +10224,7 @@
         </p:nvSpPr>
         <p:spPr>
           <a:xfrm>
-            <a:off x="917505" y="5445224"/>
+            <a:off x="918000" y="5446800"/>
             <a:ext cx="1782287" cy="615553"/>
           </a:xfrm>
           <a:prstGeom prst="rect">
@@ -10204,7 +10322,7 @@
         </p:nvSpPr>
         <p:spPr>
           <a:xfrm>
-            <a:off x="3731839" y="5423413"/>
+            <a:off x="3510000" y="5310000"/>
             <a:ext cx="2607337" cy="615553"/>
           </a:xfrm>
           <a:prstGeom prst="rect">
@@ -10236,7 +10354,7 @@
         </p:nvSpPr>
         <p:spPr>
           <a:xfrm>
-            <a:off x="3731839" y="5423413"/>
+            <a:off x="3510000" y="5310000"/>
             <a:ext cx="2607337" cy="615553"/>
           </a:xfrm>
           <a:prstGeom prst="rect">
@@ -10268,7 +10386,7 @@
         </p:nvSpPr>
         <p:spPr>
           <a:xfrm>
-            <a:off x="3731839" y="5423413"/>
+            <a:off x="3510000" y="5310000"/>
             <a:ext cx="2607337" cy="615553"/>
           </a:xfrm>
           <a:prstGeom prst="rect">
@@ -10300,7 +10418,7 @@
         </p:nvSpPr>
         <p:spPr>
           <a:xfrm>
-            <a:off x="3731839" y="5423413"/>
+            <a:off x="3510000" y="5310000"/>
             <a:ext cx="2607337" cy="615553"/>
           </a:xfrm>
           <a:prstGeom prst="rect">
@@ -10332,7 +10450,7 @@
         </p:nvSpPr>
         <p:spPr>
           <a:xfrm>
-            <a:off x="3731839" y="5423413"/>
+            <a:off x="3510000" y="5310000"/>
             <a:ext cx="2607337" cy="615553"/>
           </a:xfrm>
           <a:prstGeom prst="rect">
@@ -10364,7 +10482,7 @@
         </p:nvSpPr>
         <p:spPr>
           <a:xfrm>
-            <a:off x="3731839" y="5423413"/>
+            <a:off x="3510000" y="5310000"/>
             <a:ext cx="2607337" cy="615553"/>
           </a:xfrm>
           <a:prstGeom prst="rect">
@@ -10382,7 +10500,7 @@
           <a:p>
             <a:r>
               <a:rPr lang="en-US" sz="3400" dirty="0"/>
-              <a:t>$B&amp;&amp;</a:t>
+              <a:t>$&lt;B&amp;&amp;</a:t>
             </a:r>
             <a:endParaRPr lang="cs-CZ" sz="3400" dirty="0"/>
           </a:p>
@@ -10396,7 +10514,7 @@
         </p:nvSpPr>
         <p:spPr>
           <a:xfrm>
-            <a:off x="3731839" y="5423413"/>
+            <a:off x="3510000" y="5310000"/>
             <a:ext cx="2607337" cy="615553"/>
           </a:xfrm>
           <a:prstGeom prst="rect">
@@ -10414,7 +10532,7 @@
           <a:p>
             <a:r>
               <a:rPr lang="en-US" sz="3400" dirty="0"/>
-              <a:t>$B&amp;&amp;&lt;y</a:t>
+              <a:t>$&lt;B&amp;&amp;&lt;y</a:t>
             </a:r>
             <a:endParaRPr lang="cs-CZ" sz="3400" dirty="0"/>
           </a:p>
@@ -10428,7 +10546,7 @@
         </p:nvSpPr>
         <p:spPr>
           <a:xfrm>
-            <a:off x="3731839" y="5423413"/>
+            <a:off x="3510000" y="5310000"/>
             <a:ext cx="2607337" cy="615553"/>
           </a:xfrm>
           <a:prstGeom prst="rect">
@@ -10446,7 +10564,7 @@
           <a:p>
             <a:r>
               <a:rPr lang="en-US" sz="3400" dirty="0"/>
-              <a:t>$B&amp;&amp;C</a:t>
+              <a:t>$&lt;B&amp;&amp;C</a:t>
             </a:r>
             <a:endParaRPr lang="cs-CZ" sz="3400" dirty="0"/>
           </a:p>
@@ -10460,7 +10578,7 @@
         </p:nvSpPr>
         <p:spPr>
           <a:xfrm>
-            <a:off x="3731839" y="5423413"/>
+            <a:off x="3510000" y="5310000"/>
             <a:ext cx="2607337" cy="615553"/>
           </a:xfrm>
           <a:prstGeom prst="rect">
@@ -10481,6 +10599,88 @@
               <a:t>$D</a:t>
             </a:r>
             <a:endParaRPr lang="cs-CZ" sz="3400" dirty="0"/>
+          </a:p>
+        </p:txBody>
+      </p:sp>
+      <p:sp>
+        <p:nvSpPr>
+          <p:cNvPr id="32" name="TextovéPole 31"/>
+          <p:cNvSpPr txBox="1"/>
+          <p:nvPr/>
+        </p:nvSpPr>
+        <p:spPr>
+          <a:xfrm>
+            <a:off x="611560" y="4722160"/>
+            <a:ext cx="4176464" cy="307777"/>
+          </a:xfrm>
+          <a:prstGeom prst="rect">
+            <a:avLst/>
+          </a:prstGeom>
+          <a:noFill/>
+        </p:spPr>
+        <p:txBody>
+          <a:bodyPr wrap="square" rtlCol="0">
+            <a:spAutoFit/>
+          </a:bodyPr>
+          <a:lstStyle/>
+          <a:p>
+            <a:r>
+              <a:rPr lang="en-US" sz="1400" dirty="0" err="1"/>
+              <a:t>Obr</a:t>
+            </a:r>
+            <a:r>
+              <a:rPr lang="cs-CZ" sz="1400" dirty="0"/>
+              <a:t> 3</a:t>
+            </a:r>
+            <a:r>
+              <a:rPr lang="en-US" sz="1400" dirty="0"/>
+              <a:t>. </a:t>
+            </a:r>
+            <a:r>
+              <a:rPr lang="cs-CZ" sz="1400" dirty="0"/>
+              <a:t>– Část precedenční tabulky</a:t>
+            </a:r>
+          </a:p>
+        </p:txBody>
+      </p:sp>
+      <p:sp>
+        <p:nvSpPr>
+          <p:cNvPr id="36" name="TextovéPole 35"/>
+          <p:cNvSpPr txBox="1"/>
+          <p:nvPr/>
+        </p:nvSpPr>
+        <p:spPr>
+          <a:xfrm>
+            <a:off x="6714326" y="5849422"/>
+            <a:ext cx="2466186" cy="315882"/>
+          </a:xfrm>
+          <a:prstGeom prst="rect">
+            <a:avLst/>
+          </a:prstGeom>
+          <a:noFill/>
+        </p:spPr>
+        <p:txBody>
+          <a:bodyPr wrap="square" rtlCol="0">
+            <a:spAutoFit/>
+          </a:bodyPr>
+          <a:lstStyle/>
+          <a:p>
+            <a:r>
+              <a:rPr lang="en-US" sz="1400" dirty="0" err="1"/>
+              <a:t>Obr</a:t>
+            </a:r>
+            <a:r>
+              <a:rPr lang="cs-CZ" sz="1400" dirty="0"/>
+              <a:t> 4</a:t>
+            </a:r>
+            <a:r>
+              <a:rPr lang="en-US" sz="1400" dirty="0"/>
+              <a:t>. </a:t>
+            </a:r>
+            <a:r>
+              <a:rPr lang="cs-CZ" sz="1400" dirty="0"/>
+              <a:t>– Binární strom výrazu</a:t>
+            </a:r>
           </a:p>
         </p:txBody>
       </p:sp>
@@ -13727,6 +13927,47 @@
           </a:graphicData>
         </a:graphic>
       </p:graphicFrame>
+      <p:sp>
+        <p:nvSpPr>
+          <p:cNvPr id="7" name="TextovéPole 6"/>
+          <p:cNvSpPr txBox="1"/>
+          <p:nvPr/>
+        </p:nvSpPr>
+        <p:spPr>
+          <a:xfrm>
+            <a:off x="3347864" y="5757604"/>
+            <a:ext cx="2736304" cy="307777"/>
+          </a:xfrm>
+          <a:prstGeom prst="rect">
+            <a:avLst/>
+          </a:prstGeom>
+          <a:noFill/>
+        </p:spPr>
+        <p:txBody>
+          <a:bodyPr wrap="square" rtlCol="0">
+            <a:spAutoFit/>
+          </a:bodyPr>
+          <a:lstStyle/>
+          <a:p>
+            <a:r>
+              <a:rPr lang="en-US" sz="1400" dirty="0" err="1"/>
+              <a:t>Obr</a:t>
+            </a:r>
+            <a:r>
+              <a:rPr lang="cs-CZ" sz="1400" dirty="0"/>
+              <a:t> 5</a:t>
+            </a:r>
+            <a:r>
+              <a:rPr lang="en-US" sz="1400" dirty="0"/>
+              <a:t>. </a:t>
+            </a:r>
+            <a:r>
+              <a:rPr lang="cs-CZ" sz="1400" dirty="0"/>
+              <a:t>– Znázornění KMP algoritmu</a:t>
+            </a:r>
+          </a:p>
+        </p:txBody>
+      </p:sp>
     </p:spTree>
     <p:extLst>
       <p:ext uri="{BB962C8B-B14F-4D97-AF65-F5344CB8AC3E}">
@@ -13797,44 +14038,24 @@
           <a:bodyPr/>
           <a:lstStyle/>
           <a:p>
-            <a:pPr>
-              <a:spcAft>
-                <a:spcPts val="300"/>
-              </a:spcAft>
-            </a:pPr>
             <a:r>
               <a:rPr lang="cs-CZ" sz="2600" dirty="0"/>
               <a:t>Algoritmus pro řazení řetězce podle ordinální hodnoty znaků</a:t>
             </a:r>
           </a:p>
           <a:p>
-            <a:pPr>
-              <a:spcAft>
-                <a:spcPts val="300"/>
-              </a:spcAft>
-            </a:pPr>
             <a:r>
               <a:rPr lang="cs-CZ" sz="2600" dirty="0"/>
-              <a:t>řazení se snižujícím se přírůstkem </a:t>
-            </a:r>
-          </a:p>
-          <a:p>
-            <a:pPr>
-              <a:spcAft>
-                <a:spcPts val="300"/>
-              </a:spcAft>
-            </a:pPr>
+              <a:t>Řazení se snižujícím se přírůstkem </a:t>
+            </a:r>
+          </a:p>
+          <a:p>
             <a:r>
               <a:rPr lang="cs-CZ" sz="2600" dirty="0"/>
               <a:t>První krok je určen polovinou počtu prvků</a:t>
             </a:r>
           </a:p>
           <a:p>
-            <a:pPr>
-              <a:spcAft>
-                <a:spcPts val="300"/>
-              </a:spcAft>
-            </a:pPr>
             <a:r>
               <a:rPr lang="cs-CZ" sz="2600" dirty="0"/>
               <a:t>Asymptotická složitost - </a:t>
@@ -13920,13 +14141,13 @@
           <p:nvPr>
             <p:extLst>
               <p:ext uri="{D42A27DB-BD31-4B8C-83A1-F6EECF244321}">
-                <p14:modId xmlns:p14="http://schemas.microsoft.com/office/powerpoint/2010/main" val="388936572"/>
+                <p14:modId xmlns:p14="http://schemas.microsoft.com/office/powerpoint/2010/main" val="1785479937"/>
               </p:ext>
             </p:extLst>
           </p:nvPr>
         </p:nvGraphicFramePr>
         <p:xfrm>
-          <a:off x="2843808" y="3102265"/>
+          <a:off x="2794395" y="2924944"/>
           <a:ext cx="3627218" cy="3116610"/>
         </p:xfrm>
         <a:graphic>
@@ -13993,7 +14214,7 @@
                   </a:extLst>
                 </a:gridCol>
               </a:tblGrid>
-              <a:tr h="332685">
+              <a:tr h="320992">
                 <a:tc>
                   <a:txBody>
                     <a:bodyPr/>
@@ -14151,7 +14372,7 @@
                   </a:ext>
                 </a:extLst>
               </a:tr>
-              <a:tr h="332685">
+              <a:tr h="320992">
                 <a:tc>
                   <a:txBody>
                     <a:bodyPr/>
@@ -14292,7 +14513,7 @@
                   </a:ext>
                 </a:extLst>
               </a:tr>
-              <a:tr h="332685">
+              <a:tr h="320992">
                 <a:tc>
                   <a:txBody>
                     <a:bodyPr/>
@@ -14431,7 +14652,7 @@
                   </a:ext>
                 </a:extLst>
               </a:tr>
-              <a:tr h="332685">
+              <a:tr h="320992">
                 <a:tc>
                   <a:txBody>
                     <a:bodyPr/>
@@ -14570,7 +14791,7 @@
                   </a:ext>
                 </a:extLst>
               </a:tr>
-              <a:tr h="332685">
+              <a:tr h="320992">
                 <a:tc>
                   <a:txBody>
                     <a:bodyPr/>
@@ -14709,7 +14930,7 @@
                   </a:ext>
                 </a:extLst>
               </a:tr>
-              <a:tr h="332685">
+              <a:tr h="320992">
                 <a:tc>
                   <a:txBody>
                     <a:bodyPr/>
@@ -14855,7 +15076,7 @@
                   </a:ext>
                 </a:extLst>
               </a:tr>
-              <a:tr h="332685">
+              <a:tr h="320992">
                 <a:tc>
                   <a:txBody>
                     <a:bodyPr/>
@@ -14994,7 +15215,7 @@
                   </a:ext>
                 </a:extLst>
               </a:tr>
-              <a:tr h="332685">
+              <a:tr h="320992">
                 <a:tc>
                   <a:txBody>
                     <a:bodyPr/>
@@ -15133,7 +15354,7 @@
                   </a:ext>
                 </a:extLst>
               </a:tr>
-              <a:tr h="332685">
+              <a:tr h="320992">
                 <a:tc>
                   <a:txBody>
                     <a:bodyPr/>
@@ -15283,6 +15504,47 @@
           </a:graphicData>
         </a:graphic>
       </p:graphicFrame>
+      <p:sp>
+        <p:nvSpPr>
+          <p:cNvPr id="7" name="TextovéPole 6"/>
+          <p:cNvSpPr txBox="1"/>
+          <p:nvPr/>
+        </p:nvSpPr>
+        <p:spPr>
+          <a:xfrm>
+            <a:off x="3181367" y="6073551"/>
+            <a:ext cx="2853273" cy="307777"/>
+          </a:xfrm>
+          <a:prstGeom prst="rect">
+            <a:avLst/>
+          </a:prstGeom>
+          <a:noFill/>
+        </p:spPr>
+        <p:txBody>
+          <a:bodyPr wrap="square" rtlCol="0">
+            <a:spAutoFit/>
+          </a:bodyPr>
+          <a:lstStyle/>
+          <a:p>
+            <a:r>
+              <a:rPr lang="en-US" sz="1400" dirty="0" err="1"/>
+              <a:t>Obr</a:t>
+            </a:r>
+            <a:r>
+              <a:rPr lang="cs-CZ" sz="1400" dirty="0"/>
+              <a:t> 6</a:t>
+            </a:r>
+            <a:r>
+              <a:rPr lang="en-US" sz="1400" dirty="0"/>
+              <a:t>. </a:t>
+            </a:r>
+            <a:r>
+              <a:rPr lang="cs-CZ" sz="1400" dirty="0"/>
+              <a:t>– Znázornění algoritmu řazení</a:t>
+            </a:r>
+          </a:p>
+        </p:txBody>
+      </p:sp>
     </p:spTree>
     <p:extLst>
       <p:ext uri="{BB962C8B-B14F-4D97-AF65-F5344CB8AC3E}">

</xml_diff>

<commit_message>
Changed project structure graph
</commit_message>
<xml_diff>
--- a/docs/prezentace.pptx
+++ b/docs/prezentace.pptx
@@ -2555,7 +2555,7 @@
           <a:p>
             <a:fld id="{1F06EB26-DD9D-43B9-A8A9-BB5142A01BE2}" type="datetime8">
               <a:rPr lang="en-150" smtClean="0"/>
-              <a:t>14/12/2016 19:19</a:t>
+              <a:t>12/14/2016 20:07</a:t>
             </a:fld>
             <a:endParaRPr lang="en-150" dirty="0"/>
           </a:p>
@@ -2777,7 +2777,7 @@
           <a:p>
             <a:fld id="{7307E821-782C-4746-9F61-64DDC0450AB3}" type="datetime8">
               <a:rPr lang="en-150" smtClean="0"/>
-              <a:t>14/12/2016 19:19</a:t>
+              <a:t>12/14/2016 20:07</a:t>
             </a:fld>
             <a:endParaRPr lang="en-150"/>
           </a:p>
@@ -2957,7 +2957,7 @@
           <a:p>
             <a:fld id="{D45B8E45-F186-418E-94E2-64E602834796}" type="datetime8">
               <a:rPr lang="en-150" smtClean="0"/>
-              <a:t>14/12/2016 19:19</a:t>
+              <a:t>12/14/2016 20:07</a:t>
             </a:fld>
             <a:endParaRPr lang="en-150"/>
           </a:p>
@@ -3579,7 +3579,7 @@
           <a:p>
             <a:fld id="{18F9EDC9-AFBA-4C40-9BB4-697BD56049CF}" type="datetime8">
               <a:rPr lang="en-150" smtClean="0"/>
-              <a:t>14/12/2016 19:19</a:t>
+              <a:t>12/14/2016 20:07</a:t>
             </a:fld>
             <a:endParaRPr lang="en-150"/>
           </a:p>
@@ -3836,7 +3836,7 @@
             <a:fld id="{68D751F2-C7E9-4775-BE8E-824CD7C75291}" type="datetime8">
               <a:rPr lang="en-150" smtClean="0"/>
               <a:pPr/>
-              <a:t>14/12/2016 19:19</a:t>
+              <a:t>12/14/2016 20:07</a:t>
             </a:fld>
             <a:endParaRPr lang="en-150"/>
           </a:p>
@@ -4085,7 +4085,7 @@
           <a:p>
             <a:fld id="{EA4320CA-C850-4386-BE30-5C4ED912B6EF}" type="datetime8">
               <a:rPr lang="en-150" smtClean="0"/>
-              <a:t>14/12/2016 19:19</a:t>
+              <a:t>12/14/2016 20:07</a:t>
             </a:fld>
             <a:endParaRPr lang="en-150"/>
           </a:p>
@@ -4452,7 +4452,7 @@
           <a:p>
             <a:fld id="{C01FE258-AD17-46FD-8C7C-4FA8CBA36D42}" type="datetime8">
               <a:rPr lang="en-150" smtClean="0"/>
-              <a:t>14/12/2016 19:19</a:t>
+              <a:t>12/14/2016 20:07</a:t>
             </a:fld>
             <a:endParaRPr lang="en-150"/>
           </a:p>
@@ -4570,7 +4570,7 @@
           <a:p>
             <a:fld id="{42A97EB4-EBEC-4FBE-BC73-CC4101237DB8}" type="datetime8">
               <a:rPr lang="en-150" smtClean="0"/>
-              <a:t>14/12/2016 19:19</a:t>
+              <a:t>12/14/2016 20:07</a:t>
             </a:fld>
             <a:endParaRPr lang="en-150"/>
           </a:p>
@@ -4665,7 +4665,7 @@
           <a:p>
             <a:fld id="{101E2C3B-894B-41C2-B150-6EB0A043C8AC}" type="datetime8">
               <a:rPr lang="en-150" smtClean="0"/>
-              <a:t>14/12/2016 19:19</a:t>
+              <a:t>12/14/2016 20:07</a:t>
             </a:fld>
             <a:endParaRPr lang="en-150"/>
           </a:p>
@@ -4942,7 +4942,7 @@
           <a:p>
             <a:fld id="{C5C22882-DBD6-438F-87B6-D3A6ED4BB9CB}" type="datetime8">
               <a:rPr lang="en-150" smtClean="0"/>
-              <a:t>14/12/2016 19:19</a:t>
+              <a:t>12/14/2016 20:07</a:t>
             </a:fld>
             <a:endParaRPr lang="en-150"/>
           </a:p>
@@ -5195,7 +5195,7 @@
           <a:p>
             <a:fld id="{8EC26B56-D89F-40C9-AF42-B521A92485B8}" type="datetime8">
               <a:rPr lang="en-150" smtClean="0"/>
-              <a:t>14/12/2016 19:19</a:t>
+              <a:t>12/14/2016 20:07</a:t>
             </a:fld>
             <a:endParaRPr lang="en-150"/>
           </a:p>
@@ -5502,7 +5502,7 @@
             <a:fld id="{52D9D283-C366-441B-913D-EA9C8D5A0C53}" type="datetime8">
               <a:rPr lang="en-150" smtClean="0"/>
               <a:pPr/>
-              <a:t>14/12/2016 19:19</a:t>
+              <a:t>12/14/2016 20:07</a:t>
             </a:fld>
             <a:endParaRPr lang="en-150" dirty="0"/>
           </a:p>
@@ -6144,40 +6144,6 @@
               <a:buChar char="§"/>
             </a:pPr>
             <a:r>
-              <a:rPr lang="en-US" sz="2200" i="1" baseline="16000" dirty="0"/>
-              <a:t> </a:t>
-            </a:r>
-            <a:r>
-              <a:rPr lang="en-US" sz="2000" i="1" dirty="0">
-                <a:solidFill>
-                  <a:schemeClr val="bg2">
-                    <a:lumMod val="75000"/>
-                  </a:schemeClr>
-                </a:solidFill>
-              </a:rPr>
-              <a:t>(</a:t>
-            </a:r>
-            <a:r>
-              <a:rPr lang="cs-CZ" sz="2000" i="1" dirty="0">
-                <a:solidFill>
-                  <a:schemeClr val="bg2">
-                    <a:lumMod val="75000"/>
-                  </a:schemeClr>
-                </a:solidFill>
-              </a:rPr>
-              <a:t>Vedoucí</a:t>
-            </a:r>
-            <a:r>
-              <a:rPr lang="en-US" sz="2000" i="1" dirty="0">
-                <a:solidFill>
-                  <a:schemeClr val="bg2">
-                    <a:lumMod val="75000"/>
-                  </a:schemeClr>
-                </a:solidFill>
-              </a:rPr>
-              <a:t>) </a:t>
-            </a:r>
-            <a:r>
               <a:rPr lang="cs-CZ" sz="2200" dirty="0"/>
               <a:t>Kyzlink Jiří</a:t>
             </a:r>
@@ -6194,6 +6160,46 @@
                 </a:solidFill>
               </a:rPr>
               <a:t>(xkyzli02)</a:t>
+            </a:r>
+            <a:r>
+              <a:rPr lang="en-US" sz="2000" i="1" dirty="0">
+                <a:solidFill>
+                  <a:schemeClr val="bg2">
+                    <a:lumMod val="75000"/>
+                  </a:schemeClr>
+                </a:solidFill>
+              </a:rPr>
+              <a:t> </a:t>
+            </a:r>
+            <a:r>
+              <a:rPr lang="en-US" i="1" dirty="0">
+                <a:solidFill>
+                  <a:schemeClr val="bg2">
+                    <a:lumMod val="75000"/>
+                  </a:schemeClr>
+                </a:solidFill>
+              </a:rPr>
+              <a:t>(</a:t>
+            </a:r>
+            <a:r>
+              <a:rPr lang="cs-CZ" i="1" dirty="0">
+                <a:solidFill>
+                  <a:schemeClr val="bg2">
+                    <a:lumMod val="75000"/>
+                  </a:schemeClr>
+                </a:solidFill>
+              </a:rPr>
+              <a:t>Vedoucí</a:t>
+            </a:r>
+            <a:r>
+              <a:rPr lang="en-US" i="1" dirty="0">
+                <a:solidFill>
+                  <a:schemeClr val="bg2">
+                    <a:lumMod val="75000"/>
+                  </a:schemeClr>
+                </a:solidFill>
+              </a:rPr>
+              <a:t>)</a:t>
             </a:r>
             <a:endParaRPr lang="cs-CZ" sz="2200" dirty="0"/>
           </a:p>
@@ -7354,248 +7360,16 @@
           <a:chExt cx="0" cy="0"/>
         </a:xfrm>
       </p:grpSpPr>
-      <p:sp>
-        <p:nvSpPr>
-          <p:cNvPr id="2" name="Nadpis 1"/>
-          <p:cNvSpPr>
-            <a:spLocks noGrp="1"/>
-          </p:cNvSpPr>
-          <p:nvPr>
-            <p:ph type="title"/>
-          </p:nvPr>
-        </p:nvSpPr>
-        <p:spPr/>
-        <p:txBody>
-          <a:bodyPr>
-            <a:normAutofit fontScale="90000"/>
-          </a:bodyPr>
-          <a:lstStyle/>
-          <a:p>
-            <a:r>
-              <a:rPr lang="cs-CZ" dirty="0"/>
-              <a:t>Blokové schéma projektu</a:t>
-            </a:r>
-            <a:endParaRPr lang="en-150" dirty="0"/>
-          </a:p>
-        </p:txBody>
-      </p:sp>
-      <p:sp>
-        <p:nvSpPr>
-          <p:cNvPr id="4" name="Zástupný symbol pro zápatí 3"/>
-          <p:cNvSpPr>
-            <a:spLocks noGrp="1"/>
-          </p:cNvSpPr>
-          <p:nvPr>
-            <p:ph type="ftr" sz="quarter" idx="11"/>
-          </p:nvPr>
-        </p:nvSpPr>
-        <p:spPr/>
-        <p:txBody>
-          <a:bodyPr/>
-          <a:lstStyle/>
-          <a:p>
-            <a:endParaRPr lang="en-150" dirty="0"/>
-          </a:p>
-        </p:txBody>
-      </p:sp>
-      <p:sp>
-        <p:nvSpPr>
-          <p:cNvPr id="5" name="Zástupný symbol pro číslo snímku 4"/>
-          <p:cNvSpPr>
-            <a:spLocks noGrp="1"/>
-          </p:cNvSpPr>
-          <p:nvPr>
-            <p:ph type="sldNum" sz="quarter" idx="12"/>
-          </p:nvPr>
-        </p:nvSpPr>
-        <p:spPr/>
-        <p:txBody>
-          <a:bodyPr/>
-          <a:lstStyle/>
-          <a:p>
-            <a:fld id="{35337AD5-3146-404F-9D87-4F437B499F8E}" type="slidenum">
-              <a:rPr lang="en-150" smtClean="0"/>
-              <a:t>2</a:t>
-            </a:fld>
-            <a:endParaRPr lang="en-150"/>
-          </a:p>
-        </p:txBody>
-      </p:sp>
-      <p:sp>
-        <p:nvSpPr>
-          <p:cNvPr id="6" name="Obdélník 5"/>
-          <p:cNvSpPr/>
-          <p:nvPr/>
-        </p:nvSpPr>
-        <p:spPr>
-          <a:xfrm>
-            <a:off x="2771800" y="1743673"/>
-            <a:ext cx="2016224" cy="1308217"/>
-          </a:xfrm>
-          <a:prstGeom prst="rect">
-            <a:avLst/>
-          </a:prstGeom>
-        </p:spPr>
-        <p:style>
-          <a:lnRef idx="2">
-            <a:schemeClr val="accent6">
-              <a:shade val="50000"/>
-            </a:schemeClr>
-          </a:lnRef>
-          <a:fillRef idx="1">
-            <a:schemeClr val="accent6"/>
-          </a:fillRef>
-          <a:effectRef idx="0">
-            <a:schemeClr val="accent6"/>
-          </a:effectRef>
-          <a:fontRef idx="minor">
-            <a:schemeClr val="lt1"/>
-          </a:fontRef>
-        </p:style>
-        <p:txBody>
-          <a:bodyPr rtlCol="0" anchor="ctr"/>
-          <a:lstStyle/>
-          <a:p>
-            <a:pPr algn="ctr"/>
-            <a:r>
-              <a:rPr lang="en-US" dirty="0" err="1"/>
-              <a:t>Lexik</a:t>
-            </a:r>
-            <a:r>
-              <a:rPr lang="cs-CZ" dirty="0" err="1"/>
-              <a:t>ální</a:t>
-            </a:r>
-            <a:r>
-              <a:rPr lang="cs-CZ" dirty="0"/>
-              <a:t> analýza</a:t>
-            </a:r>
-            <a:endParaRPr lang="en-US" dirty="0"/>
-          </a:p>
-        </p:txBody>
-      </p:sp>
-      <p:sp>
-        <p:nvSpPr>
-          <p:cNvPr id="7" name="Obdélník 6"/>
-          <p:cNvSpPr/>
-          <p:nvPr/>
-        </p:nvSpPr>
-        <p:spPr>
-          <a:xfrm>
-            <a:off x="5652120" y="1569690"/>
-            <a:ext cx="2448272" cy="1656184"/>
-          </a:xfrm>
-          <a:prstGeom prst="rect">
-            <a:avLst/>
-          </a:prstGeom>
-        </p:spPr>
-        <p:style>
-          <a:lnRef idx="2">
-            <a:schemeClr val="accent4">
-              <a:shade val="50000"/>
-            </a:schemeClr>
-          </a:lnRef>
-          <a:fillRef idx="1">
-            <a:schemeClr val="accent4"/>
-          </a:fillRef>
-          <a:effectRef idx="0">
-            <a:schemeClr val="accent4"/>
-          </a:effectRef>
-          <a:fontRef idx="minor">
-            <a:schemeClr val="lt1"/>
-          </a:fontRef>
-        </p:style>
-        <p:txBody>
-          <a:bodyPr rtlCol="0" anchor="ctr"/>
-          <a:lstStyle/>
-          <a:p>
-            <a:pPr algn="ctr"/>
-            <a:r>
-              <a:rPr lang="cs-CZ" dirty="0"/>
-              <a:t>Syntaktická analýza</a:t>
-            </a:r>
-          </a:p>
-          <a:p>
-            <a:pPr algn="ctr"/>
-            <a:endParaRPr lang="cs-CZ" dirty="0"/>
-          </a:p>
-          <a:p>
-            <a:pPr algn="ctr"/>
-            <a:endParaRPr lang="cs-CZ" dirty="0"/>
-          </a:p>
-          <a:p>
-            <a:pPr algn="ctr"/>
-            <a:endParaRPr lang="en-US" dirty="0"/>
-          </a:p>
-        </p:txBody>
-      </p:sp>
-      <p:sp>
-        <p:nvSpPr>
-          <p:cNvPr id="8" name="Obdélník 7"/>
-          <p:cNvSpPr/>
-          <p:nvPr/>
-        </p:nvSpPr>
-        <p:spPr>
-          <a:xfrm>
-            <a:off x="5652120" y="3742003"/>
-            <a:ext cx="2448272" cy="1656184"/>
-          </a:xfrm>
-          <a:prstGeom prst="rect">
-            <a:avLst/>
-          </a:prstGeom>
-        </p:spPr>
-        <p:style>
-          <a:lnRef idx="2">
-            <a:schemeClr val="accent1">
-              <a:shade val="50000"/>
-            </a:schemeClr>
-          </a:lnRef>
-          <a:fillRef idx="1">
-            <a:schemeClr val="accent1"/>
-          </a:fillRef>
-          <a:effectRef idx="0">
-            <a:schemeClr val="accent1"/>
-          </a:effectRef>
-          <a:fontRef idx="minor">
-            <a:schemeClr val="lt1"/>
-          </a:fontRef>
-        </p:style>
-        <p:txBody>
-          <a:bodyPr rtlCol="0" anchor="ctr"/>
-          <a:lstStyle/>
-          <a:p>
-            <a:pPr algn="ctr"/>
-            <a:endParaRPr lang="cs-CZ" dirty="0"/>
-          </a:p>
-          <a:p>
-            <a:pPr algn="ctr"/>
-            <a:endParaRPr lang="cs-CZ" dirty="0"/>
-          </a:p>
-          <a:p>
-            <a:pPr algn="ctr"/>
-            <a:endParaRPr lang="cs-CZ" dirty="0"/>
-          </a:p>
-          <a:p>
-            <a:pPr algn="ctr"/>
-            <a:r>
-              <a:rPr lang="cs-CZ" dirty="0"/>
-              <a:t>Interpret</a:t>
-            </a:r>
-            <a:endParaRPr lang="en-US" dirty="0"/>
-          </a:p>
-        </p:txBody>
-      </p:sp>
       <p:cxnSp>
         <p:nvCxnSpPr>
           <p:cNvPr id="10" name="Přímá spojnice se šipkou 9"/>
-          <p:cNvCxnSpPr>
-            <a:endCxn id="7" idx="1"/>
-          </p:cNvCxnSpPr>
+          <p:cNvCxnSpPr/>
           <p:nvPr/>
         </p:nvCxnSpPr>
         <p:spPr>
           <a:xfrm>
-            <a:off x="4788024" y="2397782"/>
-            <a:ext cx="864096" cy="0"/>
+            <a:off x="3923928" y="2630843"/>
+            <a:ext cx="1296144" cy="0"/>
           </a:xfrm>
           <a:prstGeom prst="straightConnector1">
             <a:avLst/>
@@ -7620,60 +7394,16 @@
           </a:fontRef>
         </p:style>
       </p:cxnSp>
-      <p:sp>
-        <p:nvSpPr>
-          <p:cNvPr id="14" name="Obdélník 13"/>
-          <p:cNvSpPr/>
-          <p:nvPr/>
-        </p:nvSpPr>
-        <p:spPr>
-          <a:xfrm>
-            <a:off x="6209414" y="2407761"/>
-            <a:ext cx="1890978" cy="818113"/>
-          </a:xfrm>
-          <a:prstGeom prst="rect">
-            <a:avLst/>
-          </a:prstGeom>
-        </p:spPr>
-        <p:style>
-          <a:lnRef idx="2">
-            <a:schemeClr val="accent2">
-              <a:shade val="50000"/>
-            </a:schemeClr>
-          </a:lnRef>
-          <a:fillRef idx="1">
-            <a:schemeClr val="accent2"/>
-          </a:fillRef>
-          <a:effectRef idx="0">
-            <a:schemeClr val="accent2"/>
-          </a:effectRef>
-          <a:fontRef idx="minor">
-            <a:schemeClr val="lt1"/>
-          </a:fontRef>
-        </p:style>
-        <p:txBody>
-          <a:bodyPr rtlCol="0" anchor="ctr"/>
-          <a:lstStyle/>
-          <a:p>
-            <a:pPr algn="ctr"/>
-            <a:r>
-              <a:rPr lang="cs-CZ" sz="1600" dirty="0"/>
-              <a:t>Precedenční syn. analýza výrazů</a:t>
-            </a:r>
-            <a:endParaRPr lang="en-US" sz="1600" dirty="0"/>
-          </a:p>
-        </p:txBody>
-      </p:sp>
       <p:cxnSp>
         <p:nvCxnSpPr>
-          <p:cNvPr id="15" name="Přímá spojnice se šipkou 14"/>
+          <p:cNvPr id="108" name="Přímá spojnice se šipkou 9"/>
           <p:cNvCxnSpPr/>
           <p:nvPr/>
         </p:nvCxnSpPr>
         <p:spPr>
-          <a:xfrm>
-            <a:off x="5952344" y="3225874"/>
-            <a:ext cx="0" cy="516129"/>
+          <a:xfrm flipV="1">
+            <a:off x="3923928" y="1953155"/>
+            <a:ext cx="1293989" cy="5793"/>
           </a:xfrm>
           <a:prstGeom prst="straightConnector1">
             <a:avLst/>
@@ -7700,14 +7430,294 @@
       </p:cxnSp>
       <p:sp>
         <p:nvSpPr>
+          <p:cNvPr id="2" name="Nadpis 1"/>
+          <p:cNvSpPr>
+            <a:spLocks noGrp="1"/>
+          </p:cNvSpPr>
+          <p:nvPr>
+            <p:ph type="title"/>
+          </p:nvPr>
+        </p:nvSpPr>
+        <p:spPr/>
+        <p:txBody>
+          <a:bodyPr>
+            <a:normAutofit fontScale="90000"/>
+          </a:bodyPr>
+          <a:lstStyle/>
+          <a:p>
+            <a:r>
+              <a:rPr lang="cs-CZ" dirty="0"/>
+              <a:t>Blokové schéma projektu</a:t>
+            </a:r>
+            <a:endParaRPr lang="en-150" dirty="0"/>
+          </a:p>
+        </p:txBody>
+      </p:sp>
+      <p:sp>
+        <p:nvSpPr>
+          <p:cNvPr id="4" name="Zástupný symbol pro zápatí 3"/>
+          <p:cNvSpPr>
+            <a:spLocks noGrp="1"/>
+          </p:cNvSpPr>
+          <p:nvPr>
+            <p:ph type="ftr" sz="quarter" idx="11"/>
+          </p:nvPr>
+        </p:nvSpPr>
+        <p:spPr/>
+        <p:txBody>
+          <a:bodyPr/>
+          <a:lstStyle/>
+          <a:p>
+            <a:endParaRPr lang="en-150" dirty="0"/>
+          </a:p>
+        </p:txBody>
+      </p:sp>
+      <p:sp>
+        <p:nvSpPr>
+          <p:cNvPr id="5" name="Zástupný symbol pro číslo snímku 4"/>
+          <p:cNvSpPr>
+            <a:spLocks noGrp="1"/>
+          </p:cNvSpPr>
+          <p:nvPr>
+            <p:ph type="sldNum" sz="quarter" idx="12"/>
+          </p:nvPr>
+        </p:nvSpPr>
+        <p:spPr/>
+        <p:txBody>
+          <a:bodyPr/>
+          <a:lstStyle/>
+          <a:p>
+            <a:fld id="{35337AD5-3146-404F-9D87-4F437B499F8E}" type="slidenum">
+              <a:rPr lang="en-150" smtClean="0"/>
+              <a:t>2</a:t>
+            </a:fld>
+            <a:endParaRPr lang="en-150"/>
+          </a:p>
+        </p:txBody>
+      </p:sp>
+      <p:sp>
+        <p:nvSpPr>
+          <p:cNvPr id="6" name="Obdélník 5"/>
+          <p:cNvSpPr/>
+          <p:nvPr/>
+        </p:nvSpPr>
+        <p:spPr>
+          <a:xfrm>
+            <a:off x="2714672" y="1853243"/>
+            <a:ext cx="1296144" cy="902321"/>
+          </a:xfrm>
+          <a:prstGeom prst="rect">
+            <a:avLst/>
+          </a:prstGeom>
+        </p:spPr>
+        <p:style>
+          <a:lnRef idx="2">
+            <a:schemeClr val="accent6">
+              <a:shade val="50000"/>
+            </a:schemeClr>
+          </a:lnRef>
+          <a:fillRef idx="1">
+            <a:schemeClr val="accent6"/>
+          </a:fillRef>
+          <a:effectRef idx="0">
+            <a:schemeClr val="accent6"/>
+          </a:effectRef>
+          <a:fontRef idx="minor">
+            <a:schemeClr val="lt1"/>
+          </a:fontRef>
+        </p:style>
+        <p:txBody>
+          <a:bodyPr rtlCol="0" anchor="ctr"/>
+          <a:lstStyle/>
+          <a:p>
+            <a:pPr algn="ctr"/>
+            <a:r>
+              <a:rPr lang="cs-CZ" dirty="0"/>
+              <a:t>Lexikální analýza</a:t>
+            </a:r>
+            <a:endParaRPr lang="en-US" dirty="0"/>
+          </a:p>
+        </p:txBody>
+      </p:sp>
+      <p:sp>
+        <p:nvSpPr>
+          <p:cNvPr id="8" name="Obdélník 7"/>
+          <p:cNvSpPr/>
+          <p:nvPr/>
+        </p:nvSpPr>
+        <p:spPr>
+          <a:xfrm>
+            <a:off x="2714672" y="3963653"/>
+            <a:ext cx="1296144" cy="902321"/>
+          </a:xfrm>
+          <a:prstGeom prst="rect">
+            <a:avLst/>
+          </a:prstGeom>
+        </p:spPr>
+        <p:style>
+          <a:lnRef idx="2">
+            <a:schemeClr val="accent1">
+              <a:shade val="50000"/>
+            </a:schemeClr>
+          </a:lnRef>
+          <a:fillRef idx="1">
+            <a:schemeClr val="accent1"/>
+          </a:fillRef>
+          <a:effectRef idx="0">
+            <a:schemeClr val="accent1"/>
+          </a:effectRef>
+          <a:fontRef idx="minor">
+            <a:schemeClr val="lt1"/>
+          </a:fontRef>
+        </p:style>
+        <p:txBody>
+          <a:bodyPr rtlCol="0" anchor="ctr"/>
+          <a:lstStyle/>
+          <a:p>
+            <a:pPr algn="ctr"/>
+            <a:r>
+              <a:rPr lang="cs-CZ" dirty="0"/>
+              <a:t>Interpret</a:t>
+            </a:r>
+            <a:endParaRPr lang="en-US" dirty="0"/>
+          </a:p>
+        </p:txBody>
+      </p:sp>
+      <p:cxnSp>
+        <p:nvCxnSpPr>
+          <p:cNvPr id="15" name="Přímá spojnice se šipkou 14"/>
+          <p:cNvCxnSpPr>
+            <a:stCxn id="7" idx="2"/>
+            <a:endCxn id="18" idx="0"/>
+          </p:cNvCxnSpPr>
+          <p:nvPr/>
+        </p:nvCxnSpPr>
+        <p:spPr>
+          <a:xfrm flipH="1">
+            <a:off x="6048934" y="3296305"/>
+            <a:ext cx="1477" cy="669858"/>
+          </a:xfrm>
+          <a:prstGeom prst="straightConnector1">
+            <a:avLst/>
+          </a:prstGeom>
+          <a:ln w="28575">
+            <a:headEnd type="none" w="med" len="med"/>
+            <a:tailEnd type="arrow" w="med" len="med"/>
+          </a:ln>
+        </p:spPr>
+        <p:style>
+          <a:lnRef idx="3">
+            <a:schemeClr val="dk1"/>
+          </a:lnRef>
+          <a:fillRef idx="0">
+            <a:schemeClr val="dk1"/>
+          </a:fillRef>
+          <a:effectRef idx="2">
+            <a:schemeClr val="dk1"/>
+          </a:effectRef>
+          <a:fontRef idx="minor">
+            <a:schemeClr val="tx1"/>
+          </a:fontRef>
+        </p:style>
+      </p:cxnSp>
+      <p:sp>
+        <p:nvSpPr>
+          <p:cNvPr id="7" name="Obdélník 6"/>
+          <p:cNvSpPr/>
+          <p:nvPr/>
+        </p:nvSpPr>
+        <p:spPr>
+          <a:xfrm>
+            <a:off x="5217917" y="2409022"/>
+            <a:ext cx="1664987" cy="887283"/>
+          </a:xfrm>
+          <a:prstGeom prst="rect">
+            <a:avLst/>
+          </a:prstGeom>
+        </p:spPr>
+        <p:style>
+          <a:lnRef idx="2">
+            <a:schemeClr val="accent4">
+              <a:shade val="50000"/>
+            </a:schemeClr>
+          </a:lnRef>
+          <a:fillRef idx="1">
+            <a:schemeClr val="accent4"/>
+          </a:fillRef>
+          <a:effectRef idx="0">
+            <a:schemeClr val="accent4"/>
+          </a:effectRef>
+          <a:fontRef idx="minor">
+            <a:schemeClr val="lt1"/>
+          </a:fontRef>
+        </p:style>
+        <p:txBody>
+          <a:bodyPr rtlCol="0" anchor="ctr"/>
+          <a:lstStyle/>
+          <a:p>
+            <a:pPr algn="ctr"/>
+            <a:r>
+              <a:rPr lang="cs-CZ" dirty="0"/>
+              <a:t>Syntaktická analýza</a:t>
+            </a:r>
+            <a:endParaRPr lang="en-US" dirty="0"/>
+          </a:p>
+        </p:txBody>
+      </p:sp>
+      <p:sp>
+        <p:nvSpPr>
+          <p:cNvPr id="14" name="Obdélník 13"/>
+          <p:cNvSpPr/>
+          <p:nvPr/>
+        </p:nvSpPr>
+        <p:spPr>
+          <a:xfrm>
+            <a:off x="5217918" y="1159783"/>
+            <a:ext cx="1664987" cy="884416"/>
+          </a:xfrm>
+          <a:prstGeom prst="rect">
+            <a:avLst/>
+          </a:prstGeom>
+        </p:spPr>
+        <p:style>
+          <a:lnRef idx="2">
+            <a:schemeClr val="accent2">
+              <a:shade val="50000"/>
+            </a:schemeClr>
+          </a:lnRef>
+          <a:fillRef idx="1">
+            <a:schemeClr val="accent2"/>
+          </a:fillRef>
+          <a:effectRef idx="0">
+            <a:schemeClr val="accent2"/>
+          </a:effectRef>
+          <a:fontRef idx="minor">
+            <a:schemeClr val="lt1"/>
+          </a:fontRef>
+        </p:style>
+        <p:txBody>
+          <a:bodyPr rtlCol="0" anchor="ctr"/>
+          <a:lstStyle/>
+          <a:p>
+            <a:pPr algn="ctr"/>
+            <a:r>
+              <a:rPr lang="cs-CZ" sz="1600" dirty="0"/>
+              <a:t>Precedenční syn. analýza výrazů</a:t>
+            </a:r>
+            <a:endParaRPr lang="en-US" sz="1600" dirty="0"/>
+          </a:p>
+        </p:txBody>
+      </p:sp>
+      <p:sp>
+        <p:nvSpPr>
           <p:cNvPr id="18" name="Obdélník 17"/>
           <p:cNvSpPr/>
           <p:nvPr/>
         </p:nvSpPr>
         <p:spPr>
           <a:xfrm>
-            <a:off x="6209413" y="3739272"/>
-            <a:ext cx="1890979" cy="875943"/>
+            <a:off x="5214964" y="3966163"/>
+            <a:ext cx="1667939" cy="900149"/>
           </a:xfrm>
           <a:prstGeom prst="rect">
             <a:avLst/>
@@ -7758,7 +7768,7 @@
         </p:nvSpPr>
         <p:spPr>
           <a:xfrm>
-            <a:off x="851963" y="1954087"/>
+            <a:off x="300471" y="1872356"/>
             <a:ext cx="1436516" cy="864096"/>
           </a:xfrm>
           <a:prstGeom prst="snip1Rect">
@@ -7795,13 +7805,16 @@
       <p:cxnSp>
         <p:nvCxnSpPr>
           <p:cNvPr id="24" name="Přímá spojnice se šipkou 23"/>
-          <p:cNvCxnSpPr/>
+          <p:cNvCxnSpPr>
+            <a:stCxn id="20" idx="0"/>
+            <a:endCxn id="6" idx="1"/>
+          </p:cNvCxnSpPr>
           <p:nvPr/>
         </p:nvCxnSpPr>
         <p:spPr>
           <a:xfrm>
-            <a:off x="2297684" y="2407761"/>
-            <a:ext cx="474116" cy="0"/>
+            <a:off x="1736987" y="2304404"/>
+            <a:ext cx="977685" cy="0"/>
           </a:xfrm>
           <a:prstGeom prst="straightConnector1">
             <a:avLst/>
@@ -7834,8 +7847,8 @@
         </p:nvSpPr>
         <p:spPr>
           <a:xfrm>
-            <a:off x="3494297" y="4138047"/>
-            <a:ext cx="1436516" cy="864096"/>
+            <a:off x="300471" y="4054622"/>
+            <a:ext cx="1436515" cy="720384"/>
           </a:xfrm>
           <a:prstGeom prst="snip1Rect">
             <a:avLst/>
@@ -7873,13 +7886,16 @@
       <p:cxnSp>
         <p:nvCxnSpPr>
           <p:cNvPr id="27" name="Přímá spojnice se šipkou 26"/>
-          <p:cNvCxnSpPr/>
+          <p:cNvCxnSpPr>
+            <a:stCxn id="8" idx="1"/>
+            <a:endCxn id="26" idx="0"/>
+          </p:cNvCxnSpPr>
           <p:nvPr/>
         </p:nvCxnSpPr>
         <p:spPr>
           <a:xfrm flipH="1">
-            <a:off x="4924120" y="4621905"/>
-            <a:ext cx="721902" cy="4533"/>
+            <a:off x="1736986" y="4414814"/>
+            <a:ext cx="977686" cy="0"/>
           </a:xfrm>
           <a:prstGeom prst="straightConnector1">
             <a:avLst/>
@@ -7945,6 +7961,515 @@
           </a:p>
         </p:txBody>
       </p:sp>
+      <p:cxnSp>
+        <p:nvCxnSpPr>
+          <p:cNvPr id="25" name="Přímá spojnice se šipkou 9"/>
+          <p:cNvCxnSpPr>
+            <a:stCxn id="18" idx="1"/>
+            <a:endCxn id="8" idx="3"/>
+          </p:cNvCxnSpPr>
+          <p:nvPr/>
+        </p:nvCxnSpPr>
+        <p:spPr>
+          <a:xfrm flipH="1" flipV="1">
+            <a:off x="4010816" y="4414814"/>
+            <a:ext cx="1204148" cy="1424"/>
+          </a:xfrm>
+          <a:prstGeom prst="straightConnector1">
+            <a:avLst/>
+          </a:prstGeom>
+          <a:ln w="28575">
+            <a:headEnd type="none" w="med" len="med"/>
+            <a:tailEnd type="arrow" w="med" len="med"/>
+          </a:ln>
+        </p:spPr>
+        <p:style>
+          <a:lnRef idx="3">
+            <a:schemeClr val="dk1"/>
+          </a:lnRef>
+          <a:fillRef idx="0">
+            <a:schemeClr val="dk1"/>
+          </a:fillRef>
+          <a:effectRef idx="2">
+            <a:schemeClr val="dk1"/>
+          </a:effectRef>
+          <a:fontRef idx="minor">
+            <a:schemeClr val="tx1"/>
+          </a:fontRef>
+        </p:style>
+      </p:cxnSp>
+      <p:sp>
+        <p:nvSpPr>
+          <p:cNvPr id="90" name="TextBox 89"/>
+          <p:cNvSpPr txBox="1"/>
+          <p:nvPr/>
+        </p:nvSpPr>
+        <p:spPr>
+          <a:xfrm>
+            <a:off x="4316982" y="4095041"/>
+            <a:ext cx="591815" cy="369332"/>
+          </a:xfrm>
+          <a:prstGeom prst="rect">
+            <a:avLst/>
+          </a:prstGeom>
+          <a:noFill/>
+        </p:spPr>
+        <p:txBody>
+          <a:bodyPr wrap="square" rtlCol="0">
+            <a:spAutoFit/>
+          </a:bodyPr>
+          <a:lstStyle/>
+          <a:p>
+            <a:pPr algn="ctr"/>
+            <a:r>
+              <a:rPr lang="en-US" dirty="0"/>
+              <a:t>AST</a:t>
+            </a:r>
+            <a:endParaRPr lang="cs-CZ" dirty="0"/>
+          </a:p>
+        </p:txBody>
+      </p:sp>
+      <p:sp>
+        <p:nvSpPr>
+          <p:cNvPr id="91" name="TextBox 90"/>
+          <p:cNvSpPr txBox="1"/>
+          <p:nvPr/>
+        </p:nvSpPr>
+        <p:spPr>
+          <a:xfrm>
+            <a:off x="6021117" y="3446568"/>
+            <a:ext cx="591815" cy="369332"/>
+          </a:xfrm>
+          <a:prstGeom prst="rect">
+            <a:avLst/>
+          </a:prstGeom>
+          <a:noFill/>
+        </p:spPr>
+        <p:txBody>
+          <a:bodyPr wrap="square" rtlCol="0">
+            <a:spAutoFit/>
+          </a:bodyPr>
+          <a:lstStyle/>
+          <a:p>
+            <a:r>
+              <a:rPr lang="en-US" dirty="0"/>
+              <a:t>AST</a:t>
+            </a:r>
+            <a:endParaRPr lang="cs-CZ" dirty="0"/>
+          </a:p>
+        </p:txBody>
+      </p:sp>
+      <p:sp>
+        <p:nvSpPr>
+          <p:cNvPr id="92" name="TextBox 91"/>
+          <p:cNvSpPr txBox="1"/>
+          <p:nvPr/>
+        </p:nvSpPr>
+        <p:spPr>
+          <a:xfrm>
+            <a:off x="4067944" y="2111552"/>
+            <a:ext cx="909955" cy="369332"/>
+          </a:xfrm>
+          <a:prstGeom prst="rect">
+            <a:avLst/>
+          </a:prstGeom>
+          <a:noFill/>
+        </p:spPr>
+        <p:txBody>
+          <a:bodyPr wrap="square" rtlCol="0">
+            <a:spAutoFit/>
+          </a:bodyPr>
+          <a:lstStyle/>
+          <a:p>
+            <a:pPr algn="ctr"/>
+            <a:r>
+              <a:rPr lang="en-US" dirty="0" err="1"/>
+              <a:t>Tokeny</a:t>
+            </a:r>
+            <a:endParaRPr lang="cs-CZ" dirty="0"/>
+          </a:p>
+        </p:txBody>
+      </p:sp>
+      <p:sp>
+        <p:nvSpPr>
+          <p:cNvPr id="93" name="TextBox 92"/>
+          <p:cNvSpPr txBox="1"/>
+          <p:nvPr/>
+        </p:nvSpPr>
+        <p:spPr>
+          <a:xfrm>
+            <a:off x="1768860" y="1984512"/>
+            <a:ext cx="909955" cy="369332"/>
+          </a:xfrm>
+          <a:prstGeom prst="rect">
+            <a:avLst/>
+          </a:prstGeom>
+          <a:noFill/>
+        </p:spPr>
+        <p:txBody>
+          <a:bodyPr wrap="square" rtlCol="0">
+            <a:spAutoFit/>
+          </a:bodyPr>
+          <a:lstStyle/>
+          <a:p>
+            <a:pPr algn="ctr"/>
+            <a:r>
+              <a:rPr lang="en-US" dirty="0" err="1"/>
+              <a:t>Znaky</a:t>
+            </a:r>
+            <a:endParaRPr lang="cs-CZ" dirty="0"/>
+          </a:p>
+        </p:txBody>
+      </p:sp>
+      <p:sp>
+        <p:nvSpPr>
+          <p:cNvPr id="94" name="TextBox 93"/>
+          <p:cNvSpPr txBox="1"/>
+          <p:nvPr/>
+        </p:nvSpPr>
+        <p:spPr>
+          <a:xfrm>
+            <a:off x="1768859" y="4095041"/>
+            <a:ext cx="909955" cy="369332"/>
+          </a:xfrm>
+          <a:prstGeom prst="rect">
+            <a:avLst/>
+          </a:prstGeom>
+          <a:noFill/>
+        </p:spPr>
+        <p:txBody>
+          <a:bodyPr wrap="square" rtlCol="0">
+            <a:spAutoFit/>
+          </a:bodyPr>
+          <a:lstStyle/>
+          <a:p>
+            <a:pPr algn="ctr"/>
+            <a:r>
+              <a:rPr lang="en-US" dirty="0" err="1"/>
+              <a:t>Znaky</a:t>
+            </a:r>
+            <a:endParaRPr lang="cs-CZ" dirty="0"/>
+          </a:p>
+        </p:txBody>
+      </p:sp>
+      <p:cxnSp>
+        <p:nvCxnSpPr>
+          <p:cNvPr id="115" name="Přímá spojnice se šipkou 9"/>
+          <p:cNvCxnSpPr>
+            <a:stCxn id="120" idx="2"/>
+            <a:endCxn id="7" idx="3"/>
+          </p:cNvCxnSpPr>
+          <p:nvPr/>
+        </p:nvCxnSpPr>
+        <p:spPr>
+          <a:xfrm rot="5400000">
+            <a:off x="6924294" y="2367632"/>
+            <a:ext cx="443642" cy="526422"/>
+          </a:xfrm>
+          <a:prstGeom prst="curvedConnector2">
+            <a:avLst/>
+          </a:prstGeom>
+          <a:ln w="28575">
+            <a:headEnd type="none" w="med" len="med"/>
+            <a:tailEnd type="arrow" w="med" len="med"/>
+          </a:ln>
+        </p:spPr>
+        <p:style>
+          <a:lnRef idx="3">
+            <a:schemeClr val="dk1"/>
+          </a:lnRef>
+          <a:fillRef idx="0">
+            <a:schemeClr val="dk1"/>
+          </a:fillRef>
+          <a:effectRef idx="2">
+            <a:schemeClr val="dk1"/>
+          </a:effectRef>
+          <a:fontRef idx="minor">
+            <a:schemeClr val="tx1"/>
+          </a:fontRef>
+        </p:style>
+      </p:cxnSp>
+      <p:sp>
+        <p:nvSpPr>
+          <p:cNvPr id="120" name="TextBox 119"/>
+          <p:cNvSpPr txBox="1"/>
+          <p:nvPr/>
+        </p:nvSpPr>
+        <p:spPr>
+          <a:xfrm>
+            <a:off x="6954348" y="2039690"/>
+            <a:ext cx="909955" cy="369332"/>
+          </a:xfrm>
+          <a:prstGeom prst="rect">
+            <a:avLst/>
+          </a:prstGeom>
+          <a:noFill/>
+        </p:spPr>
+        <p:txBody>
+          <a:bodyPr wrap="square" rtlCol="0">
+            <a:spAutoFit/>
+          </a:bodyPr>
+          <a:lstStyle/>
+          <a:p>
+            <a:pPr algn="ctr"/>
+            <a:r>
+              <a:rPr lang="en-US" dirty="0" err="1"/>
+              <a:t>Výrazy</a:t>
+            </a:r>
+            <a:endParaRPr lang="cs-CZ" dirty="0"/>
+          </a:p>
+        </p:txBody>
+      </p:sp>
+      <p:cxnSp>
+        <p:nvCxnSpPr>
+          <p:cNvPr id="124" name="Přímá spojnice se šipkou 9"/>
+          <p:cNvCxnSpPr>
+            <a:stCxn id="14" idx="3"/>
+            <a:endCxn id="120" idx="0"/>
+          </p:cNvCxnSpPr>
+          <p:nvPr/>
+        </p:nvCxnSpPr>
+        <p:spPr>
+          <a:xfrm>
+            <a:off x="6882905" y="1601991"/>
+            <a:ext cx="526421" cy="437699"/>
+          </a:xfrm>
+          <a:prstGeom prst="curvedConnector2">
+            <a:avLst/>
+          </a:prstGeom>
+          <a:ln w="28575">
+            <a:headEnd type="none" w="med" len="med"/>
+            <a:tailEnd type="arrow" w="med" len="med"/>
+          </a:ln>
+        </p:spPr>
+        <p:style>
+          <a:lnRef idx="3">
+            <a:schemeClr val="dk1"/>
+          </a:lnRef>
+          <a:fillRef idx="0">
+            <a:schemeClr val="dk1"/>
+          </a:fillRef>
+          <a:effectRef idx="2">
+            <a:schemeClr val="dk1"/>
+          </a:effectRef>
+          <a:fontRef idx="minor">
+            <a:schemeClr val="tx1"/>
+          </a:fontRef>
+        </p:style>
+      </p:cxnSp>
+      <p:cxnSp>
+        <p:nvCxnSpPr>
+          <p:cNvPr id="130" name="Straight Connector 129"/>
+          <p:cNvCxnSpPr>
+            <a:stCxn id="14" idx="3"/>
+            <a:endCxn id="14" idx="3"/>
+          </p:cNvCxnSpPr>
+          <p:nvPr/>
+        </p:nvCxnSpPr>
+        <p:spPr>
+          <a:xfrm>
+            <a:off x="6882905" y="1601991"/>
+            <a:ext cx="0" cy="0"/>
+          </a:xfrm>
+          <a:prstGeom prst="line">
+            <a:avLst/>
+          </a:prstGeom>
+        </p:spPr>
+        <p:style>
+          <a:lnRef idx="1">
+            <a:schemeClr val="accent1"/>
+          </a:lnRef>
+          <a:fillRef idx="0">
+            <a:schemeClr val="accent1"/>
+          </a:fillRef>
+          <a:effectRef idx="0">
+            <a:schemeClr val="accent1"/>
+          </a:effectRef>
+          <a:fontRef idx="minor">
+            <a:schemeClr val="tx1"/>
+          </a:fontRef>
+        </p:style>
+      </p:cxnSp>
+      <p:cxnSp>
+        <p:nvCxnSpPr>
+          <p:cNvPr id="133" name="Přímá spojnice se šipkou 9"/>
+          <p:cNvCxnSpPr>
+            <a:stCxn id="7" idx="0"/>
+            <a:endCxn id="14" idx="2"/>
+          </p:cNvCxnSpPr>
+          <p:nvPr/>
+        </p:nvCxnSpPr>
+        <p:spPr>
+          <a:xfrm flipV="1">
+            <a:off x="6050411" y="2044199"/>
+            <a:ext cx="1" cy="364823"/>
+          </a:xfrm>
+          <a:prstGeom prst="straightConnector1">
+            <a:avLst/>
+          </a:prstGeom>
+          <a:ln w="28575">
+            <a:prstDash val="sysDot"/>
+            <a:headEnd type="none" w="med" len="med"/>
+            <a:tailEnd type="arrow" w="med" len="med"/>
+          </a:ln>
+        </p:spPr>
+        <p:style>
+          <a:lnRef idx="3">
+            <a:schemeClr val="dk1"/>
+          </a:lnRef>
+          <a:fillRef idx="0">
+            <a:schemeClr val="dk1"/>
+          </a:fillRef>
+          <a:effectRef idx="2">
+            <a:schemeClr val="dk1"/>
+          </a:effectRef>
+          <a:fontRef idx="minor">
+            <a:schemeClr val="tx1"/>
+          </a:fontRef>
+        </p:style>
+      </p:cxnSp>
+      <p:cxnSp>
+        <p:nvCxnSpPr>
+          <p:cNvPr id="150" name="Přímá spojnice se šipkou 9"/>
+          <p:cNvCxnSpPr>
+            <a:endCxn id="6" idx="0"/>
+          </p:cNvCxnSpPr>
+          <p:nvPr/>
+        </p:nvCxnSpPr>
+        <p:spPr>
+          <a:xfrm rot="10800000" flipV="1">
+            <a:off x="3362744" y="1601991"/>
+            <a:ext cx="273152" cy="251252"/>
+          </a:xfrm>
+          <a:prstGeom prst="curvedConnector2">
+            <a:avLst/>
+          </a:prstGeom>
+          <a:ln w="28575">
+            <a:prstDash val="sysDot"/>
+            <a:headEnd type="none" w="med" len="med"/>
+            <a:tailEnd type="arrow" w="med" len="med"/>
+          </a:ln>
+        </p:spPr>
+        <p:style>
+          <a:lnRef idx="3">
+            <a:schemeClr val="dk1"/>
+          </a:lnRef>
+          <a:fillRef idx="0">
+            <a:schemeClr val="dk1"/>
+          </a:fillRef>
+          <a:effectRef idx="2">
+            <a:schemeClr val="dk1"/>
+          </a:effectRef>
+          <a:fontRef idx="minor">
+            <a:schemeClr val="tx1"/>
+          </a:fontRef>
+        </p:style>
+      </p:cxnSp>
+      <p:cxnSp>
+        <p:nvCxnSpPr>
+          <p:cNvPr id="165" name="Přímá spojnice se šipkou 9"/>
+          <p:cNvCxnSpPr>
+            <a:endCxn id="6" idx="2"/>
+          </p:cNvCxnSpPr>
+          <p:nvPr/>
+        </p:nvCxnSpPr>
+        <p:spPr>
+          <a:xfrm rot="10800000">
+            <a:off x="3362744" y="2755564"/>
+            <a:ext cx="273152" cy="212286"/>
+          </a:xfrm>
+          <a:prstGeom prst="curvedConnector2">
+            <a:avLst/>
+          </a:prstGeom>
+          <a:ln w="28575">
+            <a:prstDash val="sysDot"/>
+            <a:headEnd type="none" w="med" len="med"/>
+            <a:tailEnd type="arrow" w="med" len="med"/>
+          </a:ln>
+        </p:spPr>
+        <p:style>
+          <a:lnRef idx="3">
+            <a:schemeClr val="dk1"/>
+          </a:lnRef>
+          <a:fillRef idx="0">
+            <a:schemeClr val="dk1"/>
+          </a:fillRef>
+          <a:effectRef idx="2">
+            <a:schemeClr val="dk1"/>
+          </a:effectRef>
+          <a:fontRef idx="minor">
+            <a:schemeClr val="tx1"/>
+          </a:fontRef>
+        </p:style>
+      </p:cxnSp>
+      <p:cxnSp>
+        <p:nvCxnSpPr>
+          <p:cNvPr id="167" name="Straight Connector 166"/>
+          <p:cNvCxnSpPr>
+            <a:stCxn id="14" idx="1"/>
+          </p:cNvCxnSpPr>
+          <p:nvPr/>
+        </p:nvCxnSpPr>
+        <p:spPr>
+          <a:xfrm flipH="1">
+            <a:off x="3635896" y="1601991"/>
+            <a:ext cx="1582022" cy="0"/>
+          </a:xfrm>
+          <a:prstGeom prst="line">
+            <a:avLst/>
+          </a:prstGeom>
+          <a:ln w="28575">
+            <a:prstDash val="sysDot"/>
+          </a:ln>
+        </p:spPr>
+        <p:style>
+          <a:lnRef idx="1">
+            <a:schemeClr val="dk1"/>
+          </a:lnRef>
+          <a:fillRef idx="0">
+            <a:schemeClr val="dk1"/>
+          </a:fillRef>
+          <a:effectRef idx="0">
+            <a:schemeClr val="dk1"/>
+          </a:effectRef>
+          <a:fontRef idx="minor">
+            <a:schemeClr val="tx1"/>
+          </a:fontRef>
+        </p:style>
+      </p:cxnSp>
+      <p:cxnSp>
+        <p:nvCxnSpPr>
+          <p:cNvPr id="175" name="Straight Connector 174"/>
+          <p:cNvCxnSpPr/>
+          <p:nvPr/>
+        </p:nvCxnSpPr>
+        <p:spPr>
+          <a:xfrm flipH="1">
+            <a:off x="3635896" y="2967851"/>
+            <a:ext cx="1584176" cy="0"/>
+          </a:xfrm>
+          <a:prstGeom prst="line">
+            <a:avLst/>
+          </a:prstGeom>
+          <a:ln w="28575">
+            <a:prstDash val="sysDot"/>
+          </a:ln>
+        </p:spPr>
+        <p:style>
+          <a:lnRef idx="1">
+            <a:schemeClr val="dk1"/>
+          </a:lnRef>
+          <a:fillRef idx="0">
+            <a:schemeClr val="dk1"/>
+          </a:fillRef>
+          <a:effectRef idx="0">
+            <a:schemeClr val="dk1"/>
+          </a:effectRef>
+          <a:fontRef idx="minor">
+            <a:schemeClr val="tx1"/>
+          </a:fontRef>
+        </p:style>
+      </p:cxnSp>
     </p:spTree>
     <p:extLst>
       <p:ext uri="{BB962C8B-B14F-4D97-AF65-F5344CB8AC3E}">

</xml_diff>